<commit_message>
diagrama de sequencia na apresentação
</commit_message>
<xml_diff>
--- a/Apresentacao/ApresentaçãoV1.pptx
+++ b/Apresentacao/ApresentaçãoV1.pptx
@@ -5,10 +5,10 @@
     <p:sldMasterId id="2147483694" r:id="rId1"/>
   </p:sldMasterIdLst>
   <p:notesMasterIdLst>
-    <p:notesMasterId r:id="rId31"/>
+    <p:notesMasterId r:id="rId32"/>
   </p:notesMasterIdLst>
   <p:handoutMasterIdLst>
-    <p:handoutMasterId r:id="rId32"/>
+    <p:handoutMasterId r:id="rId33"/>
   </p:handoutMasterIdLst>
   <p:sldIdLst>
     <p:sldId id="256" r:id="rId2"/>
@@ -24,22 +24,23 @@
     <p:sldId id="662" r:id="rId12"/>
     <p:sldId id="714" r:id="rId13"/>
     <p:sldId id="715" r:id="rId14"/>
-    <p:sldId id="687" r:id="rId15"/>
-    <p:sldId id="688" r:id="rId16"/>
-    <p:sldId id="705" r:id="rId17"/>
-    <p:sldId id="704" r:id="rId18"/>
-    <p:sldId id="706" r:id="rId19"/>
-    <p:sldId id="690" r:id="rId20"/>
-    <p:sldId id="707" r:id="rId21"/>
-    <p:sldId id="708" r:id="rId22"/>
-    <p:sldId id="702" r:id="rId23"/>
-    <p:sldId id="709" r:id="rId24"/>
-    <p:sldId id="711" r:id="rId25"/>
-    <p:sldId id="710" r:id="rId26"/>
-    <p:sldId id="668" r:id="rId27"/>
-    <p:sldId id="665" r:id="rId28"/>
-    <p:sldId id="712" r:id="rId29"/>
-    <p:sldId id="445" r:id="rId30"/>
+    <p:sldId id="716" r:id="rId15"/>
+    <p:sldId id="687" r:id="rId16"/>
+    <p:sldId id="688" r:id="rId17"/>
+    <p:sldId id="705" r:id="rId18"/>
+    <p:sldId id="704" r:id="rId19"/>
+    <p:sldId id="706" r:id="rId20"/>
+    <p:sldId id="690" r:id="rId21"/>
+    <p:sldId id="707" r:id="rId22"/>
+    <p:sldId id="708" r:id="rId23"/>
+    <p:sldId id="702" r:id="rId24"/>
+    <p:sldId id="709" r:id="rId25"/>
+    <p:sldId id="711" r:id="rId26"/>
+    <p:sldId id="710" r:id="rId27"/>
+    <p:sldId id="668" r:id="rId28"/>
+    <p:sldId id="665" r:id="rId29"/>
+    <p:sldId id="712" r:id="rId30"/>
+    <p:sldId id="445" r:id="rId31"/>
   </p:sldIdLst>
   <p:sldSz cx="9144000" cy="6858000" type="screen4x3"/>
   <p:notesSz cx="7099300" cy="10234613"/>
@@ -170,7 +171,7 @@
   </p:defaultTextStyle>
   <p:extLst>
     <p:ext uri="{EFAFB233-063F-42B5-8137-9DF3F51BA10A}">
-      <p15:sldGuideLst xmlns="" xmlns:p15="http://schemas.microsoft.com/office/powerpoint/2012/main">
+      <p15:sldGuideLst xmlns:p15="http://schemas.microsoft.com/office/powerpoint/2012/main" xmlns="">
         <p15:guide id="1" orient="horz" pos="2160">
           <p15:clr>
             <a:srgbClr val="A4A3A4"/>
@@ -288,7 +289,7 @@
               <a:pPr>
                 <a:defRPr/>
               </a:pPr>
-              <a:t>16/05/17</a:t>
+              <a:t>19/05/17</a:t>
             </a:fld>
             <a:endParaRPr lang="pt-BR" dirty="0"/>
           </a:p>
@@ -498,7 +499,7 @@
               <a:pPr>
                 <a:defRPr/>
               </a:pPr>
-              <a:t>16/05/17</a:t>
+              <a:t>19/05/17</a:t>
             </a:fld>
             <a:endParaRPr lang="pt-BR" dirty="0"/>
           </a:p>
@@ -1141,7 +1142,7 @@
             <a:fld id="{5BB55D5F-4A0B-4F20-84B6-04A5F9545562}" type="slidenum">
               <a:rPr lang="pt-BR" altLang="pt-BR" smtClean="0"/>
               <a:pPr/>
-              <a:t>14</a:t>
+              <a:t>15</a:t>
             </a:fld>
             <a:endParaRPr lang="pt-BR" altLang="pt-BR" dirty="0"/>
           </a:p>
@@ -1226,7 +1227,7 @@
             <a:fld id="{5BB55D5F-4A0B-4F20-84B6-04A5F9545562}" type="slidenum">
               <a:rPr lang="pt-BR" altLang="pt-BR" smtClean="0"/>
               <a:pPr/>
-              <a:t>15</a:t>
+              <a:t>16</a:t>
             </a:fld>
             <a:endParaRPr lang="pt-BR" altLang="pt-BR" dirty="0"/>
           </a:p>
@@ -1311,7 +1312,7 @@
             <a:fld id="{5BB55D5F-4A0B-4F20-84B6-04A5F9545562}" type="slidenum">
               <a:rPr lang="pt-BR" altLang="pt-BR" smtClean="0"/>
               <a:pPr/>
-              <a:t>16</a:t>
+              <a:t>17</a:t>
             </a:fld>
             <a:endParaRPr lang="pt-BR" altLang="pt-BR" dirty="0"/>
           </a:p>
@@ -1396,7 +1397,7 @@
             <a:fld id="{5BB55D5F-4A0B-4F20-84B6-04A5F9545562}" type="slidenum">
               <a:rPr lang="pt-BR" altLang="pt-BR" smtClean="0"/>
               <a:pPr/>
-              <a:t>17</a:t>
+              <a:t>18</a:t>
             </a:fld>
             <a:endParaRPr lang="pt-BR" altLang="pt-BR" dirty="0"/>
           </a:p>
@@ -1481,7 +1482,7 @@
             <a:fld id="{5BB55D5F-4A0B-4F20-84B6-04A5F9545562}" type="slidenum">
               <a:rPr lang="pt-BR" altLang="pt-BR" smtClean="0"/>
               <a:pPr/>
-              <a:t>18</a:t>
+              <a:t>19</a:t>
             </a:fld>
             <a:endParaRPr lang="pt-BR" altLang="pt-BR" dirty="0"/>
           </a:p>
@@ -1566,7 +1567,7 @@
             <a:fld id="{5BB55D5F-4A0B-4F20-84B6-04A5F9545562}" type="slidenum">
               <a:rPr lang="pt-BR" altLang="pt-BR" smtClean="0"/>
               <a:pPr/>
-              <a:t>19</a:t>
+              <a:t>20</a:t>
             </a:fld>
             <a:endParaRPr lang="pt-BR" altLang="pt-BR" dirty="0"/>
           </a:p>
@@ -1651,7 +1652,7 @@
             <a:fld id="{5BB55D5F-4A0B-4F20-84B6-04A5F9545562}" type="slidenum">
               <a:rPr lang="pt-BR" altLang="pt-BR" smtClean="0"/>
               <a:pPr/>
-              <a:t>20</a:t>
+              <a:t>21</a:t>
             </a:fld>
             <a:endParaRPr lang="pt-BR" altLang="pt-BR" dirty="0"/>
           </a:p>
@@ -1736,7 +1737,7 @@
             <a:fld id="{5BB55D5F-4A0B-4F20-84B6-04A5F9545562}" type="slidenum">
               <a:rPr lang="pt-BR" altLang="pt-BR" smtClean="0"/>
               <a:pPr/>
-              <a:t>21</a:t>
+              <a:t>22</a:t>
             </a:fld>
             <a:endParaRPr lang="pt-BR" altLang="pt-BR" dirty="0"/>
           </a:p>
@@ -1821,7 +1822,7 @@
             <a:fld id="{5BB55D5F-4A0B-4F20-84B6-04A5F9545562}" type="slidenum">
               <a:rPr lang="pt-BR" altLang="pt-BR" smtClean="0"/>
               <a:pPr/>
-              <a:t>22</a:t>
+              <a:t>23</a:t>
             </a:fld>
             <a:endParaRPr lang="pt-BR" altLang="pt-BR" dirty="0"/>
           </a:p>
@@ -2012,7 +2013,7 @@
             <a:fld id="{5BB55D5F-4A0B-4F20-84B6-04A5F9545562}" type="slidenum">
               <a:rPr lang="pt-BR" altLang="pt-BR" smtClean="0"/>
               <a:pPr/>
-              <a:t>23</a:t>
+              <a:t>24</a:t>
             </a:fld>
             <a:endParaRPr lang="pt-BR" altLang="pt-BR" dirty="0"/>
           </a:p>
@@ -2097,7 +2098,7 @@
             <a:fld id="{5BB55D5F-4A0B-4F20-84B6-04A5F9545562}" type="slidenum">
               <a:rPr lang="pt-BR" altLang="pt-BR" smtClean="0"/>
               <a:pPr/>
-              <a:t>24</a:t>
+              <a:t>25</a:t>
             </a:fld>
             <a:endParaRPr lang="pt-BR" altLang="pt-BR" dirty="0"/>
           </a:p>
@@ -2182,7 +2183,7 @@
             <a:fld id="{5BB55D5F-4A0B-4F20-84B6-04A5F9545562}" type="slidenum">
               <a:rPr lang="pt-BR" altLang="pt-BR" smtClean="0"/>
               <a:pPr/>
-              <a:t>25</a:t>
+              <a:t>26</a:t>
             </a:fld>
             <a:endParaRPr lang="pt-BR" altLang="pt-BR" dirty="0"/>
           </a:p>
@@ -2288,7 +2289,7 @@
             <a:fld id="{A15D2564-4305-46D2-8456-871585EAEBF6}" type="slidenum">
               <a:rPr lang="pt-BR" altLang="pt-BR"/>
               <a:pPr defTabSz="987425"/>
-              <a:t>26</a:t>
+              <a:t>27</a:t>
             </a:fld>
             <a:endParaRPr lang="pt-BR" altLang="pt-BR" dirty="0"/>
           </a:p>
@@ -2394,7 +2395,7 @@
             <a:fld id="{A15D2564-4305-46D2-8456-871585EAEBF6}" type="slidenum">
               <a:rPr lang="pt-BR" altLang="pt-BR"/>
               <a:pPr defTabSz="987425"/>
-              <a:t>27</a:t>
+              <a:t>28</a:t>
             </a:fld>
             <a:endParaRPr lang="pt-BR" altLang="pt-BR" dirty="0"/>
           </a:p>
@@ -2500,7 +2501,7 @@
             <a:fld id="{A15D2564-4305-46D2-8456-871585EAEBF6}" type="slidenum">
               <a:rPr lang="pt-BR" altLang="pt-BR"/>
               <a:pPr defTabSz="987425"/>
-              <a:t>28</a:t>
+              <a:t>29</a:t>
             </a:fld>
             <a:endParaRPr lang="pt-BR" altLang="pt-BR" dirty="0"/>
           </a:p>
@@ -2635,7 +2636,7 @@
                 <a:latin typeface="Calibri" pitchFamily="34" charset="0"/>
               </a:rPr>
               <a:pPr algn="r" defTabSz="989013" eaLnBrk="1" hangingPunct="1"/>
-              <a:t>29</a:t>
+              <a:t>30</a:t>
             </a:fld>
             <a:endParaRPr lang="pt-BR" altLang="pt-BR" sz="1300" dirty="0">
               <a:latin typeface="Calibri" pitchFamily="34" charset="0"/>
@@ -3782,7 +3783,7 @@
             </a:pPr>
             <a:fld id="{96F08D13-8879-41C3-9730-C4BBCC168E26}" type="datetime8">
               <a:rPr lang="pt-BR" smtClean="0"/>
-              <a:t>16/05/17 17:25</a:t>
+              <a:t>19/05/17 20:54</a:t>
             </a:fld>
             <a:endParaRPr dirty="0"/>
           </a:p>
@@ -3978,7 +3979,7 @@
             </a:pPr>
             <a:fld id="{CC65DD43-C93F-4E63-9AD7-DC95121224E7}" type="datetime8">
               <a:rPr lang="pt-BR" smtClean="0"/>
-              <a:t>16/05/17 17:25</a:t>
+              <a:t>19/05/17 20:54</a:t>
             </a:fld>
             <a:endParaRPr dirty="0"/>
           </a:p>
@@ -4338,7 +4339,7 @@
             </a:pPr>
             <a:fld id="{D55EE381-6010-4B9C-84F7-F124C19B82C0}" type="datetime8">
               <a:rPr lang="pt-BR" smtClean="0"/>
-              <a:t>16/05/17 17:25</a:t>
+              <a:t>19/05/17 20:54</a:t>
             </a:fld>
             <a:endParaRPr dirty="0"/>
           </a:p>
@@ -4710,7 +4711,7 @@
             </a:pPr>
             <a:fld id="{54D00214-BC78-4AD4-98C0-7C297B5D6497}" type="datetime8">
               <a:rPr lang="pt-BR" smtClean="0"/>
-              <a:t>16/05/17 17:25</a:t>
+              <a:t>19/05/17 20:54</a:t>
             </a:fld>
             <a:endParaRPr dirty="0"/>
           </a:p>
@@ -5107,7 +5108,7 @@
             </a:pPr>
             <a:fld id="{0757E87C-D2DF-488F-9E80-55571E3CBFFF}" type="datetime8">
               <a:rPr lang="pt-BR" smtClean="0"/>
-              <a:t>16/05/17 17:25</a:t>
+              <a:t>19/05/17 20:54</a:t>
             </a:fld>
             <a:endParaRPr dirty="0"/>
           </a:p>
@@ -5527,7 +5528,7 @@
             </a:pPr>
             <a:fld id="{2FFAF354-6191-4676-8E11-5069FF5D5538}" type="datetime8">
               <a:rPr lang="pt-BR" smtClean="0"/>
-              <a:t>16/05/17 17:25</a:t>
+              <a:t>19/05/17 20:54</a:t>
             </a:fld>
             <a:endParaRPr dirty="0"/>
           </a:p>
@@ -6031,7 +6032,7 @@
             </a:pPr>
             <a:fld id="{B7448805-60D7-4724-BB7A-9A93CA05378D}" type="datetime8">
               <a:rPr lang="pt-BR" smtClean="0"/>
-              <a:t>16/05/17 17:25</a:t>
+              <a:t>19/05/17 20:54</a:t>
             </a:fld>
             <a:endParaRPr dirty="0"/>
           </a:p>
@@ -6332,7 +6333,7 @@
             </a:pPr>
             <a:fld id="{93F2A277-7C1A-46FF-AA34-6B2CD5FBE048}" type="datetime8">
               <a:rPr lang="pt-BR" smtClean="0"/>
-              <a:t>16/05/17 17:25</a:t>
+              <a:t>19/05/17 20:54</a:t>
             </a:fld>
             <a:endParaRPr dirty="0"/>
           </a:p>
@@ -6445,7 +6446,7 @@
             </a:pPr>
             <a:fld id="{DC897D33-8A33-48CD-951A-C6BBDD5283FC}" type="datetime8">
               <a:rPr lang="pt-BR" smtClean="0"/>
-              <a:t>16/05/17 17:25</a:t>
+              <a:t>19/05/17 20:54</a:t>
             </a:fld>
             <a:endParaRPr dirty="0"/>
           </a:p>
@@ -6887,7 +6888,7 @@
             </a:pPr>
             <a:fld id="{9EF91099-1E16-4723-967B-A578B15549A9}" type="datetime8">
               <a:rPr lang="pt-BR" smtClean="0"/>
-              <a:t>16/05/17 17:25</a:t>
+              <a:t>19/05/17 20:54</a:t>
             </a:fld>
             <a:endParaRPr dirty="0"/>
           </a:p>
@@ -7361,7 +7362,7 @@
             </a:pPr>
             <a:fld id="{ACA1465C-9880-4FF1-9AE4-4589E5B61984}" type="datetime8">
               <a:rPr lang="pt-BR" smtClean="0"/>
-              <a:t>16/05/17 17:25</a:t>
+              <a:t>19/05/17 20:54</a:t>
             </a:fld>
             <a:endParaRPr dirty="0"/>
           </a:p>
@@ -7639,7 +7640,7 @@
             </a:pPr>
             <a:fld id="{9D7D1D43-165F-4612-97C0-E1B15C5B01A4}" type="datetime8">
               <a:rPr lang="pt-BR" smtClean="0"/>
-              <a:t>16/05/17 17:25</a:t>
+              <a:t>19/05/17 20:54</a:t>
             </a:fld>
             <a:endParaRPr dirty="0"/>
           </a:p>
@@ -9266,11 +9267,7 @@
             </a:r>
             <a:r>
               <a:rPr lang="en-US" dirty="0" err="1" smtClean="0"/>
-              <a:t>Comunica</a:t>
-            </a:r>
-            <a:r>
-              <a:rPr lang="en-US" dirty="0" err="1" smtClean="0"/>
-              <a:t>ção</a:t>
+              <a:t>Comunicação</a:t>
             </a:r>
             <a:r>
               <a:rPr lang="en-US" dirty="0" smtClean="0"/>
@@ -9366,11 +9363,7 @@
             </a:r>
             <a:r>
               <a:rPr lang="en-US" dirty="0" err="1" smtClean="0"/>
-              <a:t>Comunica</a:t>
-            </a:r>
-            <a:r>
-              <a:rPr lang="en-US" dirty="0" err="1" smtClean="0"/>
-              <a:t>ção</a:t>
+              <a:t>Comunicação</a:t>
             </a:r>
             <a:r>
               <a:rPr lang="en-US" dirty="0" smtClean="0"/>
@@ -10184,10 +10177,15 @@
           <a:lstStyle/>
           <a:p>
             <a:pPr algn="just"/>
-            <a:r>
-              <a:rPr lang="pt-BR" dirty="0" smtClean="0"/>
-              <a:t>Processo de Negócio</a:t>
-            </a:r>
+            <a:endParaRPr lang="pt-BR" sz="2200" dirty="0"/>
+          </a:p>
+          <a:p>
+            <a:pPr lvl="1" algn="just"/>
+            <a:endParaRPr lang="pt-BR" dirty="0"/>
+          </a:p>
+          <a:p>
+            <a:pPr lvl="1" algn="just"/>
+            <a:endParaRPr lang="pt-BR" dirty="0" smtClean="0"/>
           </a:p>
           <a:p>
             <a:pPr lvl="1" algn="just"/>
@@ -10240,14 +10238,14 @@
       </p:sp>
       <p:pic>
         <p:nvPicPr>
-          <p:cNvPr id="5" name="Picture 4" descr="BPMCriptofrafado.png"/>
+          <p:cNvPr id="4" name="Picture 3" descr="DiagramaSequencia.png"/>
           <p:cNvPicPr>
             <a:picLocks noChangeAspect="1"/>
           </p:cNvPicPr>
           <p:nvPr/>
         </p:nvPicPr>
         <p:blipFill>
-          <a:blip r:embed="rId3">
+          <a:blip r:embed="rId2" cstate="print">
             <a:extLst>
               <a:ext uri="{28A0092B-C50C-407E-A947-70E740481C1C}">
                 <a14:useLocalDpi xmlns:a14="http://schemas.microsoft.com/office/drawing/2010/main" val="0"/>
@@ -10260,8 +10258,8 @@
         </p:blipFill>
         <p:spPr>
           <a:xfrm>
-            <a:off x="179512" y="2132856"/>
-            <a:ext cx="8964488" cy="4464496"/>
+            <a:off x="827584" y="1268760"/>
+            <a:ext cx="7317416" cy="5517232"/>
           </a:xfrm>
           <a:prstGeom prst="rect">
             <a:avLst/>
@@ -10271,7 +10269,7 @@
     </p:spTree>
     <p:extLst>
       <p:ext uri="{BB962C8B-B14F-4D97-AF65-F5344CB8AC3E}">
-        <p14:creationId xmlns:p14="http://schemas.microsoft.com/office/powerpoint/2010/main" val="1998096010"/>
+        <p14:creationId xmlns:p14="http://schemas.microsoft.com/office/powerpoint/2010/main" val="2645176961"/>
       </p:ext>
     </p:extLst>
   </p:cSld>
@@ -10327,7 +10325,7 @@
           <a:p>
             <a:r>
               <a:rPr lang="pt-BR" altLang="pt-BR" dirty="0" smtClean="0"/>
-              <a:t>Avaliação da Plataforma</a:t>
+              <a:t>Plataforma I9VANET</a:t>
             </a:r>
             <a:endParaRPr altLang="pt-BR" sz="2400" dirty="0"/>
           </a:p>
@@ -10345,7 +10343,7 @@
         </p:nvSpPr>
         <p:spPr bwMode="auto">
           <a:xfrm>
-            <a:off x="285720" y="1625280"/>
+            <a:off x="285720" y="1600200"/>
             <a:ext cx="8480455" cy="4972072"/>
           </a:xfrm>
         </p:spPr>
@@ -10354,166 +10352,27 @@
             <a:prstTxWarp prst="textNoShape">
               <a:avLst/>
             </a:prstTxWarp>
-            <a:normAutofit fontScale="92500"/>
+            <a:normAutofit/>
           </a:bodyPr>
           <a:lstStyle/>
           <a:p>
             <a:pPr algn="just"/>
             <a:r>
               <a:rPr lang="pt-BR" dirty="0" smtClean="0"/>
-              <a:t>Definição</a:t>
-            </a:r>
-          </a:p>
-          <a:p>
-            <a:pPr lvl="1" algn="just"/>
-            <a:r>
-              <a:rPr lang="pt-BR" dirty="0"/>
-              <a:t>Analisar a plataforma I9VANET sob a o </a:t>
-            </a:r>
-            <a:r>
-              <a:rPr lang="pt-BR" dirty="0" smtClean="0"/>
-              <a:t>ótica </a:t>
-            </a:r>
-            <a:r>
-              <a:rPr lang="pt-BR" dirty="0"/>
-              <a:t>da </a:t>
-            </a:r>
-            <a:r>
-              <a:rPr lang="pt-BR" dirty="0" smtClean="0"/>
-              <a:t>eficácia </a:t>
-            </a:r>
-            <a:r>
-              <a:rPr lang="pt-BR" dirty="0"/>
-              <a:t>e </a:t>
-            </a:r>
-            <a:r>
-              <a:rPr lang="pt-BR" dirty="0" smtClean="0"/>
-              <a:t>eficiência</a:t>
-            </a:r>
-            <a:r>
-              <a:rPr lang="pt-BR" dirty="0"/>
-              <a:t>. </a:t>
-            </a:r>
-            <a:endParaRPr lang="pt-BR" dirty="0" smtClean="0"/>
-          </a:p>
-          <a:p>
-            <a:pPr algn="just"/>
-            <a:r>
-              <a:rPr lang="pt-BR" dirty="0" smtClean="0"/>
-              <a:t>Planejamento</a:t>
-            </a:r>
-            <a:endParaRPr lang="pt-BR" dirty="0"/>
-          </a:p>
-          <a:p>
-            <a:pPr lvl="1" algn="just"/>
-            <a:r>
-              <a:rPr lang="pt-BR" dirty="0"/>
-              <a:t>O experimento tem como alvo, os desenvolvedores de </a:t>
-            </a:r>
-            <a:r>
-              <a:rPr lang="pt-BR" dirty="0" smtClean="0"/>
-              <a:t>soluções </a:t>
-            </a:r>
-            <a:r>
-              <a:rPr lang="pt-BR" dirty="0"/>
-              <a:t>que visam melhorar a mobilidade urbana com o uso de </a:t>
-            </a:r>
-            <a:r>
-              <a:rPr lang="pt-BR" dirty="0" err="1"/>
-              <a:t>VANETs</a:t>
-            </a:r>
-            <a:r>
-              <a:rPr lang="pt-BR" dirty="0" smtClean="0"/>
-              <a:t>.</a:t>
-            </a:r>
-          </a:p>
-          <a:p>
-            <a:pPr algn="just"/>
-            <a:r>
-              <a:rPr lang="pt-BR" dirty="0" smtClean="0"/>
-              <a:t>Métricas</a:t>
-            </a:r>
-          </a:p>
-          <a:p>
-            <a:pPr lvl="1"/>
-            <a:r>
-              <a:rPr lang="en-US" dirty="0" smtClean="0"/>
-              <a:t>N</a:t>
-            </a:r>
-            <a:r>
-              <a:rPr lang="pt-BR" dirty="0" smtClean="0"/>
-              <a:t>úmero </a:t>
-            </a:r>
-            <a:r>
-              <a:rPr lang="pt-BR" dirty="0"/>
-              <a:t>Total de </a:t>
-            </a:r>
-            <a:r>
-              <a:rPr lang="pt-BR" dirty="0" smtClean="0"/>
-              <a:t>requisições </a:t>
-            </a:r>
-            <a:r>
-              <a:rPr lang="pt-BR" dirty="0"/>
-              <a:t>por min (TR/min); </a:t>
-            </a:r>
-          </a:p>
-          <a:p>
-            <a:pPr lvl="1"/>
-            <a:r>
-              <a:rPr lang="pt-BR" dirty="0" smtClean="0"/>
-              <a:t>Tempo </a:t>
-            </a:r>
-            <a:r>
-              <a:rPr lang="pt-BR" dirty="0"/>
-              <a:t>de </a:t>
-            </a:r>
-            <a:r>
-              <a:rPr lang="pt-BR" dirty="0" smtClean="0"/>
-              <a:t>latência </a:t>
-            </a:r>
-            <a:r>
-              <a:rPr lang="pt-BR" dirty="0"/>
-              <a:t>da </a:t>
-            </a:r>
-            <a:r>
-              <a:rPr lang="pt-BR" dirty="0" smtClean="0"/>
-              <a:t>comunicação </a:t>
-            </a:r>
-            <a:r>
-              <a:rPr lang="pt-BR" dirty="0"/>
-              <a:t>(</a:t>
-            </a:r>
-            <a:r>
-              <a:rPr lang="pt-BR" dirty="0" err="1"/>
-              <a:t>Lat</a:t>
-            </a:r>
-            <a:r>
-              <a:rPr lang="pt-BR" dirty="0"/>
-              <a:t>); </a:t>
-            </a:r>
-          </a:p>
-          <a:p>
-            <a:pPr lvl="1"/>
-            <a:r>
-              <a:rPr lang="pt-BR" dirty="0" smtClean="0"/>
-              <a:t>Tempo </a:t>
-            </a:r>
-            <a:r>
-              <a:rPr lang="pt-BR" dirty="0"/>
-              <a:t>de processamento de cada </a:t>
-            </a:r>
-            <a:r>
-              <a:rPr lang="pt-BR" dirty="0" smtClean="0"/>
-              <a:t>requisição </a:t>
-            </a:r>
-            <a:r>
-              <a:rPr lang="pt-BR" dirty="0"/>
-              <a:t>no servidor (PT) </a:t>
+              <a:t>Processo de Negócio</a:t>
             </a:r>
           </a:p>
           <a:p>
             <a:pPr lvl="1" algn="just"/>
             <a:endParaRPr lang="pt-BR" dirty="0" smtClean="0"/>
+          </a:p>
+          <a:p>
+            <a:pPr algn="just">
+              <a:lnSpc>
+                <a:spcPct val="150000"/>
+              </a:lnSpc>
+            </a:pPr>
+            <a:endParaRPr b="1" i="1" u="sng" dirty="0" smtClean="0"/>
           </a:p>
           <a:p>
             <a:pPr marL="366713" lvl="1" indent="0" algn="just">
@@ -10528,7 +10387,7 @@
       </p:sp>
       <p:sp>
         <p:nvSpPr>
-          <p:cNvPr id="4" name="Espaço Reservado para Número de Slide 3"/>
+          <p:cNvPr id="2" name="Espaço Reservado para Número de Slide 1"/>
           <p:cNvSpPr>
             <a:spLocks noGrp="1"/>
           </p:cNvSpPr>
@@ -10552,10 +10411,40 @@
           </a:p>
         </p:txBody>
       </p:sp>
+      <p:pic>
+        <p:nvPicPr>
+          <p:cNvPr id="5" name="Picture 4" descr="BPMCriptofrafado.png"/>
+          <p:cNvPicPr>
+            <a:picLocks noChangeAspect="1"/>
+          </p:cNvPicPr>
+          <p:nvPr/>
+        </p:nvPicPr>
+        <p:blipFill>
+          <a:blip r:embed="rId3">
+            <a:extLst>
+              <a:ext uri="{28A0092B-C50C-407E-A947-70E740481C1C}">
+                <a14:useLocalDpi xmlns:a14="http://schemas.microsoft.com/office/drawing/2010/main" val="0"/>
+              </a:ext>
+            </a:extLst>
+          </a:blip>
+          <a:stretch>
+            <a:fillRect/>
+          </a:stretch>
+        </p:blipFill>
+        <p:spPr>
+          <a:xfrm>
+            <a:off x="179512" y="2132856"/>
+            <a:ext cx="8964488" cy="4464496"/>
+          </a:xfrm>
+          <a:prstGeom prst="rect">
+            <a:avLst/>
+          </a:prstGeom>
+        </p:spPr>
+      </p:pic>
     </p:spTree>
     <p:extLst>
       <p:ext uri="{BB962C8B-B14F-4D97-AF65-F5344CB8AC3E}">
-        <p14:creationId xmlns:p14="http://schemas.microsoft.com/office/powerpoint/2010/main" val="1607558485"/>
+        <p14:creationId xmlns:p14="http://schemas.microsoft.com/office/powerpoint/2010/main" val="1998096010"/>
       </p:ext>
     </p:extLst>
   </p:cSld>
@@ -10638,56 +10527,165 @@
             <a:prstTxWarp prst="textNoShape">
               <a:avLst/>
             </a:prstTxWarp>
-            <a:normAutofit/>
+            <a:normAutofit fontScale="92500"/>
           </a:bodyPr>
           <a:lstStyle/>
           <a:p>
             <a:pPr algn="just"/>
             <a:r>
               <a:rPr lang="pt-BR" dirty="0" smtClean="0"/>
-              <a:t>Cenário 1</a:t>
+              <a:t>Definição</a:t>
             </a:r>
           </a:p>
           <a:p>
             <a:pPr lvl="1" algn="just"/>
             <a:r>
+              <a:rPr lang="pt-BR" dirty="0"/>
+              <a:t>Analisar a plataforma I9VANET sob a o </a:t>
+            </a:r>
+            <a:r>
               <a:rPr lang="pt-BR" dirty="0" smtClean="0"/>
-              <a:t>Quantidade de veículos: 50,100, 200 e 400</a:t>
-            </a:r>
+              <a:t>ótica </a:t>
+            </a:r>
+            <a:r>
+              <a:rPr lang="pt-BR" dirty="0"/>
+              <a:t>da </a:t>
+            </a:r>
+            <a:r>
+              <a:rPr lang="pt-BR" dirty="0" smtClean="0"/>
+              <a:t>eficácia </a:t>
+            </a:r>
+            <a:r>
+              <a:rPr lang="pt-BR" dirty="0"/>
+              <a:t>e </a:t>
+            </a:r>
+            <a:r>
+              <a:rPr lang="pt-BR" dirty="0" smtClean="0"/>
+              <a:t>eficiência</a:t>
+            </a:r>
+            <a:r>
+              <a:rPr lang="pt-BR" dirty="0"/>
+              <a:t>. </a:t>
+            </a:r>
+            <a:endParaRPr lang="pt-BR" dirty="0" smtClean="0"/>
+          </a:p>
+          <a:p>
+            <a:pPr algn="just"/>
+            <a:r>
+              <a:rPr lang="pt-BR" dirty="0" smtClean="0"/>
+              <a:t>Planejamento</a:t>
+            </a:r>
+            <a:endParaRPr lang="pt-BR" dirty="0"/>
           </a:p>
           <a:p>
             <a:pPr lvl="1" algn="just"/>
             <a:r>
+              <a:rPr lang="pt-BR" dirty="0"/>
+              <a:t>O experimento tem como alvo, os desenvolvedores de </a:t>
+            </a:r>
+            <a:r>
               <a:rPr lang="pt-BR" dirty="0" smtClean="0"/>
-              <a:t>Velocidades utilizadas: 2G, 3G, 4G e 5G</a:t>
+              <a:t>soluções </a:t>
+            </a:r>
+            <a:r>
+              <a:rPr lang="pt-BR" dirty="0"/>
+              <a:t>que visam melhorar a mobilidade urbana com o uso de </a:t>
+            </a:r>
+            <a:r>
+              <a:rPr lang="pt-BR" dirty="0" err="1"/>
+              <a:t>VANETs</a:t>
+            </a:r>
+            <a:r>
+              <a:rPr lang="pt-BR" dirty="0" smtClean="0"/>
+              <a:t>.</a:t>
             </a:r>
           </a:p>
           <a:p>
             <a:pPr algn="just"/>
             <a:r>
               <a:rPr lang="pt-BR" dirty="0" smtClean="0"/>
-              <a:t>Cenário 2</a:t>
+              <a:t>Métricas</a:t>
+            </a:r>
+          </a:p>
+          <a:p>
+            <a:pPr lvl="1"/>
+            <a:r>
+              <a:rPr lang="en-US" dirty="0" smtClean="0"/>
+              <a:t>N</a:t>
+            </a:r>
+            <a:r>
+              <a:rPr lang="pt-BR" dirty="0" smtClean="0"/>
+              <a:t>úmero </a:t>
+            </a:r>
+            <a:r>
+              <a:rPr lang="pt-BR" dirty="0"/>
+              <a:t>Total de </a:t>
+            </a:r>
+            <a:r>
+              <a:rPr lang="pt-BR" dirty="0" smtClean="0"/>
+              <a:t>requisições </a:t>
+            </a:r>
+            <a:r>
+              <a:rPr lang="pt-BR" dirty="0"/>
+              <a:t>por min (TR/min); </a:t>
+            </a:r>
+          </a:p>
+          <a:p>
+            <a:pPr lvl="1"/>
+            <a:r>
+              <a:rPr lang="pt-BR" dirty="0" smtClean="0"/>
+              <a:t>Tempo </a:t>
+            </a:r>
+            <a:r>
+              <a:rPr lang="pt-BR" dirty="0"/>
+              <a:t>de </a:t>
+            </a:r>
+            <a:r>
+              <a:rPr lang="pt-BR" dirty="0" smtClean="0"/>
+              <a:t>latência </a:t>
+            </a:r>
+            <a:r>
+              <a:rPr lang="pt-BR" dirty="0"/>
+              <a:t>da </a:t>
+            </a:r>
+            <a:r>
+              <a:rPr lang="pt-BR" dirty="0" smtClean="0"/>
+              <a:t>comunicação </a:t>
+            </a:r>
+            <a:r>
+              <a:rPr lang="pt-BR" dirty="0"/>
+              <a:t>(</a:t>
+            </a:r>
+            <a:r>
+              <a:rPr lang="pt-BR" dirty="0" err="1"/>
+              <a:t>Lat</a:t>
+            </a:r>
+            <a:r>
+              <a:rPr lang="pt-BR" dirty="0"/>
+              <a:t>); </a:t>
+            </a:r>
+          </a:p>
+          <a:p>
+            <a:pPr lvl="1"/>
+            <a:r>
+              <a:rPr lang="pt-BR" dirty="0" smtClean="0"/>
+              <a:t>Tempo </a:t>
+            </a:r>
+            <a:r>
+              <a:rPr lang="pt-BR" dirty="0"/>
+              <a:t>de processamento de cada </a:t>
+            </a:r>
+            <a:r>
+              <a:rPr lang="pt-BR" dirty="0" smtClean="0"/>
+              <a:t>requisição </a:t>
+            </a:r>
+            <a:r>
+              <a:rPr lang="pt-BR" dirty="0"/>
+              <a:t>no servidor (PT) </a:t>
             </a:r>
           </a:p>
           <a:p>
             <a:pPr lvl="1" algn="just"/>
-            <a:r>
-              <a:rPr lang="pt-BR" dirty="0" smtClean="0"/>
-              <a:t>Quantidade de veículos: 800  e 1600</a:t>
-            </a:r>
-          </a:p>
-          <a:p>
-            <a:pPr lvl="1" algn="just"/>
-            <a:r>
-              <a:rPr lang="pt-BR" dirty="0" smtClean="0"/>
-              <a:t>Velocidade utilizada: sem limite</a:t>
-            </a:r>
-            <a:endParaRPr lang="pt-BR" dirty="0"/>
-          </a:p>
-          <a:p>
-            <a:pPr marL="366713" lvl="1" indent="0" algn="just">
-              <a:buNone/>
-            </a:pPr>
             <a:endParaRPr lang="pt-BR" dirty="0" smtClean="0"/>
           </a:p>
           <a:p>
@@ -10730,7 +10728,7 @@
     </p:spTree>
     <p:extLst>
       <p:ext uri="{BB962C8B-B14F-4D97-AF65-F5344CB8AC3E}">
-        <p14:creationId xmlns:p14="http://schemas.microsoft.com/office/powerpoint/2010/main" val="4004983554"/>
+        <p14:creationId xmlns:p14="http://schemas.microsoft.com/office/powerpoint/2010/main" val="1607558485"/>
       </p:ext>
     </p:extLst>
   </p:cSld>
@@ -10804,7 +10802,7 @@
         </p:nvSpPr>
         <p:spPr bwMode="auto">
           <a:xfrm>
-            <a:off x="268009" y="1553272"/>
+            <a:off x="285720" y="1625280"/>
             <a:ext cx="8480455" cy="4972072"/>
           </a:xfrm>
         </p:spPr>
@@ -10819,18 +10817,51 @@
           <a:p>
             <a:pPr algn="just"/>
             <a:r>
-              <a:rPr lang="pt-BR" u="sng" dirty="0" smtClean="0"/>
+              <a:rPr lang="pt-BR" dirty="0" smtClean="0"/>
               <a:t>Cenário 1</a:t>
             </a:r>
           </a:p>
           <a:p>
-            <a:pPr marL="0" indent="0" algn="just">
-              <a:lnSpc>
-                <a:spcPct val="150000"/>
-              </a:lnSpc>
+            <a:pPr lvl="1" algn="just"/>
+            <a:r>
+              <a:rPr lang="pt-BR" dirty="0" smtClean="0"/>
+              <a:t>Quantidade de veículos: 50,100, 200 e 400</a:t>
+            </a:r>
+          </a:p>
+          <a:p>
+            <a:pPr lvl="1" algn="just"/>
+            <a:r>
+              <a:rPr lang="pt-BR" dirty="0" smtClean="0"/>
+              <a:t>Velocidades utilizadas: 2G, 3G, 4G e 5G</a:t>
+            </a:r>
+          </a:p>
+          <a:p>
+            <a:pPr algn="just"/>
+            <a:r>
+              <a:rPr lang="pt-BR" dirty="0" smtClean="0"/>
+              <a:t>Cenário 2</a:t>
+            </a:r>
+          </a:p>
+          <a:p>
+            <a:pPr lvl="1" algn="just"/>
+            <a:r>
+              <a:rPr lang="pt-BR" dirty="0" smtClean="0"/>
+              <a:t>Quantidade de veículos: 800  e 1600</a:t>
+            </a:r>
+          </a:p>
+          <a:p>
+            <a:pPr lvl="1" algn="just"/>
+            <a:r>
+              <a:rPr lang="pt-BR" dirty="0" smtClean="0"/>
+              <a:t>Velocidade utilizada: sem limite</a:t>
+            </a:r>
+            <a:endParaRPr lang="pt-BR" dirty="0"/>
+          </a:p>
+          <a:p>
+            <a:pPr marL="366713" lvl="1" indent="0" algn="just">
               <a:buNone/>
             </a:pPr>
-            <a:endParaRPr b="1" i="1" u="sng" dirty="0" smtClean="0"/>
+            <a:endParaRPr lang="pt-BR" dirty="0" smtClean="0"/>
           </a:p>
           <a:p>
             <a:pPr marL="366713" lvl="1" indent="0" algn="just">
@@ -10869,40 +10900,10 @@
           </a:p>
         </p:txBody>
       </p:sp>
-      <p:pic>
-        <p:nvPicPr>
-          <p:cNvPr id="8" name="Picture 7" descr="AmbienteTeste.png"/>
-          <p:cNvPicPr>
-            <a:picLocks noChangeAspect="1"/>
-          </p:cNvPicPr>
-          <p:nvPr/>
-        </p:nvPicPr>
-        <p:blipFill>
-          <a:blip r:embed="rId3">
-            <a:extLst>
-              <a:ext uri="{28A0092B-C50C-407E-A947-70E740481C1C}">
-                <a14:useLocalDpi xmlns:a14="http://schemas.microsoft.com/office/drawing/2010/main" val="0"/>
-              </a:ext>
-            </a:extLst>
-          </a:blip>
-          <a:stretch>
-            <a:fillRect/>
-          </a:stretch>
-        </p:blipFill>
-        <p:spPr>
-          <a:xfrm>
-            <a:off x="251009" y="2060848"/>
-            <a:ext cx="8713479" cy="4608512"/>
-          </a:xfrm>
-          <a:prstGeom prst="rect">
-            <a:avLst/>
-          </a:prstGeom>
-        </p:spPr>
-      </p:pic>
     </p:spTree>
     <p:extLst>
       <p:ext uri="{BB962C8B-B14F-4D97-AF65-F5344CB8AC3E}">
-        <p14:creationId xmlns:p14="http://schemas.microsoft.com/office/powerpoint/2010/main" val="1062110240"/>
+        <p14:creationId xmlns:p14="http://schemas.microsoft.com/office/powerpoint/2010/main" val="4004983554"/>
       </p:ext>
     </p:extLst>
   </p:cSld>
@@ -10992,14 +10993,7 @@
             <a:pPr algn="just"/>
             <a:r>
               <a:rPr lang="pt-BR" u="sng" dirty="0" smtClean="0"/>
-              <a:t>Cenário 2</a:t>
-            </a:r>
-          </a:p>
-          <a:p>
-            <a:pPr lvl="1" algn="just"/>
-            <a:r>
-              <a:rPr lang="pt-BR" u="sng" dirty="0" smtClean="0"/>
-              <a:t>Uso de threads para simular cada veículo.</a:t>
+              <a:t>Cenário 1</a:t>
             </a:r>
           </a:p>
           <a:p>
@@ -11048,10 +11042,40 @@
           </a:p>
         </p:txBody>
       </p:sp>
+      <p:pic>
+        <p:nvPicPr>
+          <p:cNvPr id="8" name="Picture 7" descr="AmbienteTeste.png"/>
+          <p:cNvPicPr>
+            <a:picLocks noChangeAspect="1"/>
+          </p:cNvPicPr>
+          <p:nvPr/>
+        </p:nvPicPr>
+        <p:blipFill>
+          <a:blip r:embed="rId3">
+            <a:extLst>
+              <a:ext uri="{28A0092B-C50C-407E-A947-70E740481C1C}">
+                <a14:useLocalDpi xmlns:a14="http://schemas.microsoft.com/office/drawing/2010/main" val="0"/>
+              </a:ext>
+            </a:extLst>
+          </a:blip>
+          <a:stretch>
+            <a:fillRect/>
+          </a:stretch>
+        </p:blipFill>
+        <p:spPr>
+          <a:xfrm>
+            <a:off x="251009" y="2060848"/>
+            <a:ext cx="8713479" cy="4608512"/>
+          </a:xfrm>
+          <a:prstGeom prst="rect">
+            <a:avLst/>
+          </a:prstGeom>
+        </p:spPr>
+      </p:pic>
     </p:spTree>
     <p:extLst>
       <p:ext uri="{BB962C8B-B14F-4D97-AF65-F5344CB8AC3E}">
-        <p14:creationId xmlns:p14="http://schemas.microsoft.com/office/powerpoint/2010/main" val="3682391343"/>
+        <p14:creationId xmlns:p14="http://schemas.microsoft.com/office/powerpoint/2010/main" val="1062110240"/>
       </p:ext>
     </p:extLst>
   </p:cSld>
@@ -11107,7 +11131,7 @@
           <a:p>
             <a:r>
               <a:rPr lang="pt-BR" altLang="pt-BR" dirty="0" smtClean="0"/>
-              <a:t>Análise dos Resultados</a:t>
+              <a:t>Avaliação da Plataforma</a:t>
             </a:r>
             <a:endParaRPr altLang="pt-BR" sz="2400" dirty="0"/>
           </a:p>
@@ -11125,7 +11149,7 @@
         </p:nvSpPr>
         <p:spPr bwMode="auto">
           <a:xfrm>
-            <a:off x="285720" y="1600200"/>
+            <a:off x="268009" y="1553272"/>
             <a:ext cx="8480455" cy="4972072"/>
           </a:xfrm>
         </p:spPr>
@@ -11140,22 +11164,23 @@
           <a:p>
             <a:pPr algn="just"/>
             <a:r>
-              <a:rPr lang="pt-BR" dirty="0" smtClean="0"/>
-              <a:t>Consumo por Link (Cenário 1)</a:t>
-            </a:r>
-            <a:endParaRPr u="sng" dirty="0" smtClean="0"/>
-          </a:p>
-          <a:p>
-            <a:pPr marL="366713" lvl="1" indent="0" algn="just">
-              <a:buNone/>
-            </a:pPr>
-            <a:endParaRPr lang="pt-BR" dirty="0" smtClean="0"/>
-          </a:p>
-          <a:p>
-            <a:pPr algn="just">
+              <a:rPr lang="pt-BR" u="sng" dirty="0" smtClean="0"/>
+              <a:t>Cenário 2</a:t>
+            </a:r>
+          </a:p>
+          <a:p>
+            <a:pPr lvl="1" algn="just"/>
+            <a:r>
+              <a:rPr lang="pt-BR" u="sng" dirty="0" smtClean="0"/>
+              <a:t>Uso de threads para simular cada veículo.</a:t>
+            </a:r>
+          </a:p>
+          <a:p>
+            <a:pPr marL="0" indent="0" algn="just">
               <a:lnSpc>
                 <a:spcPct val="150000"/>
               </a:lnSpc>
+              <a:buNone/>
             </a:pPr>
             <a:endParaRPr b="1" i="1" u="sng" dirty="0" smtClean="0"/>
           </a:p>
@@ -11196,40 +11221,10 @@
           </a:p>
         </p:txBody>
       </p:sp>
-      <p:pic>
-        <p:nvPicPr>
-          <p:cNvPr id="5" name="Picture 4" descr="capacidadeLink.png"/>
-          <p:cNvPicPr>
-            <a:picLocks noChangeAspect="1"/>
-          </p:cNvPicPr>
-          <p:nvPr/>
-        </p:nvPicPr>
-        <p:blipFill>
-          <a:blip r:embed="rId3">
-            <a:extLst>
-              <a:ext uri="{28A0092B-C50C-407E-A947-70E740481C1C}">
-                <a14:useLocalDpi xmlns:a14="http://schemas.microsoft.com/office/drawing/2010/main" val="0"/>
-              </a:ext>
-            </a:extLst>
-          </a:blip>
-          <a:stretch>
-            <a:fillRect/>
-          </a:stretch>
-        </p:blipFill>
-        <p:spPr>
-          <a:xfrm>
-            <a:off x="899592" y="2129672"/>
-            <a:ext cx="6096000" cy="4572000"/>
-          </a:xfrm>
-          <a:prstGeom prst="rect">
-            <a:avLst/>
-          </a:prstGeom>
-        </p:spPr>
-      </p:pic>
     </p:spTree>
     <p:extLst>
       <p:ext uri="{BB962C8B-B14F-4D97-AF65-F5344CB8AC3E}">
-        <p14:creationId xmlns:p14="http://schemas.microsoft.com/office/powerpoint/2010/main" val="2960202533"/>
+        <p14:creationId xmlns:p14="http://schemas.microsoft.com/office/powerpoint/2010/main" val="3682391343"/>
       </p:ext>
     </p:extLst>
   </p:cSld>
@@ -11367,9 +11362,6 @@
               </a:rPr>
               <a:t>Problema de Pesquisa</a:t>
             </a:r>
-            <a:endParaRPr lang="pt-BR" altLang="pt-BR" sz="2800" dirty="0" smtClean="0">
-              <a:latin typeface="Calibri" pitchFamily="34" charset="0"/>
-            </a:endParaRPr>
           </a:p>
           <a:p>
             <a:pPr marL="400050" indent="-400050" eaLnBrk="1" hangingPunct="1">
@@ -11445,23 +11437,8 @@
               <a:rPr lang="pt-BR" altLang="pt-BR" sz="2800" dirty="0" smtClean="0">
                 <a:latin typeface="Calibri" pitchFamily="34" charset="0"/>
               </a:rPr>
-              <a:t>Conclusões </a:t>
-            </a:r>
-            <a:r>
-              <a:rPr lang="pt-BR" altLang="pt-BR" sz="2800" dirty="0" smtClean="0">
-                <a:latin typeface="Calibri" pitchFamily="34" charset="0"/>
-              </a:rPr>
-              <a:t>e Trabalhos Futuros</a:t>
-            </a:r>
-            <a:r>
-              <a:rPr lang="pt-BR" altLang="pt-BR" sz="2800" dirty="0" smtClean="0">
-                <a:latin typeface="Calibri" pitchFamily="34" charset="0"/>
-              </a:rPr>
-              <a:t>;</a:t>
-            </a:r>
-            <a:endParaRPr lang="pt-BR" altLang="pt-BR" sz="2800" dirty="0" smtClean="0">
-              <a:latin typeface="Calibri" pitchFamily="34" charset="0"/>
-            </a:endParaRPr>
+              <a:t>Conclusões e Trabalhos Futuros;</a:t>
+            </a:r>
           </a:p>
           <a:p>
             <a:pPr marL="400050" indent="-400050" eaLnBrk="1" hangingPunct="1">
@@ -11494,17 +11471,8 @@
               <a:rPr lang="pt-BR" altLang="pt-BR" sz="2800" dirty="0" smtClean="0">
                 <a:latin typeface="Calibri" pitchFamily="34" charset="0"/>
               </a:rPr>
-              <a:t>Refer</a:t>
-            </a:r>
-            <a:r>
-              <a:rPr lang="pt-BR" altLang="pt-BR" sz="2800" dirty="0" smtClean="0">
-                <a:latin typeface="Calibri" pitchFamily="34" charset="0"/>
-              </a:rPr>
-              <a:t>ências</a:t>
-            </a:r>
-            <a:endParaRPr lang="pt-BR" altLang="pt-BR" sz="2800" dirty="0" smtClean="0">
-              <a:latin typeface="Calibri" pitchFamily="34" charset="0"/>
-            </a:endParaRPr>
+              <a:t>Referências</a:t>
+            </a:r>
           </a:p>
           <a:p>
             <a:pPr marL="0" indent="0" eaLnBrk="1" hangingPunct="1">
@@ -11668,11 +11636,7 @@
             <a:pPr algn="just"/>
             <a:r>
               <a:rPr lang="pt-BR" dirty="0" smtClean="0"/>
-              <a:t>Tempos Médios das Requisições por Link </a:t>
-            </a:r>
-            <a:r>
-              <a:rPr lang="pt-BR" dirty="0"/>
-              <a:t>(Cenário 1)</a:t>
+              <a:t>Consumo por Link (Cenário 1)</a:t>
             </a:r>
             <a:endParaRPr u="sng" dirty="0" smtClean="0"/>
           </a:p>
@@ -11729,7 +11693,7 @@
       </p:sp>
       <p:pic>
         <p:nvPicPr>
-          <p:cNvPr id="2" name="Picture 1" descr="grafico_tempo_medio.png"/>
+          <p:cNvPr id="5" name="Picture 4" descr="capacidadeLink.png"/>
           <p:cNvPicPr>
             <a:picLocks noChangeAspect="1"/>
           </p:cNvPicPr>
@@ -11749,7 +11713,7 @@
         </p:blipFill>
         <p:spPr>
           <a:xfrm>
-            <a:off x="1403648" y="2132856"/>
+            <a:off x="899592" y="2129672"/>
             <a:ext cx="6096000" cy="4572000"/>
           </a:xfrm>
           <a:prstGeom prst="rect">
@@ -11760,7 +11724,7 @@
     </p:spTree>
     <p:extLst>
       <p:ext uri="{BB962C8B-B14F-4D97-AF65-F5344CB8AC3E}">
-        <p14:creationId xmlns:p14="http://schemas.microsoft.com/office/powerpoint/2010/main" val="2205366292"/>
+        <p14:creationId xmlns:p14="http://schemas.microsoft.com/office/powerpoint/2010/main" val="2960202533"/>
       </p:ext>
     </p:extLst>
   </p:cSld>
@@ -11850,7 +11814,7 @@
             <a:pPr algn="just"/>
             <a:r>
               <a:rPr lang="pt-BR" dirty="0" smtClean="0"/>
-              <a:t>Coeficiente de Variação </a:t>
+              <a:t>Tempos Médios das Requisições por Link </a:t>
             </a:r>
             <a:r>
               <a:rPr lang="pt-BR" dirty="0"/>
@@ -11911,7 +11875,7 @@
       </p:sp>
       <p:pic>
         <p:nvPicPr>
-          <p:cNvPr id="3" name="Picture 2" descr="grafico_coeficiente_variacao_geral.png"/>
+          <p:cNvPr id="2" name="Picture 1" descr="grafico_tempo_medio.png"/>
           <p:cNvPicPr>
             <a:picLocks noChangeAspect="1"/>
           </p:cNvPicPr>
@@ -11942,7 +11906,7 @@
     </p:spTree>
     <p:extLst>
       <p:ext uri="{BB962C8B-B14F-4D97-AF65-F5344CB8AC3E}">
-        <p14:creationId xmlns:p14="http://schemas.microsoft.com/office/powerpoint/2010/main" val="3495718700"/>
+        <p14:creationId xmlns:p14="http://schemas.microsoft.com/office/powerpoint/2010/main" val="2205366292"/>
       </p:ext>
     </p:extLst>
   </p:cSld>
@@ -12032,23 +11996,11 @@
             <a:pPr algn="just"/>
             <a:r>
               <a:rPr lang="pt-BR" dirty="0" smtClean="0"/>
-              <a:t>Tempos </a:t>
+              <a:t>Coeficiente de Variação </a:t>
             </a:r>
             <a:r>
               <a:rPr lang="pt-BR" dirty="0"/>
-              <a:t>Médios das Requisições</a:t>
-            </a:r>
-            <a:r>
-              <a:rPr lang="pt-BR" dirty="0" smtClean="0"/>
-              <a:t> </a:t>
-            </a:r>
-            <a:r>
-              <a:rPr lang="pt-BR" dirty="0"/>
-              <a:t>(Cenário </a:t>
-            </a:r>
-            <a:r>
-              <a:rPr lang="pt-BR" dirty="0" smtClean="0"/>
-              <a:t>2)</a:t>
+              <a:t>(Cenário 1)</a:t>
             </a:r>
             <a:endParaRPr u="sng" dirty="0" smtClean="0"/>
           </a:p>
@@ -12103,10 +12055,40 @@
           </a:p>
         </p:txBody>
       </p:sp>
+      <p:pic>
+        <p:nvPicPr>
+          <p:cNvPr id="3" name="Picture 2" descr="grafico_coeficiente_variacao_geral.png"/>
+          <p:cNvPicPr>
+            <a:picLocks noChangeAspect="1"/>
+          </p:cNvPicPr>
+          <p:nvPr/>
+        </p:nvPicPr>
+        <p:blipFill>
+          <a:blip r:embed="rId3">
+            <a:extLst>
+              <a:ext uri="{28A0092B-C50C-407E-A947-70E740481C1C}">
+                <a14:useLocalDpi xmlns:a14="http://schemas.microsoft.com/office/drawing/2010/main" val="0"/>
+              </a:ext>
+            </a:extLst>
+          </a:blip>
+          <a:stretch>
+            <a:fillRect/>
+          </a:stretch>
+        </p:blipFill>
+        <p:spPr>
+          <a:xfrm>
+            <a:off x="1403648" y="2132856"/>
+            <a:ext cx="6096000" cy="4572000"/>
+          </a:xfrm>
+          <a:prstGeom prst="rect">
+            <a:avLst/>
+          </a:prstGeom>
+        </p:spPr>
+      </p:pic>
     </p:spTree>
     <p:extLst>
       <p:ext uri="{BB962C8B-B14F-4D97-AF65-F5344CB8AC3E}">
-        <p14:creationId xmlns:p14="http://schemas.microsoft.com/office/powerpoint/2010/main" val="1749404914"/>
+        <p14:creationId xmlns:p14="http://schemas.microsoft.com/office/powerpoint/2010/main" val="3495718700"/>
       </p:ext>
     </p:extLst>
   </p:cSld>
@@ -12196,23 +12178,23 @@
             <a:pPr algn="just"/>
             <a:r>
               <a:rPr lang="pt-BR" dirty="0" smtClean="0"/>
-              <a:t>Processamento (</a:t>
+              <a:t>Tempos </a:t>
             </a:r>
             <a:r>
               <a:rPr lang="pt-BR" dirty="0"/>
-              <a:t>Cenário </a:t>
+              <a:t>Médios das Requisições</a:t>
             </a:r>
             <a:r>
               <a:rPr lang="pt-BR" dirty="0" smtClean="0"/>
-              <a:t>2 </a:t>
-            </a:r>
-            <a:r>
-              <a:rPr lang="mr-IN" dirty="0" smtClean="0"/>
-              <a:t>–</a:t>
+              <a:t> </a:t>
+            </a:r>
+            <a:r>
+              <a:rPr lang="pt-BR" dirty="0"/>
+              <a:t>(Cenário </a:t>
             </a:r>
             <a:r>
               <a:rPr lang="pt-BR" dirty="0" smtClean="0"/>
-              <a:t> 800 veículos)</a:t>
+              <a:t>2)</a:t>
             </a:r>
             <a:endParaRPr u="sng" dirty="0" smtClean="0"/>
           </a:p>
@@ -12267,40 +12249,10 @@
           </a:p>
         </p:txBody>
       </p:sp>
-      <p:pic>
-        <p:nvPicPr>
-          <p:cNvPr id="6" name="Picture 5" descr="processamento1.png"/>
-          <p:cNvPicPr>
-            <a:picLocks noChangeAspect="1"/>
-          </p:cNvPicPr>
-          <p:nvPr/>
-        </p:nvPicPr>
-        <p:blipFill>
-          <a:blip r:embed="rId3">
-            <a:extLst>
-              <a:ext uri="{28A0092B-C50C-407E-A947-70E740481C1C}">
-                <a14:useLocalDpi xmlns:a14="http://schemas.microsoft.com/office/drawing/2010/main" val="0"/>
-              </a:ext>
-            </a:extLst>
-          </a:blip>
-          <a:stretch>
-            <a:fillRect/>
-          </a:stretch>
-        </p:blipFill>
-        <p:spPr>
-          <a:xfrm>
-            <a:off x="1500336" y="2097360"/>
-            <a:ext cx="6096000" cy="4572000"/>
-          </a:xfrm>
-          <a:prstGeom prst="rect">
-            <a:avLst/>
-          </a:prstGeom>
-        </p:spPr>
-      </p:pic>
     </p:spTree>
     <p:extLst>
       <p:ext uri="{BB962C8B-B14F-4D97-AF65-F5344CB8AC3E}">
-        <p14:creationId xmlns:p14="http://schemas.microsoft.com/office/powerpoint/2010/main" val="1872912114"/>
+        <p14:creationId xmlns:p14="http://schemas.microsoft.com/office/powerpoint/2010/main" val="1749404914"/>
       </p:ext>
     </p:extLst>
   </p:cSld>
@@ -12406,7 +12358,7 @@
             </a:r>
             <a:r>
               <a:rPr lang="pt-BR" dirty="0" smtClean="0"/>
-              <a:t> 1600 veículos)</a:t>
+              <a:t> 800 veículos)</a:t>
             </a:r>
             <a:endParaRPr u="sng" dirty="0" smtClean="0"/>
           </a:p>
@@ -12463,7 +12415,7 @@
       </p:sp>
       <p:pic>
         <p:nvPicPr>
-          <p:cNvPr id="2" name="Picture 1" descr="processamento2.png"/>
+          <p:cNvPr id="6" name="Picture 5" descr="processamento1.png"/>
           <p:cNvPicPr>
             <a:picLocks noChangeAspect="1"/>
           </p:cNvPicPr>
@@ -12483,7 +12435,7 @@
         </p:blipFill>
         <p:spPr>
           <a:xfrm>
-            <a:off x="1403648" y="2097360"/>
+            <a:off x="1500336" y="2097360"/>
             <a:ext cx="6096000" cy="4572000"/>
           </a:xfrm>
           <a:prstGeom prst="rect">
@@ -12494,7 +12446,7 @@
     </p:spTree>
     <p:extLst>
       <p:ext uri="{BB962C8B-B14F-4D97-AF65-F5344CB8AC3E}">
-        <p14:creationId xmlns:p14="http://schemas.microsoft.com/office/powerpoint/2010/main" val="1694983468"/>
+        <p14:creationId xmlns:p14="http://schemas.microsoft.com/office/powerpoint/2010/main" val="1872912114"/>
       </p:ext>
     </p:extLst>
   </p:cSld>
@@ -12584,15 +12536,23 @@
             <a:pPr algn="just"/>
             <a:r>
               <a:rPr lang="pt-BR" dirty="0" smtClean="0"/>
-              <a:t>Percentual de Perda </a:t>
+              <a:t>Processamento (</a:t>
             </a:r>
             <a:r>
               <a:rPr lang="pt-BR" dirty="0"/>
-              <a:t>(Cenário </a:t>
+              <a:t>Cenário </a:t>
             </a:r>
             <a:r>
               <a:rPr lang="pt-BR" dirty="0" smtClean="0"/>
-              <a:t>1 e 2)</a:t>
+              <a:t>2 </a:t>
+            </a:r>
+            <a:r>
+              <a:rPr lang="mr-IN" dirty="0" smtClean="0"/>
+              <a:t>–</a:t>
+            </a:r>
+            <a:r>
+              <a:rPr lang="pt-BR" dirty="0" smtClean="0"/>
+              <a:t> 1600 veículos)</a:t>
             </a:r>
             <a:endParaRPr u="sng" dirty="0" smtClean="0"/>
           </a:p>
@@ -12649,7 +12609,7 @@
       </p:sp>
       <p:pic>
         <p:nvPicPr>
-          <p:cNvPr id="3" name="Picture 2" descr="grafico_perda_qnt_velocidade.png"/>
+          <p:cNvPr id="2" name="Picture 1" descr="processamento2.png"/>
           <p:cNvPicPr>
             <a:picLocks noChangeAspect="1"/>
           </p:cNvPicPr>
@@ -12669,38 +12629,8 @@
         </p:blipFill>
         <p:spPr>
           <a:xfrm>
-            <a:off x="48005" y="2060848"/>
-            <a:ext cx="4668011" cy="3501008"/>
-          </a:xfrm>
-          <a:prstGeom prst="rect">
-            <a:avLst/>
-          </a:prstGeom>
-        </p:spPr>
-      </p:pic>
-      <p:pic>
-        <p:nvPicPr>
-          <p:cNvPr id="5" name="Picture 4" descr="grafico_perda_qnt_800_1600.png"/>
-          <p:cNvPicPr>
-            <a:picLocks noChangeAspect="1"/>
-          </p:cNvPicPr>
-          <p:nvPr/>
-        </p:nvPicPr>
-        <p:blipFill>
-          <a:blip r:embed="rId4">
-            <a:extLst>
-              <a:ext uri="{28A0092B-C50C-407E-A947-70E740481C1C}">
-                <a14:useLocalDpi xmlns:a14="http://schemas.microsoft.com/office/drawing/2010/main" val="0"/>
-              </a:ext>
-            </a:extLst>
-          </a:blip>
-          <a:stretch>
-            <a:fillRect/>
-          </a:stretch>
-        </p:blipFill>
-        <p:spPr>
-          <a:xfrm>
-            <a:off x="4547997" y="3284984"/>
-            <a:ext cx="4704523" cy="3528392"/>
+            <a:off x="1403648" y="2097360"/>
+            <a:ext cx="6096000" cy="4572000"/>
           </a:xfrm>
           <a:prstGeom prst="rect">
             <a:avLst/>
@@ -12710,7 +12640,7 @@
     </p:spTree>
     <p:extLst>
       <p:ext uri="{BB962C8B-B14F-4D97-AF65-F5344CB8AC3E}">
-        <p14:creationId xmlns:p14="http://schemas.microsoft.com/office/powerpoint/2010/main" val="2369387540"/>
+        <p14:creationId xmlns:p14="http://schemas.microsoft.com/office/powerpoint/2010/main" val="1694983468"/>
       </p:ext>
     </p:extLst>
   </p:cSld>
@@ -12746,7 +12676,7 @@
       </p:grpSpPr>
       <p:sp>
         <p:nvSpPr>
-          <p:cNvPr id="29698" name="Title 1"/>
+          <p:cNvPr id="23554" name="Título 1"/>
           <p:cNvSpPr>
             <a:spLocks noGrp="1"/>
           </p:cNvSpPr>
@@ -12754,105 +12684,118 @@
             <p:ph type="title"/>
           </p:nvPr>
         </p:nvSpPr>
+        <p:spPr>
+          <a:xfrm>
+            <a:off x="179512" y="228600"/>
+            <a:ext cx="8784975" cy="990600"/>
+          </a:xfrm>
+        </p:spPr>
+        <p:txBody>
+          <a:bodyPr/>
+          <a:lstStyle/>
+          <a:p>
+            <a:r>
+              <a:rPr lang="pt-BR" altLang="pt-BR" dirty="0" smtClean="0"/>
+              <a:t>Análise dos Resultados</a:t>
+            </a:r>
+            <a:endParaRPr altLang="pt-BR" sz="2400" dirty="0"/>
+          </a:p>
+        </p:txBody>
+      </p:sp>
+      <p:sp>
+        <p:nvSpPr>
+          <p:cNvPr id="23555" name="Espaço Reservado para Conteúdo 2"/>
+          <p:cNvSpPr>
+            <a:spLocks noGrp="1"/>
+          </p:cNvSpPr>
+          <p:nvPr>
+            <p:ph sz="quarter" idx="1"/>
+          </p:nvPr>
+        </p:nvSpPr>
+        <p:spPr bwMode="auto">
+          <a:xfrm>
+            <a:off x="285720" y="1600200"/>
+            <a:ext cx="8480455" cy="4972072"/>
+          </a:xfrm>
+        </p:spPr>
+        <p:txBody>
+          <a:bodyPr wrap="square" lIns="91440" tIns="45720" rIns="91440" bIns="45720" numCol="1" anchor="t" anchorCtr="0" compatLnSpc="1">
+            <a:prstTxWarp prst="textNoShape">
+              <a:avLst/>
+            </a:prstTxWarp>
+            <a:normAutofit/>
+          </a:bodyPr>
+          <a:lstStyle/>
+          <a:p>
+            <a:pPr algn="just"/>
+            <a:r>
+              <a:rPr lang="pt-BR" dirty="0" smtClean="0"/>
+              <a:t>Percentual de Perda </a:t>
+            </a:r>
+            <a:r>
+              <a:rPr lang="pt-BR" dirty="0"/>
+              <a:t>(Cenário </a:t>
+            </a:r>
+            <a:r>
+              <a:rPr lang="pt-BR" dirty="0" smtClean="0"/>
+              <a:t>1 e 2)</a:t>
+            </a:r>
+            <a:endParaRPr u="sng" dirty="0" smtClean="0"/>
+          </a:p>
+          <a:p>
+            <a:pPr marL="366713" lvl="1" indent="0" algn="just">
+              <a:buNone/>
+            </a:pPr>
+            <a:endParaRPr lang="pt-BR" dirty="0" smtClean="0"/>
+          </a:p>
+          <a:p>
+            <a:pPr algn="just">
+              <a:lnSpc>
+                <a:spcPct val="150000"/>
+              </a:lnSpc>
+            </a:pPr>
+            <a:endParaRPr b="1" i="1" u="sng" dirty="0" smtClean="0"/>
+          </a:p>
+          <a:p>
+            <a:pPr marL="366713" lvl="1" indent="0" algn="just">
+              <a:lnSpc>
+                <a:spcPct val="150000"/>
+              </a:lnSpc>
+              <a:buNone/>
+            </a:pPr>
+            <a:endParaRPr altLang="pt-BR" dirty="0"/>
+          </a:p>
+        </p:txBody>
+      </p:sp>
+      <p:sp>
+        <p:nvSpPr>
+          <p:cNvPr id="4" name="Espaço Reservado para Número de Slide 3"/>
+          <p:cNvSpPr>
+            <a:spLocks noGrp="1"/>
+          </p:cNvSpPr>
+          <p:nvPr>
+            <p:ph type="sldNum" sz="quarter" idx="12"/>
+          </p:nvPr>
+        </p:nvSpPr>
         <p:spPr/>
         <p:txBody>
-          <a:bodyPr/>
-          <a:lstStyle/>
-          <a:p>
-            <a:r>
-              <a:rPr lang="en-US" altLang="pt-BR" dirty="0" err="1" smtClean="0">
-                <a:latin typeface="Calibri" pitchFamily="34" charset="0"/>
-              </a:rPr>
-              <a:t>Conclusões</a:t>
-            </a:r>
-            <a:endParaRPr altLang="pt-BR" dirty="0">
-              <a:latin typeface="Calibri" pitchFamily="34" charset="0"/>
-            </a:endParaRPr>
-          </a:p>
-        </p:txBody>
-      </p:sp>
-      <p:sp>
-        <p:nvSpPr>
-          <p:cNvPr id="4" name="Content Placeholder 3"/>
-          <p:cNvSpPr>
-            <a:spLocks noGrp="1"/>
-          </p:cNvSpPr>
-          <p:nvPr>
-            <p:ph sz="quarter" idx="1"/>
-          </p:nvPr>
-        </p:nvSpPr>
-        <p:spPr/>
-        <p:txBody>
-          <a:bodyPr/>
-          <a:lstStyle/>
-          <a:p>
-            <a:r>
-              <a:rPr lang="en-US" dirty="0" err="1" smtClean="0"/>
-              <a:t>Requisitos</a:t>
-            </a:r>
-            <a:r>
-              <a:rPr lang="en-US" dirty="0" smtClean="0"/>
-              <a:t> das </a:t>
-            </a:r>
-            <a:r>
-              <a:rPr lang="en-US" dirty="0" err="1" smtClean="0"/>
-              <a:t>Aplicações</a:t>
-            </a:r>
-            <a:endParaRPr lang="en-US" dirty="0"/>
-          </a:p>
-        </p:txBody>
-      </p:sp>
-      <p:sp>
-        <p:nvSpPr>
-          <p:cNvPr id="29700" name="Rectangle 22"/>
-          <p:cNvSpPr>
-            <a:spLocks/>
-          </p:cNvSpPr>
-          <p:nvPr/>
-        </p:nvSpPr>
-        <p:spPr bwMode="auto">
-          <a:xfrm>
-            <a:off x="0" y="1271588"/>
-            <a:ext cx="533400" cy="244475"/>
-          </a:xfrm>
-          <a:prstGeom prst="rect">
-            <a:avLst/>
-          </a:prstGeom>
-          <a:noFill/>
-          <a:ln w="9525">
-            <a:noFill/>
-            <a:miter lim="800000"/>
-            <a:headEnd/>
-            <a:tailEnd/>
-          </a:ln>
-        </p:spPr>
-        <p:txBody>
-          <a:bodyPr anchor="ctr"/>
-          <a:lstStyle/>
-          <a:p>
-            <a:pPr algn="ctr" eaLnBrk="1" hangingPunct="1"/>
-            <a:fld id="{2213E8A9-2084-4B2F-A4D9-614C179387CC}" type="slidenum">
-              <a:rPr lang="pt-BR" altLang="pt-BR" sz="1200" b="1">
-                <a:solidFill>
-                  <a:schemeClr val="bg1"/>
-                </a:solidFill>
-                <a:latin typeface="Tw Cen MT" pitchFamily="34" charset="0"/>
-              </a:rPr>
-              <a:pPr algn="ctr" eaLnBrk="1" hangingPunct="1"/>
+          <a:bodyPr>
+            <a:normAutofit fontScale="85000" lnSpcReduction="20000"/>
+          </a:bodyPr>
+          <a:lstStyle/>
+          <a:p>
+            <a:fld id="{552ECE8C-316A-4354-A4B8-86A79814135A}" type="slidenum">
+              <a:rPr lang="pt-BR" altLang="pt-BR" smtClean="0"/>
+              <a:pPr/>
               <a:t>26</a:t>
             </a:fld>
-            <a:endParaRPr lang="pt-BR" altLang="pt-BR" sz="1400" b="1" dirty="0">
-              <a:solidFill>
-                <a:schemeClr val="bg1"/>
-              </a:solidFill>
-              <a:latin typeface="Tw Cen MT" pitchFamily="34" charset="0"/>
-            </a:endParaRPr>
+            <a:endParaRPr lang="pt-BR" altLang="pt-BR" dirty="0"/>
           </a:p>
         </p:txBody>
       </p:sp>
       <p:pic>
         <p:nvPicPr>
-          <p:cNvPr id="8" name="Picture 7" descr="app_tempos.png"/>
+          <p:cNvPr id="3" name="Picture 2" descr="grafico_perda_qnt_velocidade.png"/>
           <p:cNvPicPr>
             <a:picLocks noChangeAspect="1"/>
           </p:cNvPicPr>
@@ -12872,8 +12815,38 @@
         </p:blipFill>
         <p:spPr>
           <a:xfrm>
-            <a:off x="216024" y="2206175"/>
-            <a:ext cx="8820472" cy="4319169"/>
+            <a:off x="48005" y="2060848"/>
+            <a:ext cx="4668011" cy="3501008"/>
+          </a:xfrm>
+          <a:prstGeom prst="rect">
+            <a:avLst/>
+          </a:prstGeom>
+        </p:spPr>
+      </p:pic>
+      <p:pic>
+        <p:nvPicPr>
+          <p:cNvPr id="5" name="Picture 4" descr="grafico_perda_qnt_800_1600.png"/>
+          <p:cNvPicPr>
+            <a:picLocks noChangeAspect="1"/>
+          </p:cNvPicPr>
+          <p:nvPr/>
+        </p:nvPicPr>
+        <p:blipFill>
+          <a:blip r:embed="rId4">
+            <a:extLst>
+              <a:ext uri="{28A0092B-C50C-407E-A947-70E740481C1C}">
+                <a14:useLocalDpi xmlns:a14="http://schemas.microsoft.com/office/drawing/2010/main" val="0"/>
+              </a:ext>
+            </a:extLst>
+          </a:blip>
+          <a:stretch>
+            <a:fillRect/>
+          </a:stretch>
+        </p:blipFill>
+        <p:spPr>
+          <a:xfrm>
+            <a:off x="4547997" y="3284984"/>
+            <a:ext cx="4704523" cy="3528392"/>
           </a:xfrm>
           <a:prstGeom prst="rect">
             <a:avLst/>
@@ -12883,16 +12856,13 @@
     </p:spTree>
     <p:extLst>
       <p:ext uri="{BB962C8B-B14F-4D97-AF65-F5344CB8AC3E}">
-        <p14:creationId xmlns:p14="http://schemas.microsoft.com/office/powerpoint/2010/main" val="2951978990"/>
+        <p14:creationId xmlns:p14="http://schemas.microsoft.com/office/powerpoint/2010/main" val="2369387540"/>
       </p:ext>
     </p:extLst>
   </p:cSld>
   <p:clrMapOvr>
     <a:masterClrMapping/>
   </p:clrMapOvr>
-  <p:transition xmlns:p14="http://schemas.microsoft.com/office/powerpoint/2010/main">
-    <p:fade/>
-  </p:transition>
   <p:timing>
     <p:tnLst>
       <p:par>
@@ -12939,19 +12909,7 @@
               <a:rPr lang="en-US" altLang="pt-BR" dirty="0" err="1" smtClean="0">
                 <a:latin typeface="Calibri" pitchFamily="34" charset="0"/>
               </a:rPr>
-              <a:t>Trabalhos</a:t>
-            </a:r>
-            <a:r>
-              <a:rPr lang="en-US" altLang="pt-BR" dirty="0" smtClean="0">
-                <a:latin typeface="Calibri" pitchFamily="34" charset="0"/>
-              </a:rPr>
-              <a:t> </a:t>
-            </a:r>
-            <a:r>
-              <a:rPr lang="en-US" altLang="pt-BR" dirty="0" err="1" smtClean="0">
-                <a:latin typeface="Calibri" pitchFamily="34" charset="0"/>
-              </a:rPr>
-              <a:t>Futuros</a:t>
+              <a:t>Conclusões</a:t>
             </a:r>
             <a:endParaRPr altLang="pt-BR" dirty="0">
               <a:latin typeface="Calibri" pitchFamily="34" charset="0"/>
@@ -12961,7 +12919,7 @@
       </p:sp>
       <p:sp>
         <p:nvSpPr>
-          <p:cNvPr id="2" name="Content Placeholder 1"/>
+          <p:cNvPr id="4" name="Content Placeholder 3"/>
           <p:cNvSpPr>
             <a:spLocks noGrp="1"/>
           </p:cNvSpPr>
@@ -12969,130 +12927,22 @@
             <p:ph sz="quarter" idx="1"/>
           </p:nvPr>
         </p:nvSpPr>
-        <p:spPr>
-          <a:xfrm>
-            <a:off x="612648" y="1600200"/>
-            <a:ext cx="8153400" cy="4997152"/>
-          </a:xfrm>
-        </p:spPr>
-        <p:txBody>
-          <a:bodyPr>
-            <a:normAutofit fontScale="92500" lnSpcReduction="20000"/>
-          </a:bodyPr>
-          <a:lstStyle/>
-          <a:p>
-            <a:r>
-              <a:rPr lang="pt-BR" dirty="0" smtClean="0"/>
-              <a:t>Alterar a </a:t>
-            </a:r>
-            <a:r>
-              <a:rPr lang="pt-BR" dirty="0"/>
-              <a:t>organização dos servidores visando uma melhor distribuição dos veículos e diminuindo a carga com a operação </a:t>
-            </a:r>
-            <a:r>
-              <a:rPr lang="pt-BR" b="1" i="1" dirty="0" err="1" smtClean="0"/>
-              <a:t>ChangeServer</a:t>
-            </a:r>
-            <a:r>
-              <a:rPr lang="pt-BR" dirty="0" smtClean="0"/>
-              <a:t>; </a:t>
-            </a:r>
-          </a:p>
-          <a:p>
-            <a:r>
-              <a:rPr lang="pt-BR" dirty="0"/>
-              <a:t>N</a:t>
-            </a:r>
-            <a:r>
-              <a:rPr lang="pt-BR" dirty="0" smtClean="0"/>
-              <a:t>ovos </a:t>
-            </a:r>
-            <a:r>
-              <a:rPr lang="pt-BR" dirty="0"/>
-              <a:t>protocolos de comunicação; </a:t>
-            </a:r>
-            <a:endParaRPr lang="pt-BR" dirty="0" smtClean="0"/>
-          </a:p>
-          <a:p>
-            <a:r>
-              <a:rPr lang="pt-BR" dirty="0" smtClean="0"/>
-              <a:t>Novas </a:t>
-            </a:r>
-            <a:r>
-              <a:rPr lang="pt-BR" dirty="0"/>
-              <a:t>regras de </a:t>
-            </a:r>
-            <a:r>
-              <a:rPr lang="pt-BR" dirty="0" smtClean="0"/>
-              <a:t>segurança (</a:t>
-            </a:r>
-            <a:r>
-              <a:rPr lang="pt-BR" dirty="0" err="1" smtClean="0"/>
-              <a:t>BlockChain</a:t>
-            </a:r>
-            <a:r>
-              <a:rPr lang="pt-BR" dirty="0" smtClean="0"/>
-              <a:t>);</a:t>
-            </a:r>
-          </a:p>
-          <a:p>
-            <a:r>
-              <a:rPr lang="pt-BR" dirty="0" smtClean="0"/>
-              <a:t>Implementação </a:t>
-            </a:r>
-            <a:r>
-              <a:rPr lang="pt-BR" dirty="0"/>
-              <a:t>de uma plataforma web de </a:t>
-            </a:r>
-            <a:r>
-              <a:rPr lang="pt-BR" dirty="0" smtClean="0"/>
-              <a:t>simulação (Sendo desenvolvido);</a:t>
-            </a:r>
-          </a:p>
-          <a:p>
-            <a:r>
-              <a:rPr lang="pt-BR" dirty="0" smtClean="0"/>
-              <a:t>Criando </a:t>
-            </a:r>
-            <a:r>
-              <a:rPr lang="pt-BR" dirty="0"/>
-              <a:t>diversas aplicações como sistema de detecção e alerta de </a:t>
-            </a:r>
-            <a:r>
-              <a:rPr lang="pt-BR" dirty="0" smtClean="0"/>
-              <a:t>congestionamento em cruzamentos </a:t>
-            </a:r>
-            <a:r>
-              <a:rPr lang="pt-BR" dirty="0" err="1" smtClean="0"/>
-              <a:t>semaforizados</a:t>
-            </a:r>
-            <a:r>
-              <a:rPr lang="pt-BR" dirty="0" smtClean="0"/>
-              <a:t>; </a:t>
-            </a:r>
-          </a:p>
-          <a:p>
-            <a:r>
-              <a:rPr lang="pt-BR" dirty="0" smtClean="0"/>
-              <a:t>Controle </a:t>
-            </a:r>
-            <a:r>
-              <a:rPr lang="pt-BR" dirty="0"/>
-              <a:t>de passagem livre para veículos de urgência e emergência</a:t>
-            </a:r>
-            <a:r>
-              <a:rPr lang="pt-BR" dirty="0" smtClean="0"/>
-              <a:t>.</a:t>
-            </a:r>
-          </a:p>
-          <a:p>
-            <a:r>
-              <a:rPr lang="pt-BR" dirty="0" smtClean="0"/>
-              <a:t>Comunica</a:t>
-            </a:r>
-            <a:r>
-              <a:rPr lang="pt-BR" dirty="0" smtClean="0"/>
-              <a:t>ção entre seguradoras</a:t>
+        <p:spPr/>
+        <p:txBody>
+          <a:bodyPr/>
+          <a:lstStyle/>
+          <a:p>
+            <a:r>
+              <a:rPr lang="en-US" dirty="0" err="1" smtClean="0"/>
+              <a:t>Requisitos</a:t>
+            </a:r>
+            <a:r>
+              <a:rPr lang="en-US" dirty="0" smtClean="0"/>
+              <a:t> das </a:t>
+            </a:r>
+            <a:r>
+              <a:rPr lang="en-US" dirty="0" err="1" smtClean="0"/>
+              <a:t>Aplicações</a:t>
             </a:r>
             <a:endParaRPr lang="en-US" dirty="0"/>
           </a:p>
@@ -13146,10 +12996,40 @@
           </a:p>
         </p:txBody>
       </p:sp>
+      <p:pic>
+        <p:nvPicPr>
+          <p:cNvPr id="8" name="Picture 7" descr="app_tempos.png"/>
+          <p:cNvPicPr>
+            <a:picLocks noChangeAspect="1"/>
+          </p:cNvPicPr>
+          <p:nvPr/>
+        </p:nvPicPr>
+        <p:blipFill>
+          <a:blip r:embed="rId3">
+            <a:extLst>
+              <a:ext uri="{28A0092B-C50C-407E-A947-70E740481C1C}">
+                <a14:useLocalDpi xmlns:a14="http://schemas.microsoft.com/office/drawing/2010/main" val="0"/>
+              </a:ext>
+            </a:extLst>
+          </a:blip>
+          <a:stretch>
+            <a:fillRect/>
+          </a:stretch>
+        </p:blipFill>
+        <p:spPr>
+          <a:xfrm>
+            <a:off x="216024" y="2206175"/>
+            <a:ext cx="8820472" cy="4319169"/>
+          </a:xfrm>
+          <a:prstGeom prst="rect">
+            <a:avLst/>
+          </a:prstGeom>
+        </p:spPr>
+      </p:pic>
     </p:spTree>
     <p:extLst>
       <p:ext uri="{BB962C8B-B14F-4D97-AF65-F5344CB8AC3E}">
-        <p14:creationId xmlns:p14="http://schemas.microsoft.com/office/powerpoint/2010/main" val="3173586640"/>
+        <p14:creationId xmlns:p14="http://schemas.microsoft.com/office/powerpoint/2010/main" val="2951978990"/>
       </p:ext>
     </p:extLst>
   </p:cSld>
@@ -13205,7 +13085,19 @@
               <a:rPr lang="en-US" altLang="pt-BR" dirty="0" err="1" smtClean="0">
                 <a:latin typeface="Calibri" pitchFamily="34" charset="0"/>
               </a:rPr>
-              <a:t>Contribuições</a:t>
+              <a:t>Trabalhos</a:t>
+            </a:r>
+            <a:r>
+              <a:rPr lang="en-US" altLang="pt-BR" dirty="0" smtClean="0">
+                <a:latin typeface="Calibri" pitchFamily="34" charset="0"/>
+              </a:rPr>
+              <a:t> </a:t>
+            </a:r>
+            <a:r>
+              <a:rPr lang="en-US" altLang="pt-BR" dirty="0" err="1" smtClean="0">
+                <a:latin typeface="Calibri" pitchFamily="34" charset="0"/>
+              </a:rPr>
+              <a:t>Futuros</a:t>
             </a:r>
             <a:endParaRPr altLang="pt-BR" dirty="0">
               <a:latin typeface="Calibri" pitchFamily="34" charset="0"/>
@@ -13223,33 +13115,126 @@
             <p:ph sz="quarter" idx="1"/>
           </p:nvPr>
         </p:nvSpPr>
-        <p:spPr/>
+        <p:spPr>
+          <a:xfrm>
+            <a:off x="612648" y="1600200"/>
+            <a:ext cx="8153400" cy="4997152"/>
+          </a:xfrm>
+        </p:spPr>
         <p:txBody>
           <a:bodyPr>
-            <a:normAutofit/>
+            <a:normAutofit fontScale="92500" lnSpcReduction="20000"/>
           </a:bodyPr>
           <a:lstStyle/>
           <a:p>
-            <a:pPr algn="just"/>
             <a:r>
               <a:rPr lang="pt-BR" dirty="0" smtClean="0"/>
-              <a:t>O modelo </a:t>
+              <a:t>Alterar a </a:t>
             </a:r>
             <a:r>
               <a:rPr lang="pt-BR" dirty="0"/>
-              <a:t>proposto permite montar uma rede veicular em nuvem e realizar todo gerenciamento e comunicação de maneira virtual, permitindo criar ambientes flexíveis capazes de oferecer o gerenciamento de uma rede veicular como serviço (</a:t>
-            </a:r>
-            <a:r>
-              <a:rPr lang="pt-BR" dirty="0" err="1"/>
-              <a:t>VaaS</a:t>
-            </a:r>
+              <a:t>organização dos servidores visando uma melhor distribuição dos veículos e diminuindo a carga com a operação </a:t>
+            </a:r>
+            <a:r>
+              <a:rPr lang="pt-BR" b="1" i="1" dirty="0" err="1" smtClean="0"/>
+              <a:t>ChangeServer</a:t>
+            </a:r>
+            <a:r>
+              <a:rPr lang="pt-BR" dirty="0" smtClean="0"/>
+              <a:t>; </a:t>
+            </a:r>
+          </a:p>
+          <a:p>
             <a:r>
               <a:rPr lang="pt-BR" dirty="0"/>
-              <a:t>)</a:t>
+              <a:t>N</a:t>
+            </a:r>
+            <a:r>
+              <a:rPr lang="pt-BR" dirty="0" smtClean="0"/>
+              <a:t>ovos </a:t>
+            </a:r>
+            <a:r>
+              <a:rPr lang="pt-BR" dirty="0"/>
+              <a:t>protocolos de comunicação; </a:t>
+            </a:r>
+            <a:endParaRPr lang="pt-BR" dirty="0" smtClean="0"/>
+          </a:p>
+          <a:p>
+            <a:r>
+              <a:rPr lang="pt-BR" dirty="0" smtClean="0"/>
+              <a:t>Novas </a:t>
+            </a:r>
+            <a:r>
+              <a:rPr lang="pt-BR" dirty="0"/>
+              <a:t>regras de </a:t>
+            </a:r>
+            <a:r>
+              <a:rPr lang="pt-BR" dirty="0" smtClean="0"/>
+              <a:t>segurança (</a:t>
+            </a:r>
+            <a:r>
+              <a:rPr lang="pt-BR" dirty="0" err="1" smtClean="0"/>
+              <a:t>BlockChain</a:t>
+            </a:r>
+            <a:r>
+              <a:rPr lang="pt-BR" dirty="0" smtClean="0"/>
+              <a:t>);</a:t>
+            </a:r>
+          </a:p>
+          <a:p>
+            <a:r>
+              <a:rPr lang="pt-BR" dirty="0" smtClean="0"/>
+              <a:t>Implementação </a:t>
+            </a:r>
+            <a:r>
+              <a:rPr lang="pt-BR" dirty="0"/>
+              <a:t>de uma plataforma web de </a:t>
+            </a:r>
+            <a:r>
+              <a:rPr lang="pt-BR" dirty="0" smtClean="0"/>
+              <a:t>simulação (Sendo desenvolvido);</a:t>
+            </a:r>
+          </a:p>
+          <a:p>
+            <a:r>
+              <a:rPr lang="pt-BR" dirty="0" smtClean="0"/>
+              <a:t>Criando </a:t>
+            </a:r>
+            <a:r>
+              <a:rPr lang="pt-BR" dirty="0"/>
+              <a:t>diversas aplicações como sistema de detecção e alerta de </a:t>
+            </a:r>
+            <a:r>
+              <a:rPr lang="pt-BR" dirty="0" smtClean="0"/>
+              <a:t>congestionamento em cruzamentos </a:t>
+            </a:r>
+            <a:r>
+              <a:rPr lang="pt-BR" dirty="0" err="1" smtClean="0"/>
+              <a:t>semaforizados</a:t>
+            </a:r>
+            <a:r>
+              <a:rPr lang="pt-BR" dirty="0" smtClean="0"/>
+              <a:t>; </a:t>
+            </a:r>
+          </a:p>
+          <a:p>
+            <a:r>
+              <a:rPr lang="pt-BR" dirty="0" smtClean="0"/>
+              <a:t>Controle </a:t>
+            </a:r>
+            <a:r>
+              <a:rPr lang="pt-BR" dirty="0"/>
+              <a:t>de passagem livre para veículos de urgência e emergência</a:t>
             </a:r>
             <a:r>
               <a:rPr lang="pt-BR" dirty="0" smtClean="0"/>
               <a:t>.</a:t>
+            </a:r>
+          </a:p>
+          <a:p>
+            <a:r>
+              <a:rPr lang="pt-BR" dirty="0" smtClean="0"/>
+              <a:t>Comunicação entre seguradoras</a:t>
             </a:r>
             <a:endParaRPr lang="en-US" dirty="0"/>
           </a:p>
@@ -13306,7 +13291,7 @@
     </p:spTree>
     <p:extLst>
       <p:ext uri="{BB962C8B-B14F-4D97-AF65-F5344CB8AC3E}">
-        <p14:creationId xmlns:p14="http://schemas.microsoft.com/office/powerpoint/2010/main" val="648453620"/>
+        <p14:creationId xmlns:p14="http://schemas.microsoft.com/office/powerpoint/2010/main" val="3173586640"/>
       </p:ext>
     </p:extLst>
   </p:cSld>
@@ -13345,6 +13330,404 @@
       </p:grpSpPr>
       <p:sp>
         <p:nvSpPr>
+          <p:cNvPr id="29698" name="Title 1"/>
+          <p:cNvSpPr>
+            <a:spLocks noGrp="1"/>
+          </p:cNvSpPr>
+          <p:nvPr>
+            <p:ph type="title"/>
+          </p:nvPr>
+        </p:nvSpPr>
+        <p:spPr/>
+        <p:txBody>
+          <a:bodyPr/>
+          <a:lstStyle/>
+          <a:p>
+            <a:r>
+              <a:rPr lang="en-US" altLang="pt-BR" dirty="0" err="1" smtClean="0">
+                <a:latin typeface="Calibri" pitchFamily="34" charset="0"/>
+              </a:rPr>
+              <a:t>Contribuições</a:t>
+            </a:r>
+            <a:endParaRPr altLang="pt-BR" dirty="0">
+              <a:latin typeface="Calibri" pitchFamily="34" charset="0"/>
+            </a:endParaRPr>
+          </a:p>
+        </p:txBody>
+      </p:sp>
+      <p:sp>
+        <p:nvSpPr>
+          <p:cNvPr id="2" name="Content Placeholder 1"/>
+          <p:cNvSpPr>
+            <a:spLocks noGrp="1"/>
+          </p:cNvSpPr>
+          <p:nvPr>
+            <p:ph sz="quarter" idx="1"/>
+          </p:nvPr>
+        </p:nvSpPr>
+        <p:spPr/>
+        <p:txBody>
+          <a:bodyPr>
+            <a:normAutofit/>
+          </a:bodyPr>
+          <a:lstStyle/>
+          <a:p>
+            <a:pPr algn="just"/>
+            <a:r>
+              <a:rPr lang="pt-BR" dirty="0" smtClean="0"/>
+              <a:t>O modelo </a:t>
+            </a:r>
+            <a:r>
+              <a:rPr lang="pt-BR" dirty="0"/>
+              <a:t>proposto permite montar uma rede veicular em nuvem e realizar todo gerenciamento e comunicação de maneira virtual, permitindo criar ambientes flexíveis capazes de oferecer o gerenciamento de uma rede veicular como serviço (</a:t>
+            </a:r>
+            <a:r>
+              <a:rPr lang="pt-BR" dirty="0" err="1"/>
+              <a:t>VaaS</a:t>
+            </a:r>
+            <a:r>
+              <a:rPr lang="pt-BR" dirty="0"/>
+              <a:t>)</a:t>
+            </a:r>
+            <a:r>
+              <a:rPr lang="pt-BR" dirty="0" smtClean="0"/>
+              <a:t>.</a:t>
+            </a:r>
+            <a:endParaRPr lang="en-US" dirty="0"/>
+          </a:p>
+        </p:txBody>
+      </p:sp>
+      <p:sp>
+        <p:nvSpPr>
+          <p:cNvPr id="29700" name="Rectangle 22"/>
+          <p:cNvSpPr>
+            <a:spLocks/>
+          </p:cNvSpPr>
+          <p:nvPr/>
+        </p:nvSpPr>
+        <p:spPr bwMode="auto">
+          <a:xfrm>
+            <a:off x="0" y="1271588"/>
+            <a:ext cx="533400" cy="244475"/>
+          </a:xfrm>
+          <a:prstGeom prst="rect">
+            <a:avLst/>
+          </a:prstGeom>
+          <a:noFill/>
+          <a:ln w="9525">
+            <a:noFill/>
+            <a:miter lim="800000"/>
+            <a:headEnd/>
+            <a:tailEnd/>
+          </a:ln>
+        </p:spPr>
+        <p:txBody>
+          <a:bodyPr anchor="ctr"/>
+          <a:lstStyle/>
+          <a:p>
+            <a:pPr algn="ctr" eaLnBrk="1" hangingPunct="1"/>
+            <a:fld id="{2213E8A9-2084-4B2F-A4D9-614C179387CC}" type="slidenum">
+              <a:rPr lang="pt-BR" altLang="pt-BR" sz="1200" b="1">
+                <a:solidFill>
+                  <a:schemeClr val="bg1"/>
+                </a:solidFill>
+                <a:latin typeface="Tw Cen MT" pitchFamily="34" charset="0"/>
+              </a:rPr>
+              <a:pPr algn="ctr" eaLnBrk="1" hangingPunct="1"/>
+              <a:t>29</a:t>
+            </a:fld>
+            <a:endParaRPr lang="pt-BR" altLang="pt-BR" sz="1400" b="1" dirty="0">
+              <a:solidFill>
+                <a:schemeClr val="bg1"/>
+              </a:solidFill>
+              <a:latin typeface="Tw Cen MT" pitchFamily="34" charset="0"/>
+            </a:endParaRPr>
+          </a:p>
+        </p:txBody>
+      </p:sp>
+    </p:spTree>
+    <p:extLst>
+      <p:ext uri="{BB962C8B-B14F-4D97-AF65-F5344CB8AC3E}">
+        <p14:creationId xmlns:p14="http://schemas.microsoft.com/office/powerpoint/2010/main" val="648453620"/>
+      </p:ext>
+    </p:extLst>
+  </p:cSld>
+  <p:clrMapOvr>
+    <a:masterClrMapping/>
+  </p:clrMapOvr>
+  <p:transition xmlns:p14="http://schemas.microsoft.com/office/powerpoint/2010/main">
+    <p:fade/>
+  </p:transition>
+  <p:timing>
+    <p:tnLst>
+      <p:par>
+        <p:cTn xmlns:p14="http://schemas.microsoft.com/office/powerpoint/2010/main" id="1" dur="indefinite" restart="never" nodeType="tmRoot"/>
+      </p:par>
+    </p:tnLst>
+  </p:timing>
+</p:sld>
+</file>
+
+<file path=ppt/slides/slide3.xml><?xml version="1.0" encoding="utf-8"?>
+<p:sld xmlns:a="http://schemas.openxmlformats.org/drawingml/2006/main" xmlns:r="http://schemas.openxmlformats.org/officeDocument/2006/relationships" xmlns:p="http://schemas.openxmlformats.org/presentationml/2006/main">
+  <p:cSld>
+    <p:spTree>
+      <p:nvGrpSpPr>
+        <p:cNvPr id="1" name=""/>
+        <p:cNvGrpSpPr/>
+        <p:nvPr/>
+      </p:nvGrpSpPr>
+      <p:grpSpPr>
+        <a:xfrm>
+          <a:off x="0" y="0"/>
+          <a:ext cx="0" cy="0"/>
+          <a:chOff x="0" y="0"/>
+          <a:chExt cx="0" cy="0"/>
+        </a:xfrm>
+      </p:grpSpPr>
+      <p:sp>
+        <p:nvSpPr>
+          <p:cNvPr id="19458" name="Rectangle 1"/>
+          <p:cNvSpPr>
+            <a:spLocks noGrp="1"/>
+          </p:cNvSpPr>
+          <p:nvPr>
+            <p:ph type="title"/>
+          </p:nvPr>
+        </p:nvSpPr>
+        <p:spPr>
+          <a:xfrm>
+            <a:off x="612775" y="228600"/>
+            <a:ext cx="8153400" cy="990600"/>
+          </a:xfrm>
+        </p:spPr>
+        <p:txBody>
+          <a:bodyPr/>
+          <a:lstStyle/>
+          <a:p>
+            <a:pPr eaLnBrk="1" hangingPunct="1"/>
+            <a:r>
+              <a:rPr altLang="pt-BR" sz="3800" dirty="0">
+                <a:latin typeface="Calibri" pitchFamily="34" charset="0"/>
+              </a:rPr>
+              <a:t>Introdução</a:t>
+            </a:r>
+            <a:endParaRPr altLang="pt-BR" sz="3800" i="1" dirty="0">
+              <a:latin typeface="Calibri" pitchFamily="34" charset="0"/>
+            </a:endParaRPr>
+          </a:p>
+        </p:txBody>
+      </p:sp>
+      <p:sp>
+        <p:nvSpPr>
+          <p:cNvPr id="19459" name="Espaço Reservado para Conteúdo 19"/>
+          <p:cNvSpPr>
+            <a:spLocks noGrp="1"/>
+          </p:cNvSpPr>
+          <p:nvPr>
+            <p:ph sz="quarter" idx="1"/>
+          </p:nvPr>
+        </p:nvSpPr>
+        <p:spPr bwMode="auto">
+          <a:xfrm>
+            <a:off x="357158" y="1600200"/>
+            <a:ext cx="8409017" cy="4757758"/>
+          </a:xfrm>
+        </p:spPr>
+        <p:txBody>
+          <a:bodyPr wrap="square" lIns="91440" tIns="45720" rIns="91440" bIns="45720" numCol="1" anchor="t" anchorCtr="0" compatLnSpc="1">
+            <a:prstTxWarp prst="textNoShape">
+              <a:avLst/>
+            </a:prstTxWarp>
+            <a:normAutofit/>
+          </a:bodyPr>
+          <a:lstStyle/>
+          <a:p>
+            <a:pPr algn="just"/>
+            <a:r>
+              <a:rPr lang="pt-BR" sz="3500" dirty="0" smtClean="0"/>
+              <a:t>Pesquisadores </a:t>
+            </a:r>
+            <a:r>
+              <a:rPr lang="pt-BR" sz="3500" dirty="0"/>
+              <a:t>vem buscando nas redes veiculares </a:t>
+            </a:r>
+            <a:r>
+              <a:rPr lang="pt-BR" sz="3500" dirty="0" err="1"/>
+              <a:t>ad-</a:t>
+            </a:r>
+            <a:r>
+              <a:rPr lang="pt-BR" sz="3500" dirty="0" err="1" smtClean="0"/>
+              <a:t>hoc</a:t>
+            </a:r>
+            <a:r>
+              <a:rPr lang="pt-BR" sz="3500" dirty="0" smtClean="0"/>
+              <a:t> (VANET) uma possível solução </a:t>
+            </a:r>
+            <a:r>
+              <a:rPr lang="pt-BR" sz="3500" dirty="0"/>
+              <a:t>para os problemas referentes </a:t>
+            </a:r>
+            <a:r>
+              <a:rPr lang="pt-BR" sz="3500" dirty="0" smtClean="0"/>
+              <a:t>à </a:t>
+            </a:r>
+            <a:r>
+              <a:rPr lang="pt-BR" sz="3500" dirty="0"/>
+              <a:t>mobilidade urbana. Contudo, </a:t>
+            </a:r>
+            <a:r>
+              <a:rPr lang="pt-BR" sz="3500" dirty="0" err="1"/>
+              <a:t>VANETs</a:t>
+            </a:r>
+            <a:r>
+              <a:rPr lang="pt-BR" sz="3500" dirty="0"/>
+              <a:t> ainda apresenta uma </a:t>
+            </a:r>
+            <a:r>
+              <a:rPr lang="pt-BR" sz="3500" dirty="0" smtClean="0"/>
+              <a:t>série </a:t>
+            </a:r>
+            <a:r>
+              <a:rPr lang="pt-BR" sz="3500" dirty="0"/>
+              <a:t>de desafios que devem ser resolvidos para que seu uso seja consolidado. </a:t>
+            </a:r>
+          </a:p>
+        </p:txBody>
+      </p:sp>
+      <p:sp>
+        <p:nvSpPr>
+          <p:cNvPr id="19461" name="Rectangle 5"/>
+          <p:cNvSpPr>
+            <a:spLocks noChangeArrowheads="1"/>
+          </p:cNvSpPr>
+          <p:nvPr/>
+        </p:nvSpPr>
+        <p:spPr bwMode="auto">
+          <a:xfrm>
+            <a:off x="3017838" y="2203450"/>
+            <a:ext cx="2105025" cy="0"/>
+          </a:xfrm>
+          <a:prstGeom prst="rect">
+            <a:avLst/>
+          </a:prstGeom>
+          <a:noFill/>
+          <a:ln w="9525">
+            <a:noFill/>
+            <a:miter lim="800000"/>
+            <a:headEnd/>
+            <a:tailEnd/>
+          </a:ln>
+        </p:spPr>
+        <p:txBody>
+          <a:bodyPr wrap="none">
+            <a:spAutoFit/>
+          </a:bodyPr>
+          <a:lstStyle/>
+          <a:p>
+            <a:pPr eaLnBrk="1" hangingPunct="1"/>
+            <a:endParaRPr lang="pt-BR" altLang="pt-BR" dirty="0"/>
+          </a:p>
+        </p:txBody>
+      </p:sp>
+      <p:sp>
+        <p:nvSpPr>
+          <p:cNvPr id="19462" name="Rectangle 6"/>
+          <p:cNvSpPr>
+            <a:spLocks noChangeArrowheads="1"/>
+          </p:cNvSpPr>
+          <p:nvPr/>
+        </p:nvSpPr>
+        <p:spPr bwMode="auto">
+          <a:xfrm>
+            <a:off x="3017838" y="2203450"/>
+            <a:ext cx="2105025" cy="0"/>
+          </a:xfrm>
+          <a:prstGeom prst="rect">
+            <a:avLst/>
+          </a:prstGeom>
+          <a:noFill/>
+          <a:ln w="9525">
+            <a:noFill/>
+            <a:miter lim="800000"/>
+            <a:headEnd/>
+            <a:tailEnd/>
+          </a:ln>
+        </p:spPr>
+        <p:txBody>
+          <a:bodyPr wrap="none">
+            <a:spAutoFit/>
+          </a:bodyPr>
+          <a:lstStyle/>
+          <a:p>
+            <a:pPr eaLnBrk="1" hangingPunct="1"/>
+            <a:endParaRPr lang="pt-BR" altLang="pt-BR" dirty="0"/>
+          </a:p>
+        </p:txBody>
+      </p:sp>
+      <p:sp>
+        <p:nvSpPr>
+          <p:cNvPr id="2" name="Espaço Reservado para Número de Slide 1"/>
+          <p:cNvSpPr>
+            <a:spLocks noGrp="1"/>
+          </p:cNvSpPr>
+          <p:nvPr>
+            <p:ph type="sldNum" sz="quarter" idx="12"/>
+          </p:nvPr>
+        </p:nvSpPr>
+        <p:spPr/>
+        <p:txBody>
+          <a:bodyPr>
+            <a:normAutofit fontScale="85000" lnSpcReduction="20000"/>
+          </a:bodyPr>
+          <a:lstStyle/>
+          <a:p>
+            <a:fld id="{552ECE8C-316A-4354-A4B8-86A79814135A}" type="slidenum">
+              <a:rPr lang="pt-BR" altLang="pt-BR" smtClean="0"/>
+              <a:pPr/>
+              <a:t>3</a:t>
+            </a:fld>
+            <a:endParaRPr lang="pt-BR" altLang="pt-BR" dirty="0"/>
+          </a:p>
+        </p:txBody>
+      </p:sp>
+    </p:spTree>
+  </p:cSld>
+  <p:clrMapOvr>
+    <a:masterClrMapping/>
+  </p:clrMapOvr>
+  <p:transition xmlns:p14="http://schemas.microsoft.com/office/powerpoint/2010/main" spd="med">
+    <p:fade/>
+  </p:transition>
+  <p:timing>
+    <p:tnLst>
+      <p:par>
+        <p:cTn xmlns:p14="http://schemas.microsoft.com/office/powerpoint/2010/main" id="1" dur="indefinite" restart="never" nodeType="tmRoot"/>
+      </p:par>
+    </p:tnLst>
+  </p:timing>
+</p:sld>
+</file>
+
+<file path=ppt/slides/slide30.xml><?xml version="1.0" encoding="utf-8"?>
+<p:sld xmlns:a="http://schemas.openxmlformats.org/drawingml/2006/main" xmlns:r="http://schemas.openxmlformats.org/officeDocument/2006/relationships" xmlns:p="http://schemas.openxmlformats.org/presentationml/2006/main">
+  <p:cSld>
+    <p:spTree>
+      <p:nvGrpSpPr>
+        <p:cNvPr id="1" name=""/>
+        <p:cNvGrpSpPr/>
+        <p:nvPr/>
+      </p:nvGrpSpPr>
+      <p:grpSpPr>
+        <a:xfrm>
+          <a:off x="0" y="0"/>
+          <a:ext cx="0" cy="0"/>
+          <a:chOff x="0" y="0"/>
+          <a:chExt cx="0" cy="0"/>
+        </a:xfrm>
+      </p:grpSpPr>
+      <p:sp>
+        <p:nvSpPr>
           <p:cNvPr id="31746" name="Rectangle 1"/>
           <p:cNvSpPr>
             <a:spLocks noGrp="1"/>
@@ -13990,247 +14373,6 @@
     <a:masterClrMapping/>
   </p:clrMapOvr>
   <p:transition xmlns:p14="http://schemas.microsoft.com/office/powerpoint/2010/main">
-    <p:fade/>
-  </p:transition>
-  <p:timing>
-    <p:tnLst>
-      <p:par>
-        <p:cTn xmlns:p14="http://schemas.microsoft.com/office/powerpoint/2010/main" id="1" dur="indefinite" restart="never" nodeType="tmRoot"/>
-      </p:par>
-    </p:tnLst>
-  </p:timing>
-</p:sld>
-</file>
-
-<file path=ppt/slides/slide3.xml><?xml version="1.0" encoding="utf-8"?>
-<p:sld xmlns:a="http://schemas.openxmlformats.org/drawingml/2006/main" xmlns:r="http://schemas.openxmlformats.org/officeDocument/2006/relationships" xmlns:p="http://schemas.openxmlformats.org/presentationml/2006/main">
-  <p:cSld>
-    <p:spTree>
-      <p:nvGrpSpPr>
-        <p:cNvPr id="1" name=""/>
-        <p:cNvGrpSpPr/>
-        <p:nvPr/>
-      </p:nvGrpSpPr>
-      <p:grpSpPr>
-        <a:xfrm>
-          <a:off x="0" y="0"/>
-          <a:ext cx="0" cy="0"/>
-          <a:chOff x="0" y="0"/>
-          <a:chExt cx="0" cy="0"/>
-        </a:xfrm>
-      </p:grpSpPr>
-      <p:sp>
-        <p:nvSpPr>
-          <p:cNvPr id="19458" name="Rectangle 1"/>
-          <p:cNvSpPr>
-            <a:spLocks noGrp="1"/>
-          </p:cNvSpPr>
-          <p:nvPr>
-            <p:ph type="title"/>
-          </p:nvPr>
-        </p:nvSpPr>
-        <p:spPr>
-          <a:xfrm>
-            <a:off x="612775" y="228600"/>
-            <a:ext cx="8153400" cy="990600"/>
-          </a:xfrm>
-        </p:spPr>
-        <p:txBody>
-          <a:bodyPr/>
-          <a:lstStyle/>
-          <a:p>
-            <a:pPr eaLnBrk="1" hangingPunct="1"/>
-            <a:r>
-              <a:rPr altLang="pt-BR" sz="3800" dirty="0">
-                <a:latin typeface="Calibri" pitchFamily="34" charset="0"/>
-              </a:rPr>
-              <a:t>Introdução</a:t>
-            </a:r>
-            <a:endParaRPr altLang="pt-BR" sz="3800" i="1" dirty="0">
-              <a:latin typeface="Calibri" pitchFamily="34" charset="0"/>
-            </a:endParaRPr>
-          </a:p>
-        </p:txBody>
-      </p:sp>
-      <p:sp>
-        <p:nvSpPr>
-          <p:cNvPr id="19459" name="Espaço Reservado para Conteúdo 19"/>
-          <p:cNvSpPr>
-            <a:spLocks noGrp="1"/>
-          </p:cNvSpPr>
-          <p:nvPr>
-            <p:ph sz="quarter" idx="1"/>
-          </p:nvPr>
-        </p:nvSpPr>
-        <p:spPr bwMode="auto">
-          <a:xfrm>
-            <a:off x="357158" y="1600200"/>
-            <a:ext cx="8409017" cy="4757758"/>
-          </a:xfrm>
-        </p:spPr>
-        <p:txBody>
-          <a:bodyPr wrap="square" lIns="91440" tIns="45720" rIns="91440" bIns="45720" numCol="1" anchor="t" anchorCtr="0" compatLnSpc="1">
-            <a:prstTxWarp prst="textNoShape">
-              <a:avLst/>
-            </a:prstTxWarp>
-            <a:normAutofit/>
-          </a:bodyPr>
-          <a:lstStyle/>
-          <a:p>
-            <a:pPr algn="just"/>
-            <a:r>
-              <a:rPr lang="pt-BR" sz="3500" dirty="0" smtClean="0"/>
-              <a:t>Pesquisadores </a:t>
-            </a:r>
-            <a:r>
-              <a:rPr lang="pt-BR" sz="3500" dirty="0"/>
-              <a:t>vem buscando nas redes veiculares </a:t>
-            </a:r>
-            <a:r>
-              <a:rPr lang="pt-BR" sz="3500" dirty="0" err="1"/>
-              <a:t>ad-</a:t>
-            </a:r>
-            <a:r>
-              <a:rPr lang="pt-BR" sz="3500" dirty="0" err="1" smtClean="0"/>
-              <a:t>hoc</a:t>
-            </a:r>
-            <a:r>
-              <a:rPr lang="pt-BR" sz="3500" dirty="0" smtClean="0"/>
-              <a:t> (VANET) uma possível solução </a:t>
-            </a:r>
-            <a:r>
-              <a:rPr lang="pt-BR" sz="3500" dirty="0"/>
-              <a:t>para os problemas referentes </a:t>
-            </a:r>
-            <a:r>
-              <a:rPr lang="pt-BR" sz="3500" dirty="0" smtClean="0"/>
-              <a:t>à </a:t>
-            </a:r>
-            <a:r>
-              <a:rPr lang="pt-BR" sz="3500" dirty="0"/>
-              <a:t>mobilidade urbana. Contudo, </a:t>
-            </a:r>
-            <a:r>
-              <a:rPr lang="pt-BR" sz="3500" dirty="0" err="1"/>
-              <a:t>VANETs</a:t>
-            </a:r>
-            <a:r>
-              <a:rPr lang="pt-BR" sz="3500" dirty="0"/>
-              <a:t> ainda apresenta uma </a:t>
-            </a:r>
-            <a:r>
-              <a:rPr lang="pt-BR" sz="3500" dirty="0" smtClean="0"/>
-              <a:t>série </a:t>
-            </a:r>
-            <a:r>
-              <a:rPr lang="pt-BR" sz="3500" dirty="0"/>
-              <a:t>de desafios que devem ser resolvidos para que seu uso seja consolidado. </a:t>
-            </a:r>
-          </a:p>
-        </p:txBody>
-      </p:sp>
-      <p:sp>
-        <p:nvSpPr>
-          <p:cNvPr id="19461" name="Rectangle 5"/>
-          <p:cNvSpPr>
-            <a:spLocks noChangeArrowheads="1"/>
-          </p:cNvSpPr>
-          <p:nvPr/>
-        </p:nvSpPr>
-        <p:spPr bwMode="auto">
-          <a:xfrm>
-            <a:off x="3017838" y="2203450"/>
-            <a:ext cx="2105025" cy="0"/>
-          </a:xfrm>
-          <a:prstGeom prst="rect">
-            <a:avLst/>
-          </a:prstGeom>
-          <a:noFill/>
-          <a:ln w="9525">
-            <a:noFill/>
-            <a:miter lim="800000"/>
-            <a:headEnd/>
-            <a:tailEnd/>
-          </a:ln>
-        </p:spPr>
-        <p:txBody>
-          <a:bodyPr wrap="none">
-            <a:spAutoFit/>
-          </a:bodyPr>
-          <a:lstStyle/>
-          <a:p>
-            <a:pPr eaLnBrk="1" hangingPunct="1"/>
-            <a:endParaRPr lang="pt-BR" altLang="pt-BR" dirty="0"/>
-          </a:p>
-        </p:txBody>
-      </p:sp>
-      <p:sp>
-        <p:nvSpPr>
-          <p:cNvPr id="19462" name="Rectangle 6"/>
-          <p:cNvSpPr>
-            <a:spLocks noChangeArrowheads="1"/>
-          </p:cNvSpPr>
-          <p:nvPr/>
-        </p:nvSpPr>
-        <p:spPr bwMode="auto">
-          <a:xfrm>
-            <a:off x="3017838" y="2203450"/>
-            <a:ext cx="2105025" cy="0"/>
-          </a:xfrm>
-          <a:prstGeom prst="rect">
-            <a:avLst/>
-          </a:prstGeom>
-          <a:noFill/>
-          <a:ln w="9525">
-            <a:noFill/>
-            <a:miter lim="800000"/>
-            <a:headEnd/>
-            <a:tailEnd/>
-          </a:ln>
-        </p:spPr>
-        <p:txBody>
-          <a:bodyPr wrap="none">
-            <a:spAutoFit/>
-          </a:bodyPr>
-          <a:lstStyle/>
-          <a:p>
-            <a:pPr eaLnBrk="1" hangingPunct="1"/>
-            <a:endParaRPr lang="pt-BR" altLang="pt-BR" dirty="0"/>
-          </a:p>
-        </p:txBody>
-      </p:sp>
-      <p:sp>
-        <p:nvSpPr>
-          <p:cNvPr id="2" name="Espaço Reservado para Número de Slide 1"/>
-          <p:cNvSpPr>
-            <a:spLocks noGrp="1"/>
-          </p:cNvSpPr>
-          <p:nvPr>
-            <p:ph type="sldNum" sz="quarter" idx="12"/>
-          </p:nvPr>
-        </p:nvSpPr>
-        <p:spPr/>
-        <p:txBody>
-          <a:bodyPr>
-            <a:normAutofit fontScale="85000" lnSpcReduction="20000"/>
-          </a:bodyPr>
-          <a:lstStyle/>
-          <a:p>
-            <a:fld id="{552ECE8C-316A-4354-A4B8-86A79814135A}" type="slidenum">
-              <a:rPr lang="pt-BR" altLang="pt-BR" smtClean="0"/>
-              <a:pPr/>
-              <a:t>3</a:t>
-            </a:fld>
-            <a:endParaRPr lang="pt-BR" altLang="pt-BR" dirty="0"/>
-          </a:p>
-        </p:txBody>
-      </p:sp>
-    </p:spTree>
-  </p:cSld>
-  <p:clrMapOvr>
-    <a:masterClrMapping/>
-  </p:clrMapOvr>
-  <p:transition xmlns:p14="http://schemas.microsoft.com/office/powerpoint/2010/main" spd="med">
     <p:fade/>
   </p:transition>
   <p:timing>
@@ -14596,11 +14738,7 @@
             <a:pPr lvl="1" algn="just"/>
             <a:r>
               <a:rPr lang="pt-BR" sz="3200" dirty="0" smtClean="0"/>
-              <a:t>Seguran</a:t>
-            </a:r>
-            <a:r>
-              <a:rPr lang="pt-BR" sz="3200" dirty="0" smtClean="0"/>
-              <a:t>ça e privacidade</a:t>
+              <a:t>Segurança e privacidade</a:t>
             </a:r>
           </a:p>
           <a:p>
@@ -15093,11 +15231,7 @@
             </a:r>
             <a:r>
               <a:rPr lang="pt-BR" dirty="0" smtClean="0"/>
-              <a:t>VANET</a:t>
-            </a:r>
-            <a:r>
-              <a:rPr lang="pt-BR" dirty="0" smtClean="0"/>
-              <a:t>, </a:t>
+              <a:t>VANET, </a:t>
             </a:r>
             <a:r>
               <a:rPr lang="pt-BR" dirty="0"/>
@@ -15352,11 +15486,7 @@
             </a:r>
             <a:r>
               <a:rPr lang="pt-BR" i="1" dirty="0" smtClean="0"/>
-              <a:t>software </a:t>
-            </a:r>
-            <a:r>
-              <a:rPr lang="pt-BR" i="1" dirty="0" smtClean="0"/>
-              <a:t>aberta </a:t>
+              <a:t>software aberta </a:t>
             </a:r>
             <a:r>
               <a:rPr lang="pt-BR" dirty="0" smtClean="0"/>

</xml_diff>

<commit_message>
alterando a imagem de estado da arte
</commit_message>
<xml_diff>
--- a/Apresentacao/ApresentaçãoV1.pptx
+++ b/Apresentacao/ApresentaçãoV1.pptx
@@ -5,10 +5,10 @@
     <p:sldMasterId id="2147483694" r:id="rId1"/>
   </p:sldMasterIdLst>
   <p:notesMasterIdLst>
-    <p:notesMasterId r:id="rId35"/>
+    <p:notesMasterId r:id="rId34"/>
   </p:notesMasterIdLst>
   <p:handoutMasterIdLst>
-    <p:handoutMasterId r:id="rId36"/>
+    <p:handoutMasterId r:id="rId35"/>
   </p:handoutMasterIdLst>
   <p:sldIdLst>
     <p:sldId id="256" r:id="rId2"/>
@@ -31,19 +31,18 @@
     <p:sldId id="706" r:id="rId19"/>
     <p:sldId id="690" r:id="rId20"/>
     <p:sldId id="707" r:id="rId21"/>
-    <p:sldId id="708" r:id="rId22"/>
-    <p:sldId id="709" r:id="rId23"/>
-    <p:sldId id="711" r:id="rId24"/>
-    <p:sldId id="710" r:id="rId25"/>
-    <p:sldId id="722" r:id="rId26"/>
-    <p:sldId id="665" r:id="rId27"/>
-    <p:sldId id="723" r:id="rId28"/>
-    <p:sldId id="712" r:id="rId29"/>
-    <p:sldId id="717" r:id="rId30"/>
-    <p:sldId id="719" r:id="rId31"/>
-    <p:sldId id="720" r:id="rId32"/>
-    <p:sldId id="721" r:id="rId33"/>
-    <p:sldId id="445" r:id="rId34"/>
+    <p:sldId id="709" r:id="rId22"/>
+    <p:sldId id="711" r:id="rId23"/>
+    <p:sldId id="710" r:id="rId24"/>
+    <p:sldId id="722" r:id="rId25"/>
+    <p:sldId id="665" r:id="rId26"/>
+    <p:sldId id="723" r:id="rId27"/>
+    <p:sldId id="712" r:id="rId28"/>
+    <p:sldId id="717" r:id="rId29"/>
+    <p:sldId id="719" r:id="rId30"/>
+    <p:sldId id="720" r:id="rId31"/>
+    <p:sldId id="721" r:id="rId32"/>
+    <p:sldId id="445" r:id="rId33"/>
   </p:sldIdLst>
   <p:sldSz cx="9144000" cy="6858000" type="screen4x3"/>
   <p:notesSz cx="7099300" cy="10234613"/>
@@ -2336,10 +2335,6 @@
             </a:r>
           </a:p>
           <a:p>
-            <a:r>
-              <a:rPr lang="pt-BR" dirty="0" smtClean="0"/>
-              <a:t>DISPERSÃO DOS DADOS</a:t>
-            </a:r>
             <a:endParaRPr lang="pt-BR" dirty="0"/>
           </a:p>
         </p:txBody>
@@ -2371,7 +2366,7 @@
     </p:spTree>
     <p:extLst>
       <p:ext uri="{BB962C8B-B14F-4D97-AF65-F5344CB8AC3E}">
-        <p14:creationId xmlns:p14="http://schemas.microsoft.com/office/powerpoint/2010/main" val="3671627820"/>
+        <p14:creationId xmlns:p14="http://schemas.microsoft.com/office/powerpoint/2010/main" val="2862495654"/>
       </p:ext>
     </p:extLst>
   </p:cSld>
@@ -2616,19 +2611,29 @@
       </p:grpSpPr>
       <p:sp>
         <p:nvSpPr>
-          <p:cNvPr id="2" name="Espaço Reservado para Imagem de Slide 1"/>
-          <p:cNvSpPr>
-            <a:spLocks noGrp="1" noRot="1" noChangeAspect="1"/>
+          <p:cNvPr id="30722" name="Slide Image Placeholder 1"/>
+          <p:cNvSpPr>
+            <a:spLocks noGrp="1" noRot="1" noChangeAspect="1" noTextEdit="1"/>
           </p:cNvSpPr>
           <p:nvPr>
             <p:ph type="sldImg"/>
           </p:nvPr>
         </p:nvSpPr>
-        <p:spPr/>
-      </p:sp>
-      <p:sp>
-        <p:nvSpPr>
-          <p:cNvPr id="3" name="Espaço Reservado para Anotações 2"/>
+        <p:spPr bwMode="auto">
+          <a:noFill/>
+          <a:ln>
+            <a:solidFill>
+              <a:srgbClr val="000000"/>
+            </a:solidFill>
+            <a:miter lim="800000"/>
+            <a:headEnd/>
+            <a:tailEnd/>
+          </a:ln>
+        </p:spPr>
+      </p:sp>
+      <p:sp>
+        <p:nvSpPr>
+          <p:cNvPr id="30723" name="Notes Placeholder 2"/>
           <p:cNvSpPr>
             <a:spLocks noGrp="1"/>
           </p:cNvSpPr>
@@ -2636,17 +2641,20 @@
             <p:ph type="body" idx="1"/>
           </p:nvPr>
         </p:nvSpPr>
-        <p:spPr/>
+        <p:spPr>
+          <a:noFill/>
+          <a:ln/>
+        </p:spPr>
         <p:txBody>
           <a:bodyPr/>
           <a:lstStyle/>
           <a:p>
-            <a:pPr marL="0" marR="0" indent="0" algn="l" defTabSz="914400" rtl="0" eaLnBrk="0" fontAlgn="base" latinLnBrk="0" hangingPunct="0">
+            <a:pPr marL="0" marR="0" indent="0" algn="l" defTabSz="914400" rtl="0" eaLnBrk="1" fontAlgn="base" latinLnBrk="0" hangingPunct="1">
               <a:lnSpc>
                 <a:spcPct val="100000"/>
               </a:lnSpc>
               <a:spcBef>
-                <a:spcPct val="30000"/>
+                <a:spcPct val="0"/>
               </a:spcBef>
               <a:spcAft>
                 <a:spcPct val="0"/>
@@ -2664,29 +2672,37 @@
             </a:r>
           </a:p>
           <a:p>
-            <a:endParaRPr lang="pt-BR" dirty="0"/>
-          </a:p>
-        </p:txBody>
-      </p:sp>
-      <p:sp>
-        <p:nvSpPr>
-          <p:cNvPr id="4" name="Espaço Reservado para Número de Slide 3"/>
-          <p:cNvSpPr>
-            <a:spLocks noGrp="1"/>
-          </p:cNvSpPr>
-          <p:nvPr>
-            <p:ph type="sldNum" sz="quarter" idx="10"/>
-          </p:nvPr>
-        </p:nvSpPr>
-        <p:spPr/>
+            <a:pPr algn="l" eaLnBrk="1" hangingPunct="1">
+              <a:spcBef>
+                <a:spcPct val="0"/>
+              </a:spcBef>
+            </a:pPr>
+            <a:endParaRPr altLang="pt-BR" b="1" i="1" dirty="0"/>
+          </a:p>
+        </p:txBody>
+      </p:sp>
+      <p:sp>
+        <p:nvSpPr>
+          <p:cNvPr id="30724" name="Slide Number Placeholder 3"/>
+          <p:cNvSpPr>
+            <a:spLocks noGrp="1"/>
+          </p:cNvSpPr>
+          <p:nvPr>
+            <p:ph type="sldNum" sz="quarter" idx="5"/>
+          </p:nvPr>
+        </p:nvSpPr>
+        <p:spPr>
+          <a:noFill/>
+        </p:spPr>
         <p:txBody>
           <a:bodyPr/>
           <a:lstStyle/>
           <a:p>
-            <a:fld id="{5BB55D5F-4A0B-4F20-84B6-04A5F9545562}" type="slidenum">
-              <a:rPr lang="pt-BR" altLang="pt-BR" smtClean="0"/>
-              <a:pPr/>
-              <a:t>24</a:t>
+            <a:pPr defTabSz="987425"/>
+            <a:fld id="{A15D2564-4305-46D2-8456-871585EAEBF6}" type="slidenum">
+              <a:rPr lang="pt-BR" altLang="pt-BR"/>
+              <a:pPr defTabSz="987425"/>
+              <a:t>25</a:t>
             </a:fld>
             <a:endParaRPr lang="pt-BR" altLang="pt-BR" dirty="0"/>
           </a:p>
@@ -2695,7 +2711,7 @@
     </p:spTree>
     <p:extLst>
       <p:ext uri="{BB962C8B-B14F-4D97-AF65-F5344CB8AC3E}">
-        <p14:creationId xmlns:p14="http://schemas.microsoft.com/office/powerpoint/2010/main" val="2862495654"/>
+        <p14:creationId xmlns:p14="http://schemas.microsoft.com/office/powerpoint/2010/main" val="558885961"/>
       </p:ext>
     </p:extLst>
   </p:cSld>
@@ -2919,7 +2935,15 @@
                 <a:spcPct val="0"/>
               </a:spcBef>
             </a:pPr>
-            <a:endParaRPr altLang="pt-BR" b="1" i="1" dirty="0"/>
+            <a:r>
+              <a:rPr lang="pt-BR" altLang="pt-BR" b="0" i="0" dirty="0" smtClean="0"/>
+              <a:t>REDE VANET VIRTUALIZADA - </a:t>
+            </a:r>
+            <a:r>
+              <a:rPr lang="pt-BR" altLang="pt-BR" b="0" i="0" dirty="0" err="1" smtClean="0"/>
+              <a:t>VaaS</a:t>
+            </a:r>
+            <a:endParaRPr altLang="pt-BR" b="0" i="0" dirty="0"/>
           </a:p>
         </p:txBody>
       </p:sp>
@@ -3038,7 +3062,7 @@
               <a:defRPr/>
             </a:pPr>
             <a:r>
-              <a:rPr lang="de-DE" altLang="pt-BR" dirty="0" smtClean="0"/>
+              <a:rPr lang="de-DE" altLang="pt-BR" i="0" dirty="0" smtClean="0"/>
               <a:t>FALAR DEVAGAR</a:t>
             </a:r>
           </a:p>
@@ -3048,15 +3072,7 @@
                 <a:spcPct val="0"/>
               </a:spcBef>
             </a:pPr>
-            <a:r>
-              <a:rPr lang="pt-BR" altLang="pt-BR" b="0" i="0" dirty="0" smtClean="0"/>
-              <a:t>REDE VANET VIRTUALIZADA - </a:t>
-            </a:r>
-            <a:r>
-              <a:rPr lang="pt-BR" altLang="pt-BR" b="0" i="0" dirty="0" err="1" smtClean="0"/>
-              <a:t>VaaS</a:t>
-            </a:r>
-            <a:endParaRPr altLang="pt-BR" b="0" i="0" dirty="0"/>
+            <a:endParaRPr altLang="pt-BR" b="1" i="0" dirty="0"/>
           </a:p>
         </p:txBody>
       </p:sp>
@@ -3660,135 +3676,6 @@
 </file>
 
 <file path=ppt/notesSlides/notesSlide31.xml><?xml version="1.0" encoding="utf-8"?>
-<p:notes xmlns:a="http://schemas.openxmlformats.org/drawingml/2006/main" xmlns:r="http://schemas.openxmlformats.org/officeDocument/2006/relationships" xmlns:p="http://schemas.openxmlformats.org/presentationml/2006/main">
-  <p:cSld>
-    <p:spTree>
-      <p:nvGrpSpPr>
-        <p:cNvPr id="1" name=""/>
-        <p:cNvGrpSpPr/>
-        <p:nvPr/>
-      </p:nvGrpSpPr>
-      <p:grpSpPr>
-        <a:xfrm>
-          <a:off x="0" y="0"/>
-          <a:ext cx="0" cy="0"/>
-          <a:chOff x="0" y="0"/>
-          <a:chExt cx="0" cy="0"/>
-        </a:xfrm>
-      </p:grpSpPr>
-      <p:sp>
-        <p:nvSpPr>
-          <p:cNvPr id="30722" name="Slide Image Placeholder 1"/>
-          <p:cNvSpPr>
-            <a:spLocks noGrp="1" noRot="1" noChangeAspect="1" noTextEdit="1"/>
-          </p:cNvSpPr>
-          <p:nvPr>
-            <p:ph type="sldImg"/>
-          </p:nvPr>
-        </p:nvSpPr>
-        <p:spPr bwMode="auto">
-          <a:noFill/>
-          <a:ln>
-            <a:solidFill>
-              <a:srgbClr val="000000"/>
-            </a:solidFill>
-            <a:miter lim="800000"/>
-            <a:headEnd/>
-            <a:tailEnd/>
-          </a:ln>
-        </p:spPr>
-      </p:sp>
-      <p:sp>
-        <p:nvSpPr>
-          <p:cNvPr id="30723" name="Notes Placeholder 2"/>
-          <p:cNvSpPr>
-            <a:spLocks noGrp="1"/>
-          </p:cNvSpPr>
-          <p:nvPr>
-            <p:ph type="body" idx="1"/>
-          </p:nvPr>
-        </p:nvSpPr>
-        <p:spPr>
-          <a:noFill/>
-          <a:ln/>
-        </p:spPr>
-        <p:txBody>
-          <a:bodyPr/>
-          <a:lstStyle/>
-          <a:p>
-            <a:pPr marL="0" marR="0" indent="0" algn="l" defTabSz="914400" rtl="0" eaLnBrk="1" fontAlgn="base" latinLnBrk="0" hangingPunct="1">
-              <a:lnSpc>
-                <a:spcPct val="100000"/>
-              </a:lnSpc>
-              <a:spcBef>
-                <a:spcPct val="0"/>
-              </a:spcBef>
-              <a:spcAft>
-                <a:spcPct val="0"/>
-              </a:spcAft>
-              <a:buClrTx/>
-              <a:buSzTx/>
-              <a:buFontTx/>
-              <a:buNone/>
-              <a:tabLst/>
-              <a:defRPr/>
-            </a:pPr>
-            <a:r>
-              <a:rPr lang="de-DE" altLang="pt-BR" i="0" dirty="0" smtClean="0"/>
-              <a:t>FALAR DEVAGAR</a:t>
-            </a:r>
-          </a:p>
-          <a:p>
-            <a:pPr algn="l" eaLnBrk="1" hangingPunct="1">
-              <a:spcBef>
-                <a:spcPct val="0"/>
-              </a:spcBef>
-            </a:pPr>
-            <a:endParaRPr altLang="pt-BR" b="1" i="0" dirty="0"/>
-          </a:p>
-        </p:txBody>
-      </p:sp>
-      <p:sp>
-        <p:nvSpPr>
-          <p:cNvPr id="30724" name="Slide Number Placeholder 3"/>
-          <p:cNvSpPr>
-            <a:spLocks noGrp="1"/>
-          </p:cNvSpPr>
-          <p:nvPr>
-            <p:ph type="sldNum" sz="quarter" idx="5"/>
-          </p:nvPr>
-        </p:nvSpPr>
-        <p:spPr>
-          <a:noFill/>
-        </p:spPr>
-        <p:txBody>
-          <a:bodyPr/>
-          <a:lstStyle/>
-          <a:p>
-            <a:pPr defTabSz="987425"/>
-            <a:fld id="{A15D2564-4305-46D2-8456-871585EAEBF6}" type="slidenum">
-              <a:rPr lang="pt-BR" altLang="pt-BR"/>
-              <a:pPr defTabSz="987425"/>
-              <a:t>32</a:t>
-            </a:fld>
-            <a:endParaRPr lang="pt-BR" altLang="pt-BR" dirty="0"/>
-          </a:p>
-        </p:txBody>
-      </p:sp>
-    </p:spTree>
-    <p:extLst>
-      <p:ext uri="{BB962C8B-B14F-4D97-AF65-F5344CB8AC3E}">
-        <p14:creationId xmlns:p14="http://schemas.microsoft.com/office/powerpoint/2010/main" val="558885961"/>
-      </p:ext>
-    </p:extLst>
-  </p:cSld>
-  <p:clrMapOvr>
-    <a:masterClrMapping/>
-  </p:clrMapOvr>
-</p:notes>
-</file>
-
-<file path=ppt/notesSlides/notesSlide32.xml><?xml version="1.0" encoding="utf-8"?>
 <p:notes xmlns:a="http://schemas.openxmlformats.org/drawingml/2006/main" xmlns:r="http://schemas.openxmlformats.org/officeDocument/2006/relationships" xmlns:p="http://schemas.openxmlformats.org/presentationml/2006/main">
   <p:cSld>
     <p:spTree>
@@ -3941,7 +3828,7 @@
                 <a:latin typeface="Calibri" pitchFamily="34" charset="0"/>
               </a:rPr>
               <a:pPr algn="r" defTabSz="989013" eaLnBrk="1" hangingPunct="1"/>
-              <a:t>33</a:t>
+              <a:t>32</a:t>
             </a:fld>
             <a:endParaRPr lang="pt-BR" altLang="pt-BR" sz="1300" dirty="0">
               <a:latin typeface="Calibri" pitchFamily="34" charset="0"/>
@@ -5540,7 +5427,7 @@
             </a:pPr>
             <a:fld id="{96F08D13-8879-41C3-9730-C4BBCC168E26}" type="datetime8">
               <a:rPr lang="pt-BR" smtClean="0"/>
-              <a:t>26/05/17 07:16</a:t>
+              <a:t>26/05/17 11:58</a:t>
             </a:fld>
             <a:endParaRPr dirty="0"/>
           </a:p>
@@ -5736,7 +5623,7 @@
             </a:pPr>
             <a:fld id="{CC65DD43-C93F-4E63-9AD7-DC95121224E7}" type="datetime8">
               <a:rPr lang="pt-BR" smtClean="0"/>
-              <a:t>26/05/17 07:16</a:t>
+              <a:t>26/05/17 11:58</a:t>
             </a:fld>
             <a:endParaRPr dirty="0"/>
           </a:p>
@@ -6096,7 +5983,7 @@
             </a:pPr>
             <a:fld id="{D55EE381-6010-4B9C-84F7-F124C19B82C0}" type="datetime8">
               <a:rPr lang="pt-BR" smtClean="0"/>
-              <a:t>26/05/17 07:16</a:t>
+              <a:t>26/05/17 11:58</a:t>
             </a:fld>
             <a:endParaRPr dirty="0"/>
           </a:p>
@@ -6468,7 +6355,7 @@
             </a:pPr>
             <a:fld id="{54D00214-BC78-4AD4-98C0-7C297B5D6497}" type="datetime8">
               <a:rPr lang="pt-BR" smtClean="0"/>
-              <a:t>26/05/17 07:16</a:t>
+              <a:t>26/05/17 11:58</a:t>
             </a:fld>
             <a:endParaRPr dirty="0"/>
           </a:p>
@@ -6865,7 +6752,7 @@
             </a:pPr>
             <a:fld id="{0757E87C-D2DF-488F-9E80-55571E3CBFFF}" type="datetime8">
               <a:rPr lang="pt-BR" smtClean="0"/>
-              <a:t>26/05/17 07:16</a:t>
+              <a:t>26/05/17 11:58</a:t>
             </a:fld>
             <a:endParaRPr dirty="0"/>
           </a:p>
@@ -7285,7 +7172,7 @@
             </a:pPr>
             <a:fld id="{2FFAF354-6191-4676-8E11-5069FF5D5538}" type="datetime8">
               <a:rPr lang="pt-BR" smtClean="0"/>
-              <a:t>26/05/17 07:16</a:t>
+              <a:t>26/05/17 11:58</a:t>
             </a:fld>
             <a:endParaRPr dirty="0"/>
           </a:p>
@@ -7789,7 +7676,7 @@
             </a:pPr>
             <a:fld id="{B7448805-60D7-4724-BB7A-9A93CA05378D}" type="datetime8">
               <a:rPr lang="pt-BR" smtClean="0"/>
-              <a:t>26/05/17 07:16</a:t>
+              <a:t>26/05/17 11:58</a:t>
             </a:fld>
             <a:endParaRPr dirty="0"/>
           </a:p>
@@ -8090,7 +7977,7 @@
             </a:pPr>
             <a:fld id="{93F2A277-7C1A-46FF-AA34-6B2CD5FBE048}" type="datetime8">
               <a:rPr lang="pt-BR" smtClean="0"/>
-              <a:t>26/05/17 07:16</a:t>
+              <a:t>26/05/17 11:58</a:t>
             </a:fld>
             <a:endParaRPr dirty="0"/>
           </a:p>
@@ -8203,7 +8090,7 @@
             </a:pPr>
             <a:fld id="{DC897D33-8A33-48CD-951A-C6BBDD5283FC}" type="datetime8">
               <a:rPr lang="pt-BR" smtClean="0"/>
-              <a:t>26/05/17 07:16</a:t>
+              <a:t>26/05/17 11:58</a:t>
             </a:fld>
             <a:endParaRPr dirty="0"/>
           </a:p>
@@ -8645,7 +8532,7 @@
             </a:pPr>
             <a:fld id="{9EF91099-1E16-4723-967B-A578B15549A9}" type="datetime8">
               <a:rPr lang="pt-BR" smtClean="0"/>
-              <a:t>26/05/17 07:16</a:t>
+              <a:t>26/05/17 11:58</a:t>
             </a:fld>
             <a:endParaRPr dirty="0"/>
           </a:p>
@@ -9119,7 +9006,7 @@
             </a:pPr>
             <a:fld id="{ACA1465C-9880-4FF1-9AE4-4589E5B61984}" type="datetime8">
               <a:rPr lang="pt-BR" smtClean="0"/>
-              <a:t>26/05/17 07:16</a:t>
+              <a:t>26/05/17 11:58</a:t>
             </a:fld>
             <a:endParaRPr dirty="0"/>
           </a:p>
@@ -9397,7 +9284,7 @@
             </a:pPr>
             <a:fld id="{9D7D1D43-165F-4612-97C0-E1B15C5B01A4}" type="datetime8">
               <a:rPr lang="pt-BR" smtClean="0"/>
-              <a:t>26/05/17 07:16</a:t>
+              <a:t>26/05/17 11:58</a:t>
             </a:fld>
             <a:endParaRPr dirty="0"/>
           </a:p>
@@ -13505,11 +13392,23 @@
             <a:pPr algn="just"/>
             <a:r>
               <a:rPr lang="pt-BR" dirty="0" smtClean="0"/>
-              <a:t>Coeficiente de Variação </a:t>
+              <a:t>Processamento (</a:t>
             </a:r>
             <a:r>
               <a:rPr lang="pt-BR" dirty="0"/>
-              <a:t>(Cenário 1)</a:t>
+              <a:t>Cenário </a:t>
+            </a:r>
+            <a:r>
+              <a:rPr lang="pt-BR" dirty="0" smtClean="0"/>
+              <a:t>2 </a:t>
+            </a:r>
+            <a:r>
+              <a:rPr lang="mr-IN" dirty="0" smtClean="0"/>
+              <a:t>–</a:t>
+            </a:r>
+            <a:r>
+              <a:rPr lang="pt-BR" dirty="0" smtClean="0"/>
+              <a:t> 800 veículos)</a:t>
             </a:r>
             <a:endParaRPr u="sng" dirty="0" smtClean="0"/>
           </a:p>
@@ -13566,7 +13465,7 @@
       </p:sp>
       <p:pic>
         <p:nvPicPr>
-          <p:cNvPr id="5" name="Picture 4" descr="grafico_coeficiente_variacao_geral.png"/>
+          <p:cNvPr id="6" name="Picture 5" descr="processamento1.png"/>
           <p:cNvPicPr>
             <a:picLocks noChangeAspect="1"/>
           </p:cNvPicPr>
@@ -13586,8 +13485,8 @@
         </p:blipFill>
         <p:spPr>
           <a:xfrm>
-            <a:off x="1475656" y="2057911"/>
-            <a:ext cx="6192688" cy="4800089"/>
+            <a:off x="1500336" y="2097360"/>
+            <a:ext cx="6096000" cy="4572000"/>
           </a:xfrm>
           <a:prstGeom prst="rect">
             <a:avLst/>
@@ -13597,7 +13496,7 @@
     </p:spTree>
     <p:extLst>
       <p:ext uri="{BB962C8B-B14F-4D97-AF65-F5344CB8AC3E}">
-        <p14:creationId xmlns:p14="http://schemas.microsoft.com/office/powerpoint/2010/main" val="3495718700"/>
+        <p14:creationId xmlns:p14="http://schemas.microsoft.com/office/powerpoint/2010/main" val="1872912114"/>
       </p:ext>
     </p:extLst>
   </p:cSld>
@@ -13711,7 +13610,7 @@
             </a:r>
             <a:r>
               <a:rPr lang="pt-BR" dirty="0" smtClean="0"/>
-              <a:t> 800 veículos)</a:t>
+              <a:t> 1600 veículos)</a:t>
             </a:r>
             <a:endParaRPr u="sng" dirty="0" smtClean="0"/>
           </a:p>
@@ -13768,7 +13667,7 @@
       </p:sp>
       <p:pic>
         <p:nvPicPr>
-          <p:cNvPr id="6" name="Picture 5" descr="processamento1.png"/>
+          <p:cNvPr id="2" name="Picture 1" descr="processamento2.png"/>
           <p:cNvPicPr>
             <a:picLocks noChangeAspect="1"/>
           </p:cNvPicPr>
@@ -13788,7 +13687,7 @@
         </p:blipFill>
         <p:spPr>
           <a:xfrm>
-            <a:off x="1500336" y="2097360"/>
+            <a:off x="1403648" y="2097360"/>
             <a:ext cx="6096000" cy="4572000"/>
           </a:xfrm>
           <a:prstGeom prst="rect">
@@ -13799,7 +13698,7 @@
     </p:spTree>
     <p:extLst>
       <p:ext uri="{BB962C8B-B14F-4D97-AF65-F5344CB8AC3E}">
-        <p14:creationId xmlns:p14="http://schemas.microsoft.com/office/powerpoint/2010/main" val="1872912114"/>
+        <p14:creationId xmlns:p14="http://schemas.microsoft.com/office/powerpoint/2010/main" val="1694983468"/>
       </p:ext>
     </p:extLst>
   </p:cSld>
@@ -13897,23 +13796,15 @@
             <a:pPr algn="just"/>
             <a:r>
               <a:rPr lang="pt-BR" dirty="0" smtClean="0"/>
-              <a:t>Processamento (</a:t>
+              <a:t>Percentual de Perda </a:t>
             </a:r>
             <a:r>
               <a:rPr lang="pt-BR" dirty="0"/>
-              <a:t>Cenário </a:t>
+              <a:t>(Cenário </a:t>
             </a:r>
             <a:r>
               <a:rPr lang="pt-BR" dirty="0" smtClean="0"/>
-              <a:t>2 </a:t>
-            </a:r>
-            <a:r>
-              <a:rPr lang="mr-IN" dirty="0" smtClean="0"/>
-              <a:t>–</a:t>
-            </a:r>
-            <a:r>
-              <a:rPr lang="pt-BR" dirty="0" smtClean="0"/>
-              <a:t> 1600 veículos)</a:t>
+              <a:t>1 e 2)</a:t>
             </a:r>
             <a:endParaRPr u="sng" dirty="0" smtClean="0"/>
           </a:p>
@@ -13970,7 +13861,7 @@
       </p:sp>
       <p:pic>
         <p:nvPicPr>
-          <p:cNvPr id="2" name="Picture 1" descr="processamento2.png"/>
+          <p:cNvPr id="3" name="Picture 2" descr="grafico_perda_qnt_velocidade.png"/>
           <p:cNvPicPr>
             <a:picLocks noChangeAspect="1"/>
           </p:cNvPicPr>
@@ -13990,18 +13881,48 @@
         </p:blipFill>
         <p:spPr>
           <a:xfrm>
-            <a:off x="1403648" y="2097360"/>
-            <a:ext cx="6096000" cy="4572000"/>
+            <a:off x="48005" y="2060848"/>
+            <a:ext cx="4668011" cy="3501008"/>
           </a:xfrm>
           <a:prstGeom prst="rect">
             <a:avLst/>
           </a:prstGeom>
         </p:spPr>
       </p:pic>
+      <p:pic>
+        <p:nvPicPr>
+          <p:cNvPr id="5" name="Picture 4" descr="grafico_perda_qnt_800_1600.png"/>
+          <p:cNvPicPr>
+            <a:picLocks noChangeAspect="1"/>
+          </p:cNvPicPr>
+          <p:nvPr/>
+        </p:nvPicPr>
+        <p:blipFill>
+          <a:blip r:embed="rId4">
+            <a:extLst>
+              <a:ext uri="{28A0092B-C50C-407E-A947-70E740481C1C}">
+                <a14:useLocalDpi xmlns:a14="http://schemas.microsoft.com/office/drawing/2010/main" val="0"/>
+              </a:ext>
+            </a:extLst>
+          </a:blip>
+          <a:stretch>
+            <a:fillRect/>
+          </a:stretch>
+        </p:blipFill>
+        <p:spPr>
+          <a:xfrm>
+            <a:off x="4547997" y="3284984"/>
+            <a:ext cx="4704523" cy="3528392"/>
+          </a:xfrm>
+          <a:prstGeom prst="rect">
+            <a:avLst/>
+          </a:prstGeom>
+        </p:spPr>
+      </p:pic>
     </p:spTree>
     <p:extLst>
       <p:ext uri="{BB962C8B-B14F-4D97-AF65-F5344CB8AC3E}">
-        <p14:creationId xmlns:p14="http://schemas.microsoft.com/office/powerpoint/2010/main" val="1694983468"/>
+        <p14:creationId xmlns:p14="http://schemas.microsoft.com/office/powerpoint/2010/main" val="2369387540"/>
       </p:ext>
     </p:extLst>
   </p:cSld>
@@ -14045,7 +13966,7 @@
       </p:grpSpPr>
       <p:sp>
         <p:nvSpPr>
-          <p:cNvPr id="23554" name="Título 1"/>
+          <p:cNvPr id="2" name="Title 1"/>
           <p:cNvSpPr>
             <a:spLocks noGrp="1"/>
           </p:cNvSpPr>
@@ -14053,27 +13974,24 @@
             <p:ph type="title"/>
           </p:nvPr>
         </p:nvSpPr>
-        <p:spPr>
-          <a:xfrm>
-            <a:off x="179512" y="228600"/>
-            <a:ext cx="8784975" cy="990600"/>
-          </a:xfrm>
-        </p:spPr>
+        <p:spPr/>
         <p:txBody>
           <a:bodyPr/>
           <a:lstStyle/>
           <a:p>
             <a:r>
-              <a:rPr lang="pt-BR" altLang="pt-BR" dirty="0" smtClean="0"/>
-              <a:t>Análise dos Resultados</a:t>
-            </a:r>
-            <a:endParaRPr altLang="pt-BR" sz="2400" dirty="0"/>
-          </a:p>
-        </p:txBody>
-      </p:sp>
-      <p:sp>
-        <p:nvSpPr>
-          <p:cNvPr id="23555" name="Espaço Reservado para Conteúdo 2"/>
+              <a:rPr lang="en-US" altLang="pt-BR" dirty="0" err="1">
+                <a:latin typeface="Calibri" pitchFamily="34" charset="0"/>
+              </a:rPr>
+              <a:t>Conclusões</a:t>
+            </a:r>
+            <a:endParaRPr lang="en-US" dirty="0"/>
+          </a:p>
+        </p:txBody>
+      </p:sp>
+      <p:sp>
+        <p:nvSpPr>
+          <p:cNvPr id="3" name="Content Placeholder 2"/>
           <p:cNvSpPr>
             <a:spLocks noGrp="1"/>
           </p:cNvSpPr>
@@ -14081,64 +13999,46 @@
             <p:ph sz="quarter" idx="1"/>
           </p:nvPr>
         </p:nvSpPr>
-        <p:spPr bwMode="auto">
-          <a:xfrm>
-            <a:off x="285720" y="1600200"/>
-            <a:ext cx="8480455" cy="4972072"/>
-          </a:xfrm>
-        </p:spPr>
-        <p:txBody>
-          <a:bodyPr wrap="square" lIns="91440" tIns="45720" rIns="91440" bIns="45720" numCol="1" anchor="t" anchorCtr="0" compatLnSpc="1">
-            <a:prstTxWarp prst="textNoShape">
-              <a:avLst/>
-            </a:prstTxWarp>
-            <a:normAutofit/>
-          </a:bodyPr>
-          <a:lstStyle/>
-          <a:p>
-            <a:pPr algn="just"/>
-            <a:r>
-              <a:rPr lang="pt-BR" dirty="0" smtClean="0"/>
-              <a:t>Percentual de Perda </a:t>
-            </a:r>
-            <a:r>
-              <a:rPr lang="pt-BR" dirty="0"/>
-              <a:t>(Cenário </a:t>
-            </a:r>
-            <a:r>
-              <a:rPr lang="pt-BR" dirty="0" smtClean="0"/>
-              <a:t>1 e 2)</a:t>
-            </a:r>
-            <a:endParaRPr u="sng" dirty="0" smtClean="0"/>
-          </a:p>
-          <a:p>
-            <a:pPr marL="366713" lvl="1" indent="0" algn="just">
-              <a:buNone/>
-            </a:pPr>
-            <a:endParaRPr lang="pt-BR" dirty="0" smtClean="0"/>
-          </a:p>
-          <a:p>
-            <a:pPr algn="just">
-              <a:lnSpc>
-                <a:spcPct val="150000"/>
-              </a:lnSpc>
-            </a:pPr>
-            <a:endParaRPr b="1" i="1" u="sng" dirty="0" smtClean="0"/>
-          </a:p>
-          <a:p>
-            <a:pPr marL="366713" lvl="1" indent="0" algn="just">
-              <a:lnSpc>
-                <a:spcPct val="150000"/>
-              </a:lnSpc>
-              <a:buNone/>
-            </a:pPr>
-            <a:endParaRPr altLang="pt-BR" dirty="0"/>
-          </a:p>
-        </p:txBody>
-      </p:sp>
-      <p:sp>
-        <p:nvSpPr>
-          <p:cNvPr id="4" name="Espaço Reservado para Número de Slide 3"/>
+        <p:spPr/>
+        <p:txBody>
+          <a:bodyPr/>
+          <a:lstStyle/>
+          <a:p>
+            <a:r>
+              <a:rPr lang="en-US" dirty="0" err="1"/>
+              <a:t>Requisitos</a:t>
+            </a:r>
+            <a:r>
+              <a:rPr lang="en-US" dirty="0"/>
+              <a:t> das </a:t>
+            </a:r>
+            <a:r>
+              <a:rPr lang="en-US" dirty="0" err="1"/>
+              <a:t>Aplicações</a:t>
+            </a:r>
+            <a:r>
+              <a:rPr lang="en-US" dirty="0"/>
+              <a:t> (</a:t>
+            </a:r>
+            <a:r>
+              <a:rPr lang="it-IT" dirty="0" err="1"/>
+              <a:t>Papadimitratos</a:t>
+            </a:r>
+            <a:r>
+              <a:rPr lang="en-US" dirty="0"/>
+              <a:t>, 2008</a:t>
+            </a:r>
+            <a:r>
+              <a:rPr lang="en-US" dirty="0" smtClean="0"/>
+              <a:t>)</a:t>
+            </a:r>
+            <a:endParaRPr lang="en-US" dirty="0"/>
+          </a:p>
+        </p:txBody>
+      </p:sp>
+      <p:sp>
+        <p:nvSpPr>
+          <p:cNvPr id="4" name="Slide Number Placeholder 3"/>
           <p:cNvSpPr>
             <a:spLocks noGrp="1"/>
           </p:cNvSpPr>
@@ -14157,209 +14057,6 @@
               <a:rPr lang="pt-BR" altLang="pt-BR" smtClean="0"/>
               <a:pPr/>
               <a:t>24</a:t>
-            </a:fld>
-            <a:endParaRPr lang="pt-BR" altLang="pt-BR" dirty="0"/>
-          </a:p>
-        </p:txBody>
-      </p:sp>
-      <p:pic>
-        <p:nvPicPr>
-          <p:cNvPr id="3" name="Picture 2" descr="grafico_perda_qnt_velocidade.png"/>
-          <p:cNvPicPr>
-            <a:picLocks noChangeAspect="1"/>
-          </p:cNvPicPr>
-          <p:nvPr/>
-        </p:nvPicPr>
-        <p:blipFill>
-          <a:blip r:embed="rId3">
-            <a:extLst>
-              <a:ext uri="{28A0092B-C50C-407E-A947-70E740481C1C}">
-                <a14:useLocalDpi xmlns:a14="http://schemas.microsoft.com/office/drawing/2010/main" val="0"/>
-              </a:ext>
-            </a:extLst>
-          </a:blip>
-          <a:stretch>
-            <a:fillRect/>
-          </a:stretch>
-        </p:blipFill>
-        <p:spPr>
-          <a:xfrm>
-            <a:off x="48005" y="2060848"/>
-            <a:ext cx="4668011" cy="3501008"/>
-          </a:xfrm>
-          <a:prstGeom prst="rect">
-            <a:avLst/>
-          </a:prstGeom>
-        </p:spPr>
-      </p:pic>
-      <p:pic>
-        <p:nvPicPr>
-          <p:cNvPr id="5" name="Picture 4" descr="grafico_perda_qnt_800_1600.png"/>
-          <p:cNvPicPr>
-            <a:picLocks noChangeAspect="1"/>
-          </p:cNvPicPr>
-          <p:nvPr/>
-        </p:nvPicPr>
-        <p:blipFill>
-          <a:blip r:embed="rId4">
-            <a:extLst>
-              <a:ext uri="{28A0092B-C50C-407E-A947-70E740481C1C}">
-                <a14:useLocalDpi xmlns:a14="http://schemas.microsoft.com/office/drawing/2010/main" val="0"/>
-              </a:ext>
-            </a:extLst>
-          </a:blip>
-          <a:stretch>
-            <a:fillRect/>
-          </a:stretch>
-        </p:blipFill>
-        <p:spPr>
-          <a:xfrm>
-            <a:off x="4547997" y="3284984"/>
-            <a:ext cx="4704523" cy="3528392"/>
-          </a:xfrm>
-          <a:prstGeom prst="rect">
-            <a:avLst/>
-          </a:prstGeom>
-        </p:spPr>
-      </p:pic>
-    </p:spTree>
-    <p:extLst>
-      <p:ext uri="{BB962C8B-B14F-4D97-AF65-F5344CB8AC3E}">
-        <p14:creationId xmlns:p14="http://schemas.microsoft.com/office/powerpoint/2010/main" val="2369387540"/>
-      </p:ext>
-    </p:extLst>
-  </p:cSld>
-  <p:clrMapOvr>
-    <a:masterClrMapping/>
-  </p:clrMapOvr>
-  <mc:AlternateContent xmlns:mc="http://schemas.openxmlformats.org/markup-compatibility/2006" xmlns:p14="http://schemas.microsoft.com/office/powerpoint/2010/main">
-    <mc:Choice Requires="p14">
-      <p:transition p14:dur="0"/>
-    </mc:Choice>
-    <mc:Fallback xmlns="">
-      <p:transition xmlns:p14="http://schemas.microsoft.com/office/powerpoint/2010/main"/>
-    </mc:Fallback>
-  </mc:AlternateContent>
-  <p:timing>
-    <p:tnLst>
-      <p:par>
-        <p:cTn xmlns:p14="http://schemas.microsoft.com/office/powerpoint/2010/main" id="1" dur="indefinite" restart="never" nodeType="tmRoot"/>
-      </p:par>
-    </p:tnLst>
-  </p:timing>
-</p:sld>
-</file>
-
-<file path=ppt/slides/slide25.xml><?xml version="1.0" encoding="utf-8"?>
-<p:sld xmlns:a="http://schemas.openxmlformats.org/drawingml/2006/main" xmlns:r="http://schemas.openxmlformats.org/officeDocument/2006/relationships" xmlns:p="http://schemas.openxmlformats.org/presentationml/2006/main">
-  <p:cSld>
-    <p:spTree>
-      <p:nvGrpSpPr>
-        <p:cNvPr id="1" name=""/>
-        <p:cNvGrpSpPr/>
-        <p:nvPr/>
-      </p:nvGrpSpPr>
-      <p:grpSpPr>
-        <a:xfrm>
-          <a:off x="0" y="0"/>
-          <a:ext cx="0" cy="0"/>
-          <a:chOff x="0" y="0"/>
-          <a:chExt cx="0" cy="0"/>
-        </a:xfrm>
-      </p:grpSpPr>
-      <p:sp>
-        <p:nvSpPr>
-          <p:cNvPr id="2" name="Title 1"/>
-          <p:cNvSpPr>
-            <a:spLocks noGrp="1"/>
-          </p:cNvSpPr>
-          <p:nvPr>
-            <p:ph type="title"/>
-          </p:nvPr>
-        </p:nvSpPr>
-        <p:spPr/>
-        <p:txBody>
-          <a:bodyPr/>
-          <a:lstStyle/>
-          <a:p>
-            <a:r>
-              <a:rPr lang="en-US" altLang="pt-BR" dirty="0" err="1">
-                <a:latin typeface="Calibri" pitchFamily="34" charset="0"/>
-              </a:rPr>
-              <a:t>Conclusões</a:t>
-            </a:r>
-            <a:endParaRPr lang="en-US" dirty="0"/>
-          </a:p>
-        </p:txBody>
-      </p:sp>
-      <p:sp>
-        <p:nvSpPr>
-          <p:cNvPr id="3" name="Content Placeholder 2"/>
-          <p:cNvSpPr>
-            <a:spLocks noGrp="1"/>
-          </p:cNvSpPr>
-          <p:nvPr>
-            <p:ph sz="quarter" idx="1"/>
-          </p:nvPr>
-        </p:nvSpPr>
-        <p:spPr/>
-        <p:txBody>
-          <a:bodyPr/>
-          <a:lstStyle/>
-          <a:p>
-            <a:r>
-              <a:rPr lang="en-US" dirty="0" err="1"/>
-              <a:t>Requisitos</a:t>
-            </a:r>
-            <a:r>
-              <a:rPr lang="en-US" dirty="0"/>
-              <a:t> das </a:t>
-            </a:r>
-            <a:r>
-              <a:rPr lang="en-US" dirty="0" err="1"/>
-              <a:t>Aplicações</a:t>
-            </a:r>
-            <a:r>
-              <a:rPr lang="en-US" dirty="0"/>
-              <a:t> (</a:t>
-            </a:r>
-            <a:r>
-              <a:rPr lang="it-IT" dirty="0" err="1"/>
-              <a:t>Papadimitratos</a:t>
-            </a:r>
-            <a:r>
-              <a:rPr lang="en-US" dirty="0"/>
-              <a:t>, 2008</a:t>
-            </a:r>
-            <a:r>
-              <a:rPr lang="en-US" dirty="0" smtClean="0"/>
-              <a:t>)</a:t>
-            </a:r>
-            <a:endParaRPr lang="en-US" dirty="0"/>
-          </a:p>
-        </p:txBody>
-      </p:sp>
-      <p:sp>
-        <p:nvSpPr>
-          <p:cNvPr id="4" name="Slide Number Placeholder 3"/>
-          <p:cNvSpPr>
-            <a:spLocks noGrp="1"/>
-          </p:cNvSpPr>
-          <p:nvPr>
-            <p:ph type="sldNum" sz="quarter" idx="12"/>
-          </p:nvPr>
-        </p:nvSpPr>
-        <p:spPr/>
-        <p:txBody>
-          <a:bodyPr>
-            <a:normAutofit fontScale="85000" lnSpcReduction="20000"/>
-          </a:bodyPr>
-          <a:lstStyle/>
-          <a:p>
-            <a:fld id="{552ECE8C-316A-4354-A4B8-86A79814135A}" type="slidenum">
-              <a:rPr lang="pt-BR" altLang="pt-BR" smtClean="0"/>
-              <a:pPr/>
-              <a:t>25</a:t>
             </a:fld>
             <a:endParaRPr lang="pt-BR" altLang="pt-BR" dirty="0"/>
           </a:p>
@@ -14387,7 +14084,7 @@
           <a:graphicData uri="http://schemas.openxmlformats.org/presentationml/2006/ole">
             <mc:AlternateContent xmlns:mc="http://schemas.openxmlformats.org/markup-compatibility/2006">
               <mc:Choice xmlns:v="urn:schemas-microsoft-com:vml" Requires="v">
-                <p:oleObj spid="_x0000_s1038" name="Document" r:id="rId3" imgW="5626100" imgH="2019300" progId="Word.Document.12">
+                <p:oleObj spid="_x0000_s1059" name="Document" r:id="rId3" imgW="5626100" imgH="2019300" progId="Word.Document.12">
                   <p:link updateAutomatic="1"/>
                 </p:oleObj>
               </mc:Choice>
@@ -14435,6 +14132,246 @@
 </p:sld>
 </file>
 
+<file path=ppt/slides/slide25.xml><?xml version="1.0" encoding="utf-8"?>
+<p:sld xmlns:a="http://schemas.openxmlformats.org/drawingml/2006/main" xmlns:r="http://schemas.openxmlformats.org/officeDocument/2006/relationships" xmlns:p="http://schemas.openxmlformats.org/presentationml/2006/main">
+  <p:cSld>
+    <p:spTree>
+      <p:nvGrpSpPr>
+        <p:cNvPr id="1" name=""/>
+        <p:cNvGrpSpPr/>
+        <p:nvPr/>
+      </p:nvGrpSpPr>
+      <p:grpSpPr>
+        <a:xfrm>
+          <a:off x="0" y="0"/>
+          <a:ext cx="0" cy="0"/>
+          <a:chOff x="0" y="0"/>
+          <a:chExt cx="0" cy="0"/>
+        </a:xfrm>
+      </p:grpSpPr>
+      <p:sp>
+        <p:nvSpPr>
+          <p:cNvPr id="29698" name="Title 1"/>
+          <p:cNvSpPr>
+            <a:spLocks noGrp="1"/>
+          </p:cNvSpPr>
+          <p:nvPr>
+            <p:ph type="title"/>
+          </p:nvPr>
+        </p:nvSpPr>
+        <p:spPr/>
+        <p:txBody>
+          <a:bodyPr/>
+          <a:lstStyle/>
+          <a:p>
+            <a:r>
+              <a:rPr lang="en-US" altLang="pt-BR" dirty="0" err="1" smtClean="0">
+                <a:latin typeface="Calibri" pitchFamily="34" charset="0"/>
+              </a:rPr>
+              <a:t>Trabalhos</a:t>
+            </a:r>
+            <a:r>
+              <a:rPr lang="en-US" altLang="pt-BR" dirty="0" smtClean="0">
+                <a:latin typeface="Calibri" pitchFamily="34" charset="0"/>
+              </a:rPr>
+              <a:t> </a:t>
+            </a:r>
+            <a:r>
+              <a:rPr lang="en-US" altLang="pt-BR" dirty="0" err="1" smtClean="0">
+                <a:latin typeface="Calibri" pitchFamily="34" charset="0"/>
+              </a:rPr>
+              <a:t>Futuros</a:t>
+            </a:r>
+            <a:endParaRPr altLang="pt-BR" dirty="0">
+              <a:latin typeface="Calibri" pitchFamily="34" charset="0"/>
+            </a:endParaRPr>
+          </a:p>
+        </p:txBody>
+      </p:sp>
+      <p:sp>
+        <p:nvSpPr>
+          <p:cNvPr id="2" name="Content Placeholder 1"/>
+          <p:cNvSpPr>
+            <a:spLocks noGrp="1"/>
+          </p:cNvSpPr>
+          <p:nvPr>
+            <p:ph sz="quarter" idx="1"/>
+          </p:nvPr>
+        </p:nvSpPr>
+        <p:spPr>
+          <a:xfrm>
+            <a:off x="612648" y="1600200"/>
+            <a:ext cx="8153400" cy="4997152"/>
+          </a:xfrm>
+        </p:spPr>
+        <p:txBody>
+          <a:bodyPr>
+            <a:normAutofit/>
+          </a:bodyPr>
+          <a:lstStyle/>
+          <a:p>
+            <a:r>
+              <a:rPr lang="pt-BR" dirty="0" smtClean="0"/>
+              <a:t>Alterar a </a:t>
+            </a:r>
+            <a:r>
+              <a:rPr lang="pt-BR" dirty="0"/>
+              <a:t>organização dos servidores visando uma melhor distribuição dos veículos e diminuindo a carga com a operação </a:t>
+            </a:r>
+            <a:r>
+              <a:rPr lang="pt-BR" b="1" i="1" dirty="0" err="1" smtClean="0"/>
+              <a:t>ChangeServer</a:t>
+            </a:r>
+            <a:r>
+              <a:rPr lang="pt-BR" dirty="0" smtClean="0"/>
+              <a:t>; </a:t>
+            </a:r>
+          </a:p>
+          <a:p>
+            <a:r>
+              <a:rPr lang="pt-BR" dirty="0"/>
+              <a:t>N</a:t>
+            </a:r>
+            <a:r>
+              <a:rPr lang="pt-BR" dirty="0" smtClean="0"/>
+              <a:t>ovos </a:t>
+            </a:r>
+            <a:r>
+              <a:rPr lang="pt-BR" dirty="0"/>
+              <a:t>protocolos de </a:t>
+            </a:r>
+            <a:r>
+              <a:rPr lang="pt-BR" dirty="0" smtClean="0"/>
+              <a:t>comunicação (JSON e </a:t>
+            </a:r>
+            <a:r>
+              <a:rPr lang="pt-BR" dirty="0" err="1" smtClean="0"/>
+              <a:t>WebSocket</a:t>
+            </a:r>
+            <a:r>
+              <a:rPr lang="pt-BR" dirty="0" smtClean="0"/>
+              <a:t>); </a:t>
+            </a:r>
+          </a:p>
+          <a:p>
+            <a:r>
+              <a:rPr lang="pt-BR" dirty="0" smtClean="0"/>
+              <a:t>Novas </a:t>
+            </a:r>
+            <a:r>
+              <a:rPr lang="pt-BR" dirty="0"/>
+              <a:t>regras de </a:t>
+            </a:r>
+            <a:r>
+              <a:rPr lang="pt-BR" dirty="0" smtClean="0"/>
+              <a:t>segurança (</a:t>
+            </a:r>
+            <a:r>
+              <a:rPr lang="pt-BR" dirty="0" err="1" smtClean="0"/>
+              <a:t>BlockChain</a:t>
+            </a:r>
+            <a:r>
+              <a:rPr lang="pt-BR" dirty="0" smtClean="0"/>
+              <a:t>);</a:t>
+            </a:r>
+          </a:p>
+          <a:p>
+            <a:r>
+              <a:rPr lang="pt-BR" dirty="0" smtClean="0"/>
+              <a:t>Criando </a:t>
+            </a:r>
+            <a:r>
+              <a:rPr lang="pt-BR" dirty="0"/>
+              <a:t>diversas aplicações como sistema de detecção e alerta de congestionamento em cruzamentos </a:t>
+            </a:r>
+            <a:r>
+              <a:rPr lang="pt-BR" dirty="0" err="1" smtClean="0"/>
+              <a:t>semaforizados</a:t>
+            </a:r>
+            <a:r>
+              <a:rPr lang="pt-BR" dirty="0" smtClean="0"/>
+              <a:t> (desenvolvido);</a:t>
+            </a:r>
+            <a:endParaRPr lang="pt-BR" dirty="0"/>
+          </a:p>
+        </p:txBody>
+      </p:sp>
+      <p:sp>
+        <p:nvSpPr>
+          <p:cNvPr id="29700" name="Rectangle 22"/>
+          <p:cNvSpPr>
+            <a:spLocks/>
+          </p:cNvSpPr>
+          <p:nvPr/>
+        </p:nvSpPr>
+        <p:spPr bwMode="auto">
+          <a:xfrm>
+            <a:off x="0" y="1271588"/>
+            <a:ext cx="533400" cy="244475"/>
+          </a:xfrm>
+          <a:prstGeom prst="rect">
+            <a:avLst/>
+          </a:prstGeom>
+          <a:noFill/>
+          <a:ln w="9525">
+            <a:noFill/>
+            <a:miter lim="800000"/>
+            <a:headEnd/>
+            <a:tailEnd/>
+          </a:ln>
+        </p:spPr>
+        <p:txBody>
+          <a:bodyPr anchor="ctr"/>
+          <a:lstStyle/>
+          <a:p>
+            <a:pPr algn="ctr" eaLnBrk="1" hangingPunct="1"/>
+            <a:fld id="{2213E8A9-2084-4B2F-A4D9-614C179387CC}" type="slidenum">
+              <a:rPr lang="pt-BR" altLang="pt-BR" sz="1200" b="1">
+                <a:solidFill>
+                  <a:schemeClr val="bg1"/>
+                </a:solidFill>
+                <a:latin typeface="Tw Cen MT" pitchFamily="34" charset="0"/>
+              </a:rPr>
+              <a:pPr algn="ctr" eaLnBrk="1" hangingPunct="1"/>
+              <a:t>25</a:t>
+            </a:fld>
+            <a:endParaRPr lang="pt-BR" altLang="pt-BR" sz="1400" b="1" dirty="0">
+              <a:solidFill>
+                <a:schemeClr val="bg1"/>
+              </a:solidFill>
+              <a:latin typeface="Tw Cen MT" pitchFamily="34" charset="0"/>
+            </a:endParaRPr>
+          </a:p>
+        </p:txBody>
+      </p:sp>
+    </p:spTree>
+    <p:extLst>
+      <p:ext uri="{BB962C8B-B14F-4D97-AF65-F5344CB8AC3E}">
+        <p14:creationId xmlns:p14="http://schemas.microsoft.com/office/powerpoint/2010/main" val="3173586640"/>
+      </p:ext>
+    </p:extLst>
+  </p:cSld>
+  <p:clrMapOvr>
+    <a:masterClrMapping/>
+  </p:clrMapOvr>
+  <mc:AlternateContent xmlns:mc="http://schemas.openxmlformats.org/markup-compatibility/2006" xmlns:p14="http://schemas.microsoft.com/office/powerpoint/2010/main">
+    <mc:Choice Requires="p14">
+      <p:transition p14:dur="0"/>
+    </mc:Choice>
+    <mc:Fallback xmlns="">
+      <p:transition xmlns:p14="http://schemas.microsoft.com/office/powerpoint/2010/main"/>
+    </mc:Fallback>
+  </mc:AlternateContent>
+  <p:timing>
+    <p:tnLst>
+      <p:par>
+        <p:cTn xmlns:p14="http://schemas.microsoft.com/office/powerpoint/2010/main" id="1" dur="indefinite" restart="never" nodeType="tmRoot"/>
+      </p:par>
+    </p:tnLst>
+  </p:timing>
+</p:sld>
+</file>
+
 <file path=ppt/slides/slide26.xml><?xml version="1.0" encoding="utf-8"?>
 <p:sld xmlns:a="http://schemas.openxmlformats.org/drawingml/2006/main" xmlns:r="http://schemas.openxmlformats.org/officeDocument/2006/relationships" xmlns:p="http://schemas.openxmlformats.org/presentationml/2006/main">
   <p:cSld>
@@ -14515,88 +14452,37 @@
           <a:p>
             <a:r>
               <a:rPr lang="pt-BR" dirty="0" smtClean="0"/>
-              <a:t>Alterar a </a:t>
+              <a:t>Implementação </a:t>
             </a:r>
             <a:r>
               <a:rPr lang="pt-BR" dirty="0"/>
-              <a:t>organização dos servidores visando uma melhor distribuição dos veículos e diminuindo a carga com a operação </a:t>
-            </a:r>
-            <a:r>
-              <a:rPr lang="pt-BR" b="1" i="1" dirty="0" err="1" smtClean="0"/>
-              <a:t>ChangeServer</a:t>
+              <a:t>de uma plataforma web de </a:t>
             </a:r>
             <a:r>
               <a:rPr lang="pt-BR" dirty="0" smtClean="0"/>
-              <a:t>; </a:t>
-            </a:r>
-          </a:p>
-          <a:p>
+              <a:t>simulação (sendo desenvolvido);</a:t>
+            </a:r>
+          </a:p>
+          <a:p>
+            <a:r>
+              <a:rPr lang="pt-BR" dirty="0" smtClean="0"/>
+              <a:t>Controle </a:t>
+            </a:r>
             <a:r>
               <a:rPr lang="pt-BR" dirty="0"/>
-              <a:t>N</a:t>
+              <a:t>de passagem livre para veículos de urgência e </a:t>
             </a:r>
             <a:r>
               <a:rPr lang="pt-BR" dirty="0" smtClean="0"/>
-              <a:t>ovos </a:t>
-            </a:r>
-            <a:r>
-              <a:rPr lang="pt-BR" dirty="0"/>
-              <a:t>protocolos de </a:t>
-            </a:r>
+              <a:t>emergência;</a:t>
+            </a:r>
+          </a:p>
+          <a:p>
             <a:r>
               <a:rPr lang="pt-BR" dirty="0" smtClean="0"/>
-              <a:t>comunicação (JSON e </a:t>
-            </a:r>
-            <a:r>
-              <a:rPr lang="pt-BR" dirty="0" err="1" smtClean="0"/>
-              <a:t>WebSocket</a:t>
-            </a:r>
-            <a:r>
-              <a:rPr lang="pt-BR" dirty="0" smtClean="0"/>
-              <a:t>); </a:t>
-            </a:r>
-            <a:endParaRPr lang="pt-BR" dirty="0" smtClean="0"/>
-          </a:p>
-          <a:p>
-            <a:r>
-              <a:rPr lang="pt-BR" dirty="0" smtClean="0"/>
-              <a:t>Novas </a:t>
-            </a:r>
-            <a:r>
-              <a:rPr lang="pt-BR" dirty="0"/>
-              <a:t>regras de </a:t>
-            </a:r>
-            <a:r>
-              <a:rPr lang="pt-BR" dirty="0" smtClean="0"/>
-              <a:t>segurança (</a:t>
-            </a:r>
-            <a:r>
-              <a:rPr lang="pt-BR" dirty="0" err="1" smtClean="0"/>
-              <a:t>BlockChain</a:t>
-            </a:r>
-            <a:r>
-              <a:rPr lang="pt-BR" dirty="0" smtClean="0"/>
-              <a:t>);</a:t>
-            </a:r>
-          </a:p>
-          <a:p>
-            <a:r>
-              <a:rPr lang="pt-BR" dirty="0" smtClean="0"/>
-              <a:t>Criando </a:t>
-            </a:r>
-            <a:r>
-              <a:rPr lang="pt-BR" dirty="0"/>
-              <a:t>diversas aplicações como sistema de detecção e alerta de congestionamento em cruzamentos </a:t>
-            </a:r>
-            <a:r>
-              <a:rPr lang="pt-BR" dirty="0" err="1" smtClean="0"/>
-              <a:t>semaforizados</a:t>
-            </a:r>
-            <a:r>
-              <a:rPr lang="pt-BR" dirty="0" smtClean="0"/>
-              <a:t> (desenvolvido);</a:t>
-            </a:r>
-            <a:endParaRPr lang="pt-BR" dirty="0"/>
+              <a:t>Comunicação entre veículos e seguradoras.</a:t>
+            </a:r>
+            <a:endParaRPr lang="en-US" dirty="0"/>
           </a:p>
         </p:txBody>
       </p:sp>
@@ -14651,7 +14537,7 @@
     </p:spTree>
     <p:extLst>
       <p:ext uri="{BB962C8B-B14F-4D97-AF65-F5344CB8AC3E}">
-        <p14:creationId xmlns:p14="http://schemas.microsoft.com/office/powerpoint/2010/main" val="3173586640"/>
+        <p14:creationId xmlns:p14="http://schemas.microsoft.com/office/powerpoint/2010/main" val="2214430772"/>
       </p:ext>
     </p:extLst>
   </p:cSld>
@@ -14712,19 +14598,7 @@
               <a:rPr lang="en-US" altLang="pt-BR" dirty="0" err="1" smtClean="0">
                 <a:latin typeface="Calibri" pitchFamily="34" charset="0"/>
               </a:rPr>
-              <a:t>Trabalhos</a:t>
-            </a:r>
-            <a:r>
-              <a:rPr lang="en-US" altLang="pt-BR" dirty="0" smtClean="0">
-                <a:latin typeface="Calibri" pitchFamily="34" charset="0"/>
-              </a:rPr>
-              <a:t> </a:t>
-            </a:r>
-            <a:r>
-              <a:rPr lang="en-US" altLang="pt-BR" dirty="0" err="1" smtClean="0">
-                <a:latin typeface="Calibri" pitchFamily="34" charset="0"/>
-              </a:rPr>
-              <a:t>Futuros</a:t>
+              <a:t>Contribuições</a:t>
             </a:r>
             <a:endParaRPr altLang="pt-BR" dirty="0">
               <a:latin typeface="Calibri" pitchFamily="34" charset="0"/>
@@ -14742,65 +14616,33 @@
             <p:ph sz="quarter" idx="1"/>
           </p:nvPr>
         </p:nvSpPr>
-        <p:spPr>
-          <a:xfrm>
-            <a:off x="612648" y="1600200"/>
-            <a:ext cx="8153400" cy="4997152"/>
-          </a:xfrm>
-        </p:spPr>
+        <p:spPr/>
         <p:txBody>
           <a:bodyPr>
             <a:normAutofit/>
           </a:bodyPr>
           <a:lstStyle/>
           <a:p>
+            <a:pPr algn="just"/>
             <a:r>
               <a:rPr lang="pt-BR" dirty="0" smtClean="0"/>
-              <a:t>Implementação </a:t>
+              <a:t>O modelo </a:t>
             </a:r>
             <a:r>
               <a:rPr lang="pt-BR" dirty="0"/>
-              <a:t>de uma plataforma web de </a:t>
+              <a:t>proposto permite montar uma rede veicular em nuvem e realizar todo gerenciamento e comunicação de maneira virtual, permitindo criar ambientes flexíveis capazes de oferecer o gerenciamento de uma rede veicular como serviço (</a:t>
+            </a:r>
+            <a:r>
+              <a:rPr lang="pt-BR" dirty="0" err="1"/>
+              <a:t>VaaS</a:t>
+            </a:r>
+            <a:r>
+              <a:rPr lang="pt-BR" dirty="0"/>
+              <a:t>)</a:t>
             </a:r>
             <a:r>
               <a:rPr lang="pt-BR" dirty="0" smtClean="0"/>
-              <a:t>simulação </a:t>
-            </a:r>
-            <a:r>
-              <a:rPr lang="pt-BR" dirty="0" smtClean="0"/>
-              <a:t>(sendo </a:t>
-            </a:r>
-            <a:r>
-              <a:rPr lang="pt-BR" dirty="0" smtClean="0"/>
-              <a:t>desenvolvido);</a:t>
-            </a:r>
-          </a:p>
-          <a:p>
-            <a:r>
-              <a:rPr lang="pt-BR" dirty="0" smtClean="0"/>
-              <a:t>Controle </a:t>
-            </a:r>
-            <a:r>
-              <a:rPr lang="pt-BR" dirty="0"/>
-              <a:t>de passagem livre para veículos de urgência e </a:t>
-            </a:r>
-            <a:r>
-              <a:rPr lang="pt-BR" dirty="0" smtClean="0"/>
-              <a:t>emergência</a:t>
-            </a:r>
-            <a:r>
-              <a:rPr lang="pt-BR" dirty="0" smtClean="0"/>
-              <a:t>;</a:t>
-            </a:r>
-          </a:p>
-          <a:p>
-            <a:r>
-              <a:rPr lang="pt-BR" dirty="0" smtClean="0"/>
-              <a:t>Comunicação entre veículos e </a:t>
-            </a:r>
-            <a:r>
-              <a:rPr lang="pt-BR" dirty="0" smtClean="0"/>
-              <a:t>seguradoras.</a:t>
+              <a:t>.</a:t>
             </a:r>
             <a:endParaRPr lang="en-US" dirty="0"/>
           </a:p>
@@ -14857,7 +14699,7 @@
     </p:spTree>
     <p:extLst>
       <p:ext uri="{BB962C8B-B14F-4D97-AF65-F5344CB8AC3E}">
-        <p14:creationId xmlns:p14="http://schemas.microsoft.com/office/powerpoint/2010/main" val="2214430772"/>
+        <p14:creationId xmlns:p14="http://schemas.microsoft.com/office/powerpoint/2010/main" val="648453620"/>
       </p:ext>
     </p:extLst>
   </p:cSld>
@@ -14918,7 +14760,7 @@
               <a:rPr lang="en-US" altLang="pt-BR" dirty="0" err="1" smtClean="0">
                 <a:latin typeface="Calibri" pitchFamily="34" charset="0"/>
               </a:rPr>
-              <a:t>Contribuições</a:t>
+              <a:t>Publicações</a:t>
             </a:r>
             <a:endParaRPr altLang="pt-BR" dirty="0">
               <a:latin typeface="Calibri" pitchFamily="34" charset="0"/>
@@ -14936,35 +14778,144 @@
             <p:ph sz="quarter" idx="1"/>
           </p:nvPr>
         </p:nvSpPr>
-        <p:spPr/>
+        <p:spPr>
+          <a:xfrm>
+            <a:off x="612648" y="1600200"/>
+            <a:ext cx="8153400" cy="4997152"/>
+          </a:xfrm>
+        </p:spPr>
         <p:txBody>
           <a:bodyPr>
-            <a:normAutofit/>
+            <a:normAutofit fontScale="85000" lnSpcReduction="20000"/>
           </a:bodyPr>
           <a:lstStyle/>
           <a:p>
             <a:pPr algn="just"/>
             <a:r>
+              <a:rPr lang="en-US" dirty="0" err="1" smtClean="0"/>
+              <a:t>Conferências</a:t>
+            </a:r>
+            <a:r>
+              <a:rPr lang="en-US" dirty="0" smtClean="0"/>
+              <a:t>:</a:t>
+            </a:r>
+          </a:p>
+          <a:p>
+            <a:pPr lvl="1" algn="just"/>
+            <a:r>
+              <a:rPr lang="en-US" b="1" dirty="0" smtClean="0"/>
+              <a:t>ERBASE 2016</a:t>
+            </a:r>
+            <a:r>
+              <a:rPr lang="en-US" dirty="0" smtClean="0"/>
+              <a:t>: </a:t>
+            </a:r>
+            <a:r>
+              <a:rPr lang="pt-BR" dirty="0"/>
+              <a:t>Modelo de uma Arquitetura de Software para </a:t>
+            </a:r>
+            <a:r>
               <a:rPr lang="pt-BR" dirty="0" smtClean="0"/>
-              <a:t>O modelo </a:t>
+              <a:t>Virtualização </a:t>
             </a:r>
             <a:r>
               <a:rPr lang="pt-BR" dirty="0"/>
-              <a:t>proposto permite montar uma rede veicular em nuvem e realizar todo gerenciamento e comunicação de maneira virtual, permitindo criar ambientes flexíveis capazes de oferecer o gerenciamento de uma rede veicular como serviço (</a:t>
-            </a:r>
-            <a:r>
-              <a:rPr lang="pt-BR" dirty="0" err="1"/>
-              <a:t>VaaS</a:t>
+              <a:t>de uma Rede </a:t>
+            </a:r>
+            <a:r>
+              <a:rPr lang="pt-BR" dirty="0" smtClean="0"/>
+              <a:t>Veicular. </a:t>
+            </a:r>
+          </a:p>
+          <a:p>
+            <a:pPr lvl="1" algn="just"/>
+            <a:r>
+              <a:rPr lang="en-US" b="1" dirty="0" smtClean="0"/>
+              <a:t>CONNEPI 2016 </a:t>
+            </a:r>
+          </a:p>
+          <a:p>
+            <a:pPr lvl="2" algn="just"/>
+            <a:r>
+              <a:rPr lang="es-ES_tradnl" dirty="0"/>
+              <a:t>IDENTIFICANDO NÍVEIS DE CONGESTIONAMENTO EM CRUZAMENTOS COM SINALIZAÇÃO SEMAFÓRICA, UTILIZANDO LÓGICA FUZZY E REDE </a:t>
+            </a:r>
+            <a:r>
+              <a:rPr lang="es-ES_tradnl" dirty="0" smtClean="0"/>
+              <a:t>VEICULAR. </a:t>
+            </a:r>
+            <a:endParaRPr lang="en-US" dirty="0" smtClean="0"/>
+          </a:p>
+          <a:p>
+            <a:pPr lvl="2" algn="just"/>
+            <a:r>
+              <a:rPr lang="es-ES_tradnl" dirty="0" smtClean="0"/>
+              <a:t>UM </a:t>
+            </a:r>
+            <a:r>
+              <a:rPr lang="es-ES_tradnl" dirty="0"/>
+              <a:t>COMPARATIVO ENTRE MÉTODOS DE COMUNICAÇÃO EM SISTEMAS EMBARCADOS </a:t>
+            </a:r>
+            <a:endParaRPr lang="es-ES_tradnl" dirty="0" smtClean="0"/>
+          </a:p>
+          <a:p>
+            <a:pPr lvl="1" algn="just"/>
+            <a:r>
+              <a:rPr lang="pt-BR" b="1" dirty="0"/>
+              <a:t>EATIS </a:t>
+            </a:r>
+            <a:r>
+              <a:rPr lang="pt-BR" b="1" dirty="0" smtClean="0"/>
+              <a:t>2016 (B3)</a:t>
+            </a:r>
+            <a:r>
+              <a:rPr lang="pt-BR" dirty="0" smtClean="0"/>
+              <a:t>: </a:t>
             </a:r>
             <a:r>
               <a:rPr lang="pt-BR" dirty="0"/>
+              <a:t>Uma Proposta de Arquitetura Orientada a Serviços com Foco em Interoperabilidade entre Sensores para ITS em Cidades </a:t>
+            </a:r>
+            <a:r>
+              <a:rPr lang="pt-BR" dirty="0" smtClean="0"/>
+              <a:t>Inteligentes</a:t>
+            </a:r>
+            <a:endParaRPr lang="en-US" dirty="0" smtClean="0"/>
+          </a:p>
+          <a:p>
+            <a:pPr lvl="1" algn="just"/>
+            <a:r>
+              <a:rPr lang="en-US" b="1" dirty="0" smtClean="0"/>
+              <a:t>WETICE 2017 (B1)</a:t>
+            </a:r>
+            <a:r>
+              <a:rPr lang="en-US" dirty="0" smtClean="0"/>
+              <a:t> - A Platform for Vehicular Networks in the Cloud to Applications in Intelligent Transportation Systems </a:t>
+            </a:r>
+          </a:p>
+          <a:p>
+            <a:pPr algn="just"/>
+            <a:r>
+              <a:rPr lang="en-US" dirty="0" err="1"/>
+              <a:t>Periódicos</a:t>
+            </a:r>
+            <a:endParaRPr lang="en-US" dirty="0"/>
+          </a:p>
+          <a:p>
+            <a:pPr lvl="1" algn="just"/>
+            <a:r>
+              <a:rPr lang="en-US" dirty="0"/>
+              <a:t>Ad Hoc Network </a:t>
+            </a:r>
+            <a:r>
+              <a:rPr lang="en-US" b="1" dirty="0"/>
+              <a:t>(A2</a:t>
+            </a:r>
+            <a:r>
+              <a:rPr lang="en-US" b="1" dirty="0" smtClean="0"/>
               <a:t>)</a:t>
             </a:r>
-            <a:r>
-              <a:rPr lang="pt-BR" dirty="0" smtClean="0"/>
-              <a:t>.</a:t>
-            </a:r>
-            <a:endParaRPr lang="en-US" dirty="0"/>
+            <a:endParaRPr lang="en-US" b="1" dirty="0"/>
           </a:p>
         </p:txBody>
       </p:sp>
@@ -15019,7 +14970,7 @@
     </p:spTree>
     <p:extLst>
       <p:ext uri="{BB962C8B-B14F-4D97-AF65-F5344CB8AC3E}">
-        <p14:creationId xmlns:p14="http://schemas.microsoft.com/office/powerpoint/2010/main" val="648453620"/>
+        <p14:creationId xmlns:p14="http://schemas.microsoft.com/office/powerpoint/2010/main" val="3394059823"/>
       </p:ext>
     </p:extLst>
   </p:cSld>
@@ -15080,7 +15031,7 @@
               <a:rPr lang="en-US" altLang="pt-BR" dirty="0" err="1" smtClean="0">
                 <a:latin typeface="Calibri" pitchFamily="34" charset="0"/>
               </a:rPr>
-              <a:t>Publicações</a:t>
+              <a:t>Referências</a:t>
             </a:r>
             <a:endParaRPr altLang="pt-BR" dirty="0">
               <a:latin typeface="Calibri" pitchFamily="34" charset="0"/>
@@ -15101,117 +15052,179 @@
         <p:spPr/>
         <p:txBody>
           <a:bodyPr>
-            <a:normAutofit fontScale="85000" lnSpcReduction="10000"/>
+            <a:normAutofit fontScale="70000" lnSpcReduction="20000"/>
           </a:bodyPr>
           <a:lstStyle/>
           <a:p>
             <a:pPr algn="just"/>
             <a:r>
-              <a:rPr lang="en-US" dirty="0" err="1" smtClean="0"/>
-              <a:t>Conferências</a:t>
-            </a:r>
-            <a:r>
               <a:rPr lang="en-US" dirty="0" smtClean="0"/>
-              <a:t>:</a:t>
-            </a:r>
-          </a:p>
-          <a:p>
-            <a:pPr lvl="1" algn="just"/>
+              <a:t>[11] FALCHETTI</a:t>
+            </a:r>
+            <a:r>
+              <a:rPr lang="en-US" dirty="0"/>
+              <a:t>, Angelo; AZURDIA-MEZA, Cesar; CESPEDES, Sandra. Vehicular cloud computing in the dawn of 5G. In: </a:t>
+            </a:r>
+            <a:r>
+              <a:rPr lang="en-US" b="1" dirty="0"/>
+              <a:t>Electrical, Electronics Engineering, Information and Communication Technologies (CHILECON), 2015 CHILEAN Conference on</a:t>
+            </a:r>
+            <a:r>
+              <a:rPr lang="en-US" dirty="0"/>
+              <a:t>. IEEE, 2015. p. 301-305</a:t>
+            </a:r>
             <a:r>
               <a:rPr lang="en-US" dirty="0" smtClean="0"/>
-              <a:t>ERBASE 2016: </a:t>
-            </a:r>
-            <a:r>
-              <a:rPr lang="pt-BR" dirty="0"/>
-              <a:t>Modelo de uma Arquitetura de Software para </a:t>
-            </a:r>
-            <a:r>
-              <a:rPr lang="pt-BR" dirty="0" err="1" smtClean="0"/>
-              <a:t>Virtualizaçã</a:t>
-            </a:r>
-            <a:r>
-              <a:rPr lang="pt-BR" dirty="0" smtClean="0"/>
-              <a:t> </a:t>
-            </a:r>
-            <a:r>
-              <a:rPr lang="pt-BR" dirty="0"/>
-              <a:t>de uma Rede </a:t>
-            </a:r>
-            <a:r>
-              <a:rPr lang="pt-BR" dirty="0" smtClean="0"/>
-              <a:t>Veicular. </a:t>
-            </a:r>
-            <a:endParaRPr lang="en-US" dirty="0" smtClean="0"/>
-          </a:p>
-          <a:p>
-            <a:pPr lvl="1" algn="just"/>
+              <a:t>.</a:t>
+            </a:r>
+          </a:p>
+          <a:p>
+            <a:pPr algn="just"/>
             <a:r>
               <a:rPr lang="en-US" dirty="0" smtClean="0"/>
-              <a:t>CONNEPI 2016 </a:t>
-            </a:r>
-          </a:p>
-          <a:p>
-            <a:pPr lvl="2" algn="just"/>
-            <a:r>
-              <a:rPr lang="es-ES_tradnl" dirty="0"/>
-              <a:t>IDENTIFICANDO NÍVEIS DE CONGESTIONAMENTO EM CRUZAMENTOS COM SINALIZAÇÃO SEMAFÓRICA, UTILIZANDO LÓGICA FUZZY E REDE </a:t>
-            </a:r>
-            <a:r>
-              <a:rPr lang="es-ES_tradnl" dirty="0" smtClean="0"/>
-              <a:t>VEICULAR. </a:t>
-            </a:r>
-            <a:endParaRPr lang="en-US" dirty="0" smtClean="0"/>
-          </a:p>
-          <a:p>
-            <a:pPr lvl="2" algn="just"/>
-            <a:r>
-              <a:rPr lang="es-ES_tradnl" dirty="0" smtClean="0"/>
-              <a:t>UM </a:t>
-            </a:r>
-            <a:r>
-              <a:rPr lang="es-ES_tradnl" dirty="0"/>
-              <a:t>COMPARATIVO ENTRE MÉTODOS DE COMUNICAÇÃO EM SISTEMAS EMBARCADOS </a:t>
-            </a:r>
-            <a:endParaRPr lang="en-US" dirty="0" smtClean="0"/>
-          </a:p>
-          <a:p>
-            <a:pPr lvl="1" algn="just"/>
+              <a:t>[12] LIU</a:t>
+            </a:r>
+            <a:r>
+              <a:rPr lang="en-US" dirty="0"/>
+              <a:t>, Yu-Chun; CHEN, </a:t>
+            </a:r>
+            <a:r>
+              <a:rPr lang="en-US" dirty="0" err="1"/>
+              <a:t>Chien</a:t>
+            </a:r>
+            <a:r>
+              <a:rPr lang="en-US" dirty="0"/>
+              <a:t>; CHAKRABORTY, </a:t>
+            </a:r>
+            <a:r>
+              <a:rPr lang="en-US" dirty="0" err="1"/>
+              <a:t>Suchandra</a:t>
+            </a:r>
+            <a:r>
+              <a:rPr lang="en-US" dirty="0"/>
+              <a:t>. A software defined network architecture for </a:t>
+            </a:r>
+            <a:r>
+              <a:rPr lang="en-US" dirty="0" err="1"/>
+              <a:t>geobroadcast</a:t>
+            </a:r>
+            <a:r>
+              <a:rPr lang="en-US" dirty="0"/>
+              <a:t> in </a:t>
+            </a:r>
+            <a:r>
+              <a:rPr lang="en-US" dirty="0" err="1"/>
+              <a:t>vanets</a:t>
+            </a:r>
+            <a:r>
+              <a:rPr lang="en-US" dirty="0"/>
+              <a:t>. In: </a:t>
+            </a:r>
+            <a:r>
+              <a:rPr lang="en-US" b="1" dirty="0"/>
+              <a:t>Communications (ICC), 2015 IEEE International Conference on</a:t>
+            </a:r>
+            <a:r>
+              <a:rPr lang="en-US" dirty="0"/>
+              <a:t>. IEEE, 2015. p. 6559-6564.</a:t>
+            </a:r>
+          </a:p>
+          <a:p>
+            <a:pPr algn="just"/>
             <a:r>
               <a:rPr lang="en-US" dirty="0" smtClean="0"/>
-              <a:t>WETICE 2017 (</a:t>
+              <a:t>[13] HAJJI</a:t>
+            </a:r>
+            <a:r>
+              <a:rPr lang="en-US" dirty="0"/>
+              <a:t>, </a:t>
+            </a:r>
+            <a:r>
+              <a:rPr lang="en-US" dirty="0" err="1"/>
+              <a:t>Thouraya</a:t>
+            </a:r>
+            <a:r>
+              <a:rPr lang="en-US" dirty="0"/>
+              <a:t>; BARGAOUI, </a:t>
+            </a:r>
+            <a:r>
+              <a:rPr lang="en-US" dirty="0" err="1"/>
+              <a:t>Hichem</a:t>
+            </a:r>
+            <a:r>
+              <a:rPr lang="en-US" dirty="0"/>
+              <a:t>. Design of a VANET </a:t>
+            </a:r>
+            <a:r>
+              <a:rPr lang="en-US" dirty="0" err="1"/>
+              <a:t>Testbed</a:t>
+            </a:r>
+            <a:r>
+              <a:rPr lang="en-US" dirty="0"/>
+              <a:t> based on Cloud Computing</a:t>
             </a:r>
             <a:r>
               <a:rPr lang="en-US" dirty="0" smtClean="0"/>
-              <a:t>B1) </a:t>
-            </a:r>
+              <a:t>.</a:t>
+            </a:r>
+          </a:p>
+          <a:p>
+            <a:pPr algn="just"/>
             <a:r>
               <a:rPr lang="en-US" dirty="0" smtClean="0"/>
-              <a:t>- </a:t>
+              <a:t>[14] OLARIU</a:t>
             </a:r>
             <a:r>
               <a:rPr lang="en-US" dirty="0"/>
-              <a:t>A Platform for Vehicular Networks in the Cloud to Applications in Intelligent Transportation Systems </a:t>
-            </a:r>
-            <a:endParaRPr lang="en-US" dirty="0" smtClean="0"/>
+              <a:t>, Stephan; ELTOWEISSY, Mohamed; YOUNIS, Mohamed. Towards autonomous vehicular clouds. </a:t>
+            </a:r>
+            <a:r>
+              <a:rPr lang="en-US" b="1" dirty="0"/>
+              <a:t>EAI Endorsed Trans. Mobile Communications Applications</a:t>
+            </a:r>
+            <a:r>
+              <a:rPr lang="en-US" dirty="0"/>
+              <a:t>, v. 1, n. 1, p. e2, 2011</a:t>
+            </a:r>
+            <a:r>
+              <a:rPr lang="en-US" dirty="0" smtClean="0"/>
+              <a:t>.</a:t>
+            </a:r>
           </a:p>
           <a:p>
             <a:pPr algn="just"/>
             <a:r>
-              <a:rPr lang="en-US" dirty="0" err="1" smtClean="0"/>
-              <a:t>Periódicos</a:t>
-            </a:r>
-            <a:endParaRPr lang="en-US" dirty="0" smtClean="0"/>
-          </a:p>
-          <a:p>
-            <a:pPr lvl="1" algn="just"/>
-            <a:r>
               <a:rPr lang="en-US" dirty="0" smtClean="0"/>
-              <a:t>Ad Hoc Network </a:t>
+              <a:t>[15] YAN</a:t>
+            </a:r>
+            <a:r>
+              <a:rPr lang="en-US" dirty="0"/>
+              <a:t>, </a:t>
+            </a:r>
+            <a:r>
+              <a:rPr lang="en-US" dirty="0" err="1"/>
+              <a:t>Gongjun</a:t>
+            </a:r>
+            <a:r>
+              <a:rPr lang="en-US" dirty="0"/>
+              <a:t> et al. Security challenges in vehicular cloud computing. </a:t>
+            </a:r>
+            <a:r>
+              <a:rPr lang="en-US" b="1" dirty="0"/>
+              <a:t>IEEE Transactions on Intelligent Transportation Systems</a:t>
+            </a:r>
+            <a:r>
+              <a:rPr lang="en-US" dirty="0"/>
+              <a:t>, v. 14, n. 1, p. 284-294, 2013</a:t>
             </a:r>
             <a:r>
               <a:rPr lang="en-US" dirty="0" smtClean="0"/>
-              <a:t>(A2)</a:t>
-            </a:r>
+              <a:t>.</a:t>
+            </a:r>
+            <a:endParaRPr lang="en-US" dirty="0"/>
+          </a:p>
+          <a:p>
+            <a:pPr algn="just"/>
             <a:endParaRPr lang="en-US" dirty="0"/>
           </a:p>
         </p:txBody>
@@ -15267,7 +15280,7 @@
     </p:spTree>
     <p:extLst>
       <p:ext uri="{BB962C8B-B14F-4D97-AF65-F5344CB8AC3E}">
-        <p14:creationId xmlns:p14="http://schemas.microsoft.com/office/powerpoint/2010/main" val="3394059823"/>
+        <p14:creationId xmlns:p14="http://schemas.microsoft.com/office/powerpoint/2010/main" val="4091029340"/>
       </p:ext>
     </p:extLst>
   </p:cSld>
@@ -15389,13 +15402,8 @@
             <a:pPr algn="just"/>
             <a:r>
               <a:rPr lang="pt-BR" sz="3500" dirty="0" smtClean="0"/>
-              <a:t>Sistema Inteligente de </a:t>
-            </a:r>
-            <a:r>
-              <a:rPr lang="pt-BR" sz="3500" dirty="0" smtClean="0"/>
-              <a:t>Transporte</a:t>
-            </a:r>
-            <a:endParaRPr lang="pt-BR" sz="3500" dirty="0" smtClean="0"/>
+              <a:t>Sistema Inteligente de Transporte</a:t>
+            </a:r>
           </a:p>
           <a:p>
             <a:pPr algn="just"/>
@@ -15578,16 +15586,10 @@
           <a:lstStyle/>
           <a:p>
             <a:r>
-              <a:rPr lang="en-US" altLang="pt-BR" dirty="0" err="1" smtClean="0">
+              <a:rPr lang="en-US" altLang="pt-BR" dirty="0" err="1">
                 <a:latin typeface="Calibri" pitchFamily="34" charset="0"/>
               </a:rPr>
-              <a:t>Refer</a:t>
-            </a:r>
-            <a:r>
-              <a:rPr lang="en-US" altLang="pt-BR" dirty="0" err="1" smtClean="0">
-                <a:latin typeface="Calibri" pitchFamily="34" charset="0"/>
-              </a:rPr>
-              <a:t>ências</a:t>
+              <a:t>Referências</a:t>
             </a:r>
             <a:endParaRPr altLang="pt-BR" dirty="0">
               <a:latin typeface="Calibri" pitchFamily="34" charset="0"/>
@@ -15615,19 +15617,35 @@
             <a:pPr algn="just"/>
             <a:r>
               <a:rPr lang="en-US" dirty="0" smtClean="0"/>
-              <a:t>[11] FALCHETTI</a:t>
+              <a:t>[16] HUSSAIN</a:t>
             </a:r>
             <a:r>
               <a:rPr lang="en-US" dirty="0"/>
-              <a:t>, Angelo; AZURDIA-MEZA, Cesar; CESPEDES, Sandra. Vehicular cloud computing in the dawn of 5G. In: </a:t>
+              <a:t>, </a:t>
+            </a:r>
+            <a:r>
+              <a:rPr lang="en-US" dirty="0" err="1"/>
+              <a:t>Rasheed</a:t>
+            </a:r>
+            <a:r>
+              <a:rPr lang="en-US" dirty="0"/>
+              <a:t> et al. Rethinking vehicular communications: Merging VANET with cloud computing. In: </a:t>
             </a:r>
             <a:r>
               <a:rPr lang="en-US" b="1" dirty="0"/>
-              <a:t>Electrical, Electronics Engineering, Information and Communication Technologies (CHILECON), 2015 CHILEAN Conference on</a:t>
+              <a:t>Cloud Computing Technology and Science (</a:t>
+            </a:r>
+            <a:r>
+              <a:rPr lang="en-US" b="1" dirty="0" err="1"/>
+              <a:t>CloudCom</a:t>
+            </a:r>
+            <a:r>
+              <a:rPr lang="en-US" b="1" dirty="0"/>
+              <a:t>), 2012 IEEE 4th International Conference on</a:t>
             </a:r>
             <a:r>
               <a:rPr lang="en-US" dirty="0"/>
-              <a:t>. IEEE, 2015. p. 301-305</a:t>
+              <a:t>. IEEE, 2012. p. 606-609</a:t>
             </a:r>
             <a:r>
               <a:rPr lang="en-US" dirty="0" smtClean="0"/>
@@ -15638,58 +15656,62 @@
             <a:pPr algn="just"/>
             <a:r>
               <a:rPr lang="en-US" dirty="0" smtClean="0"/>
-              <a:t>[12] LIU</a:t>
+              <a:t>[17] QIN</a:t>
             </a:r>
             <a:r>
               <a:rPr lang="en-US" dirty="0"/>
-              <a:t>, Yu-Chun; CHEN, </a:t>
+              <a:t>, Yang; HUANG, </a:t>
             </a:r>
             <a:r>
               <a:rPr lang="en-US" dirty="0" err="1"/>
-              <a:t>Chien</a:t>
+              <a:t>Dijiang</a:t>
             </a:r>
             <a:r>
               <a:rPr lang="en-US" dirty="0"/>
-              <a:t>; CHAKRABORTY, </a:t>
+              <a:t>; ZHANG, </a:t>
             </a:r>
             <a:r>
               <a:rPr lang="en-US" dirty="0" err="1"/>
-              <a:t>Suchandra</a:t>
+              <a:t>Xinwen</a:t>
             </a:r>
             <a:r>
               <a:rPr lang="en-US" dirty="0"/>
-              <a:t>. A software defined network architecture for </a:t>
+              <a:t>. </a:t>
             </a:r>
             <a:r>
               <a:rPr lang="en-US" dirty="0" err="1"/>
-              <a:t>geobroadcast</a:t>
+              <a:t>Vehicloud</a:t>
             </a:r>
             <a:r>
               <a:rPr lang="en-US" dirty="0"/>
-              <a:t> in </a:t>
-            </a:r>
-            <a:r>
-              <a:rPr lang="en-US" dirty="0" err="1"/>
-              <a:t>vanets</a:t>
+              <a:t>: Cloud computing facilitating routing in vehicular networks. In: </a:t>
+            </a:r>
+            <a:r>
+              <a:rPr lang="en-US" b="1" dirty="0"/>
+              <a:t>Trust, Security and Privacy in Computing and Communications (</a:t>
+            </a:r>
+            <a:r>
+              <a:rPr lang="en-US" b="1" dirty="0" err="1"/>
+              <a:t>TrustCom</a:t>
+            </a:r>
+            <a:r>
+              <a:rPr lang="en-US" b="1" dirty="0"/>
+              <a:t>), 2012 IEEE 11th International Conference on</a:t>
             </a:r>
             <a:r>
               <a:rPr lang="en-US" dirty="0"/>
-              <a:t>. In: </a:t>
-            </a:r>
-            <a:r>
-              <a:rPr lang="en-US" b="1" dirty="0"/>
-              <a:t>Communications (ICC), 2015 IEEE International Conference on</a:t>
-            </a:r>
-            <a:r>
-              <a:rPr lang="en-US" dirty="0"/>
-              <a:t>. IEEE, 2015. p. 6559-6564.</a:t>
+              <a:t>. IEEE, 2012. p. 1438-1445</a:t>
+            </a:r>
+            <a:r>
+              <a:rPr lang="en-US" dirty="0" smtClean="0"/>
+              <a:t>.</a:t>
             </a:r>
           </a:p>
           <a:p>
             <a:pPr algn="just"/>
             <a:r>
               <a:rPr lang="en-US" dirty="0" smtClean="0"/>
-              <a:t>[13] HAJJI</a:t>
+              <a:t>[18] LEE</a:t>
             </a:r>
             <a:r>
               <a:rPr lang="en-US" dirty="0"/>
@@ -15697,27 +15719,19 @@
             </a:r>
             <a:r>
               <a:rPr lang="en-US" dirty="0" err="1"/>
-              <a:t>Thouraya</a:t>
+              <a:t>Euisin</a:t>
             </a:r>
             <a:r>
               <a:rPr lang="en-US" dirty="0"/>
-              <a:t>; BARGAOUI, </a:t>
-            </a:r>
-            <a:r>
-              <a:rPr lang="en-US" dirty="0" err="1"/>
-              <a:t>Hichem</a:t>
+              <a:t> et al. Vehicular cloud networking: architecture and design principles. </a:t>
+            </a:r>
+            <a:r>
+              <a:rPr lang="en-US" b="1" dirty="0"/>
+              <a:t>IEEE Communications Magazine</a:t>
             </a:r>
             <a:r>
               <a:rPr lang="en-US" dirty="0"/>
-              <a:t>. Design of a VANET </a:t>
-            </a:r>
-            <a:r>
-              <a:rPr lang="en-US" dirty="0" err="1"/>
-              <a:t>Testbed</a:t>
-            </a:r>
-            <a:r>
-              <a:rPr lang="en-US" dirty="0"/>
-              <a:t> based on Cloud Computing</a:t>
+              <a:t>, v. 52, n. 2, p. 148-155, 2014</a:t>
             </a:r>
             <a:r>
               <a:rPr lang="en-US" dirty="0" smtClean="0"/>
@@ -15728,56 +15742,44 @@
             <a:pPr algn="just"/>
             <a:r>
               <a:rPr lang="en-US" dirty="0" smtClean="0"/>
-              <a:t>[14] OLARIU</a:t>
+              <a:t>[20] GERLA</a:t>
             </a:r>
             <a:r>
               <a:rPr lang="en-US" dirty="0"/>
-              <a:t>, Stephan; ELTOWEISSY, Mohamed; YOUNIS, Mohamed. Towards autonomous vehicular clouds. </a:t>
+              <a:t>, Mario. Vehicular cloud computing. In: </a:t>
             </a:r>
             <a:r>
               <a:rPr lang="en-US" b="1" dirty="0"/>
-              <a:t>EAI Endorsed Trans. Mobile Communications Applications</a:t>
+              <a:t>Ad Hoc Networking Workshop (Med-Hoc-Net), 2012 The 11th Annual Mediterranean</a:t>
             </a:r>
             <a:r>
               <a:rPr lang="en-US" dirty="0"/>
-              <a:t>, v. 1, n. 1, p. e2, 2011</a:t>
+              <a:t>. IEEE, 2012. p. 152-155</a:t>
             </a:r>
             <a:r>
               <a:rPr lang="en-US" dirty="0" smtClean="0"/>
               <a:t>.</a:t>
             </a:r>
+            <a:endParaRPr lang="en-US" dirty="0"/>
           </a:p>
           <a:p>
             <a:pPr algn="just"/>
             <a:r>
               <a:rPr lang="en-US" dirty="0" smtClean="0"/>
-              <a:t>[15] YAN</a:t>
+              <a:t>[21] SOOKHAK</a:t>
             </a:r>
             <a:r>
               <a:rPr lang="en-US" dirty="0"/>
-              <a:t>, </a:t>
-            </a:r>
-            <a:r>
-              <a:rPr lang="en-US" dirty="0" err="1"/>
-              <a:t>Gongjun</a:t>
+              <a:t>, Mehdi; YU, F. Richard; TANG, Helen. Secure Data Sharing for Vehicular Ad-hoc Networks Using Cloud Computing. In: </a:t>
+            </a:r>
+            <a:r>
+              <a:rPr lang="en-US" b="1" dirty="0"/>
+              <a:t>Ad Hoc Networks</a:t>
             </a:r>
             <a:r>
               <a:rPr lang="en-US" dirty="0"/>
-              <a:t> et al. Security challenges in vehicular cloud computing. </a:t>
-            </a:r>
-            <a:r>
-              <a:rPr lang="en-US" b="1" dirty="0"/>
-              <a:t>IEEE Transactions on Intelligent Transportation Systems</a:t>
-            </a:r>
-            <a:r>
-              <a:rPr lang="en-US" dirty="0"/>
-              <a:t>, v. 14, n. 1, p. 284-294, 2013</a:t>
-            </a:r>
-            <a:r>
-              <a:rPr lang="en-US" dirty="0" smtClean="0"/>
-              <a:t>.</a:t>
-            </a:r>
-            <a:endParaRPr lang="en-US" dirty="0"/>
+              <a:t>. Springer International Publishing, 2017. p. 306-315.</a:t>
+            </a:r>
           </a:p>
           <a:p>
             <a:pPr algn="just"/>
@@ -15836,7 +15838,7 @@
     </p:spTree>
     <p:extLst>
       <p:ext uri="{BB962C8B-B14F-4D97-AF65-F5344CB8AC3E}">
-        <p14:creationId xmlns:p14="http://schemas.microsoft.com/office/powerpoint/2010/main" val="4091029340"/>
+        <p14:creationId xmlns:p14="http://schemas.microsoft.com/office/powerpoint/2010/main" val="2260791913"/>
       </p:ext>
     </p:extLst>
   </p:cSld>
@@ -15918,180 +15920,75 @@
         <p:spPr/>
         <p:txBody>
           <a:bodyPr>
-            <a:normAutofit fontScale="70000" lnSpcReduction="20000"/>
+            <a:normAutofit/>
           </a:bodyPr>
           <a:lstStyle/>
           <a:p>
             <a:pPr algn="just"/>
             <a:r>
-              <a:rPr lang="en-US" dirty="0" smtClean="0"/>
-              <a:t>[16] HUSSAIN</a:t>
-            </a:r>
-            <a:r>
-              <a:rPr lang="en-US" dirty="0"/>
+              <a:rPr lang="en-US" sz="2000" dirty="0" smtClean="0"/>
+              <a:t>[22] COMI</a:t>
+            </a:r>
+            <a:r>
+              <a:rPr lang="en-US" sz="2000" dirty="0"/>
               <a:t>, </a:t>
             </a:r>
             <a:r>
-              <a:rPr lang="en-US" dirty="0" err="1"/>
-              <a:t>Rasheed</a:t>
-            </a:r>
-            <a:r>
-              <a:rPr lang="en-US" dirty="0"/>
-              <a:t> et al. Rethinking vehicular communications: Merging VANET with cloud computing. In: </a:t>
-            </a:r>
-            <a:r>
-              <a:rPr lang="en-US" b="1" dirty="0"/>
-              <a:t>Cloud Computing Technology and Science (</a:t>
-            </a:r>
-            <a:r>
-              <a:rPr lang="en-US" b="1" dirty="0" err="1"/>
-              <a:t>CloudCom</a:t>
-            </a:r>
-            <a:r>
-              <a:rPr lang="en-US" b="1" dirty="0"/>
-              <a:t>), 2012 IEEE 4th International Conference on</a:t>
-            </a:r>
-            <a:r>
-              <a:rPr lang="en-US" dirty="0"/>
-              <a:t>. IEEE, 2012. p. 606-609</a:t>
-            </a:r>
-            <a:r>
-              <a:rPr lang="en-US" dirty="0" smtClean="0"/>
+              <a:rPr lang="en-US" sz="2000" dirty="0" err="1"/>
+              <a:t>Antonello</a:t>
+            </a:r>
+            <a:r>
+              <a:rPr lang="en-US" sz="2000" dirty="0"/>
+              <a:t> et al. An evolutionary approach for cloud learning agents in multi-cloud distributed contexts. In: </a:t>
+            </a:r>
+            <a:r>
+              <a:rPr lang="en-US" sz="2000" b="1" dirty="0"/>
+              <a:t>Enabling Technologies: Infrastructure for Collaborative Enterprises (WETICE), 2015 IEEE 24th International Conference on</a:t>
+            </a:r>
+            <a:r>
+              <a:rPr lang="en-US" sz="2000" dirty="0"/>
+              <a:t>. IEEE, 2015. p. 99-104</a:t>
+            </a:r>
+            <a:r>
+              <a:rPr lang="en-US" sz="2000" dirty="0" smtClean="0"/>
               <a:t>.</a:t>
             </a:r>
           </a:p>
           <a:p>
             <a:pPr algn="just"/>
             <a:r>
-              <a:rPr lang="en-US" dirty="0" smtClean="0"/>
-              <a:t>[17] QIN</a:t>
-            </a:r>
-            <a:r>
-              <a:rPr lang="en-US" dirty="0"/>
-              <a:t>, Yang; HUANG, </a:t>
-            </a:r>
-            <a:r>
-              <a:rPr lang="en-US" dirty="0" err="1"/>
-              <a:t>Dijiang</a:t>
-            </a:r>
-            <a:r>
-              <a:rPr lang="en-US" dirty="0"/>
-              <a:t>; ZHANG, </a:t>
-            </a:r>
-            <a:r>
-              <a:rPr lang="en-US" dirty="0" err="1"/>
-              <a:t>Xinwen</a:t>
-            </a:r>
-            <a:r>
-              <a:rPr lang="en-US" dirty="0"/>
-              <a:t>. </a:t>
-            </a:r>
-            <a:r>
-              <a:rPr lang="en-US" dirty="0" err="1"/>
-              <a:t>Vehicloud</a:t>
-            </a:r>
-            <a:r>
-              <a:rPr lang="en-US" dirty="0"/>
-              <a:t>: Cloud computing facilitating routing in vehicular networks. In: </a:t>
-            </a:r>
-            <a:r>
-              <a:rPr lang="en-US" b="1" dirty="0"/>
-              <a:t>Trust, Security and Privacy in Computing and Communications (</a:t>
-            </a:r>
-            <a:r>
-              <a:rPr lang="en-US" b="1" dirty="0" err="1"/>
-              <a:t>TrustCom</a:t>
-            </a:r>
-            <a:r>
-              <a:rPr lang="en-US" b="1" dirty="0"/>
-              <a:t>), 2012 IEEE 11th International Conference on</a:t>
-            </a:r>
-            <a:r>
-              <a:rPr lang="en-US" dirty="0"/>
-              <a:t>. IEEE, 2012. p. 1438-1445</a:t>
-            </a:r>
-            <a:r>
-              <a:rPr lang="en-US" dirty="0" smtClean="0"/>
-              <a:t>.</a:t>
-            </a:r>
+              <a:rPr lang="en-US" sz="2000" dirty="0" smtClean="0"/>
+              <a:t>[23] DORRI</a:t>
+            </a:r>
+            <a:r>
+              <a:rPr lang="en-US" sz="2000" dirty="0"/>
+              <a:t>, Ali et al. </a:t>
+            </a:r>
+            <a:r>
+              <a:rPr lang="en-US" sz="2000" dirty="0" err="1"/>
+              <a:t>BlockChain</a:t>
+            </a:r>
+            <a:r>
+              <a:rPr lang="en-US" sz="2000" dirty="0"/>
+              <a:t>: A distributed solution to automotive security and privacy. </a:t>
+            </a:r>
+            <a:r>
+              <a:rPr lang="en-US" sz="2000" b="1" dirty="0" err="1"/>
+              <a:t>arXiv</a:t>
+            </a:r>
+            <a:r>
+              <a:rPr lang="en-US" sz="2000" b="1" dirty="0"/>
+              <a:t> preprint arXiv:1704.00073</a:t>
+            </a:r>
+            <a:r>
+              <a:rPr lang="en-US" sz="2000" dirty="0"/>
+              <a:t>, 2017.</a:t>
+            </a:r>
+            <a:endParaRPr lang="en-US" sz="2000" dirty="0" smtClean="0"/>
           </a:p>
           <a:p>
             <a:pPr algn="just"/>
-            <a:r>
-              <a:rPr lang="en-US" dirty="0" smtClean="0"/>
-              <a:t>[18] LEE</a:t>
-            </a:r>
-            <a:r>
-              <a:rPr lang="en-US" dirty="0"/>
-              <a:t>, </a:t>
-            </a:r>
-            <a:r>
-              <a:rPr lang="en-US" dirty="0" err="1"/>
-              <a:t>Euisin</a:t>
-            </a:r>
-            <a:r>
-              <a:rPr lang="en-US" dirty="0"/>
-              <a:t> et al. Vehicular cloud networking: architecture and design principles. </a:t>
-            </a:r>
-            <a:r>
-              <a:rPr lang="en-US" b="1" dirty="0"/>
-              <a:t>IEEE Communications Magazine</a:t>
-            </a:r>
-            <a:r>
-              <a:rPr lang="en-US" dirty="0"/>
-              <a:t>, v. 52, n. 2, p. 148-155, 2014</a:t>
-            </a:r>
-            <a:r>
-              <a:rPr lang="en-US" dirty="0" smtClean="0"/>
-              <a:t>.</a:t>
-            </a:r>
-          </a:p>
-          <a:p>
-            <a:pPr algn="just"/>
-            <a:r>
-              <a:rPr lang="en-US" dirty="0" smtClean="0"/>
-              <a:t>[20] GERLA</a:t>
-            </a:r>
-            <a:r>
-              <a:rPr lang="en-US" dirty="0"/>
-              <a:t>, Mario. Vehicular cloud computing. In: </a:t>
-            </a:r>
-            <a:r>
-              <a:rPr lang="en-US" b="1" dirty="0"/>
-              <a:t>Ad Hoc Networking Workshop (Med-Hoc-Net), 2012 The 11th Annual Mediterranean</a:t>
-            </a:r>
-            <a:r>
-              <a:rPr lang="en-US" dirty="0"/>
-              <a:t>. IEEE, 2012. p. 152-155</a:t>
-            </a:r>
-            <a:r>
-              <a:rPr lang="en-US" dirty="0" smtClean="0"/>
-              <a:t>.</a:t>
-            </a:r>
-            <a:endParaRPr lang="en-US" dirty="0"/>
-          </a:p>
-          <a:p>
-            <a:pPr algn="just"/>
-            <a:r>
-              <a:rPr lang="en-US" dirty="0" smtClean="0"/>
-              <a:t>[21] SOOKHAK</a:t>
-            </a:r>
-            <a:r>
-              <a:rPr lang="en-US" dirty="0"/>
-              <a:t>, Mehdi; YU, F. Richard; TANG, Helen. Secure Data Sharing for Vehicular Ad-hoc Networks Using Cloud Computing. In: </a:t>
-            </a:r>
-            <a:r>
-              <a:rPr lang="en-US" b="1" dirty="0"/>
-              <a:t>Ad Hoc Networks</a:t>
-            </a:r>
-            <a:r>
-              <a:rPr lang="en-US" dirty="0"/>
-              <a:t>. Springer International Publishing, 2017. p. 306-315.</a:t>
-            </a:r>
-          </a:p>
-          <a:p>
-            <a:pPr algn="just"/>
-            <a:endParaRPr lang="en-US" dirty="0"/>
+            <a:endParaRPr lang="en-US" sz="2000" dirty="0"/>
           </a:p>
         </p:txBody>
       </p:sp>
@@ -16133,211 +16030,6 @@
               </a:rPr>
               <a:pPr algn="ctr" eaLnBrk="1" hangingPunct="1"/>
               <a:t>31</a:t>
-            </a:fld>
-            <a:endParaRPr lang="pt-BR" altLang="pt-BR" sz="1400" b="1" dirty="0">
-              <a:solidFill>
-                <a:schemeClr val="bg1"/>
-              </a:solidFill>
-              <a:latin typeface="Tw Cen MT" pitchFamily="34" charset="0"/>
-            </a:endParaRPr>
-          </a:p>
-        </p:txBody>
-      </p:sp>
-    </p:spTree>
-    <p:extLst>
-      <p:ext uri="{BB962C8B-B14F-4D97-AF65-F5344CB8AC3E}">
-        <p14:creationId xmlns:p14="http://schemas.microsoft.com/office/powerpoint/2010/main" val="2260791913"/>
-      </p:ext>
-    </p:extLst>
-  </p:cSld>
-  <p:clrMapOvr>
-    <a:masterClrMapping/>
-  </p:clrMapOvr>
-  <mc:AlternateContent xmlns:mc="http://schemas.openxmlformats.org/markup-compatibility/2006" xmlns:p14="http://schemas.microsoft.com/office/powerpoint/2010/main">
-    <mc:Choice Requires="p14">
-      <p:transition p14:dur="0"/>
-    </mc:Choice>
-    <mc:Fallback xmlns="">
-      <p:transition xmlns:p14="http://schemas.microsoft.com/office/powerpoint/2010/main"/>
-    </mc:Fallback>
-  </mc:AlternateContent>
-  <p:timing>
-    <p:tnLst>
-      <p:par>
-        <p:cTn xmlns:p14="http://schemas.microsoft.com/office/powerpoint/2010/main" id="1" dur="indefinite" restart="never" nodeType="tmRoot"/>
-      </p:par>
-    </p:tnLst>
-  </p:timing>
-</p:sld>
-</file>
-
-<file path=ppt/slides/slide32.xml><?xml version="1.0" encoding="utf-8"?>
-<p:sld xmlns:a="http://schemas.openxmlformats.org/drawingml/2006/main" xmlns:r="http://schemas.openxmlformats.org/officeDocument/2006/relationships" xmlns:p="http://schemas.openxmlformats.org/presentationml/2006/main">
-  <p:cSld>
-    <p:spTree>
-      <p:nvGrpSpPr>
-        <p:cNvPr id="1" name=""/>
-        <p:cNvGrpSpPr/>
-        <p:nvPr/>
-      </p:nvGrpSpPr>
-      <p:grpSpPr>
-        <a:xfrm>
-          <a:off x="0" y="0"/>
-          <a:ext cx="0" cy="0"/>
-          <a:chOff x="0" y="0"/>
-          <a:chExt cx="0" cy="0"/>
-        </a:xfrm>
-      </p:grpSpPr>
-      <p:sp>
-        <p:nvSpPr>
-          <p:cNvPr id="29698" name="Title 1"/>
-          <p:cNvSpPr>
-            <a:spLocks noGrp="1"/>
-          </p:cNvSpPr>
-          <p:nvPr>
-            <p:ph type="title"/>
-          </p:nvPr>
-        </p:nvSpPr>
-        <p:spPr/>
-        <p:txBody>
-          <a:bodyPr/>
-          <a:lstStyle/>
-          <a:p>
-            <a:r>
-              <a:rPr lang="en-US" altLang="pt-BR" dirty="0" err="1">
-                <a:latin typeface="Calibri" pitchFamily="34" charset="0"/>
-              </a:rPr>
-              <a:t>Referências</a:t>
-            </a:r>
-            <a:endParaRPr altLang="pt-BR" dirty="0">
-              <a:latin typeface="Calibri" pitchFamily="34" charset="0"/>
-            </a:endParaRPr>
-          </a:p>
-        </p:txBody>
-      </p:sp>
-      <p:sp>
-        <p:nvSpPr>
-          <p:cNvPr id="2" name="Content Placeholder 1"/>
-          <p:cNvSpPr>
-            <a:spLocks noGrp="1"/>
-          </p:cNvSpPr>
-          <p:nvPr>
-            <p:ph sz="quarter" idx="1"/>
-          </p:nvPr>
-        </p:nvSpPr>
-        <p:spPr/>
-        <p:txBody>
-          <a:bodyPr>
-            <a:normAutofit/>
-          </a:bodyPr>
-          <a:lstStyle/>
-          <a:p>
-            <a:pPr algn="just"/>
-            <a:r>
-              <a:rPr lang="en-US" sz="2000" dirty="0" smtClean="0"/>
-              <a:t>[22] COMI</a:t>
-            </a:r>
-            <a:r>
-              <a:rPr lang="en-US" sz="2000" dirty="0"/>
-              <a:t>, </a:t>
-            </a:r>
-            <a:r>
-              <a:rPr lang="en-US" sz="2000" dirty="0" err="1"/>
-              <a:t>Antonello</a:t>
-            </a:r>
-            <a:r>
-              <a:rPr lang="en-US" sz="2000" dirty="0"/>
-              <a:t> et al. An evolutionary approach for cloud learning agents in multi-cloud distributed contexts. In: </a:t>
-            </a:r>
-            <a:r>
-              <a:rPr lang="en-US" sz="2000" b="1" dirty="0"/>
-              <a:t>Enabling Technologies: Infrastructure for Collaborative Enterprises (WETICE), 2015 IEEE 24th International Conference on</a:t>
-            </a:r>
-            <a:r>
-              <a:rPr lang="en-US" sz="2000" dirty="0"/>
-              <a:t>. IEEE, 2015. p. 99-104</a:t>
-            </a:r>
-            <a:r>
-              <a:rPr lang="en-US" sz="2000" dirty="0" smtClean="0"/>
-              <a:t>.</a:t>
-            </a:r>
-          </a:p>
-          <a:p>
-            <a:pPr algn="just"/>
-            <a:r>
-              <a:rPr lang="en-US" sz="2000" dirty="0" smtClean="0"/>
-              <a:t>[23] DORRI</a:t>
-            </a:r>
-            <a:r>
-              <a:rPr lang="en-US" sz="2000" dirty="0"/>
-              <a:t>, Ali et al. </a:t>
-            </a:r>
-            <a:r>
-              <a:rPr lang="en-US" sz="2000" dirty="0" err="1"/>
-              <a:t>BlockChain</a:t>
-            </a:r>
-            <a:r>
-              <a:rPr lang="en-US" sz="2000" dirty="0"/>
-              <a:t>: A distributed solution to automotive security and privacy. </a:t>
-            </a:r>
-            <a:r>
-              <a:rPr lang="en-US" sz="2000" b="1" dirty="0" err="1"/>
-              <a:t>arXiv</a:t>
-            </a:r>
-            <a:r>
-              <a:rPr lang="en-US" sz="2000" b="1" dirty="0"/>
-              <a:t> preprint arXiv:1704.00073</a:t>
-            </a:r>
-            <a:r>
-              <a:rPr lang="en-US" sz="2000" dirty="0"/>
-              <a:t>, 2017.</a:t>
-            </a:r>
-            <a:endParaRPr lang="en-US" sz="2000" dirty="0" smtClean="0"/>
-          </a:p>
-          <a:p>
-            <a:pPr algn="just"/>
-            <a:endParaRPr lang="en-US" sz="2000" dirty="0"/>
-          </a:p>
-        </p:txBody>
-      </p:sp>
-      <p:sp>
-        <p:nvSpPr>
-          <p:cNvPr id="29700" name="Rectangle 22"/>
-          <p:cNvSpPr>
-            <a:spLocks/>
-          </p:cNvSpPr>
-          <p:nvPr/>
-        </p:nvSpPr>
-        <p:spPr bwMode="auto">
-          <a:xfrm>
-            <a:off x="0" y="1271588"/>
-            <a:ext cx="533400" cy="244475"/>
-          </a:xfrm>
-          <a:prstGeom prst="rect">
-            <a:avLst/>
-          </a:prstGeom>
-          <a:noFill/>
-          <a:ln w="9525">
-            <a:noFill/>
-            <a:miter lim="800000"/>
-            <a:headEnd/>
-            <a:tailEnd/>
-          </a:ln>
-        </p:spPr>
-        <p:txBody>
-          <a:bodyPr anchor="ctr"/>
-          <a:lstStyle/>
-          <a:p>
-            <a:pPr algn="ctr" eaLnBrk="1" hangingPunct="1"/>
-            <a:fld id="{2213E8A9-2084-4B2F-A4D9-614C179387CC}" type="slidenum">
-              <a:rPr lang="pt-BR" altLang="pt-BR" sz="1200" b="1">
-                <a:solidFill>
-                  <a:schemeClr val="bg1"/>
-                </a:solidFill>
-                <a:latin typeface="Tw Cen MT" pitchFamily="34" charset="0"/>
-              </a:rPr>
-              <a:pPr algn="ctr" eaLnBrk="1" hangingPunct="1"/>
-              <a:t>32</a:t>
             </a:fld>
             <a:endParaRPr lang="pt-BR" altLang="pt-BR" sz="1400" b="1" dirty="0">
               <a:solidFill>
@@ -16376,7 +16068,7 @@
 </p:sld>
 </file>
 
-<file path=ppt/slides/slide33.xml><?xml version="1.0" encoding="utf-8"?>
+<file path=ppt/slides/slide32.xml><?xml version="1.0" encoding="utf-8"?>
 <p:sld xmlns:a="http://schemas.openxmlformats.org/drawingml/2006/main" xmlns:r="http://schemas.openxmlformats.org/officeDocument/2006/relationships" xmlns:p="http://schemas.openxmlformats.org/presentationml/2006/main">
   <p:cSld>
     <p:spTree>
@@ -18136,12 +17828,7 @@
             <p:ph type="title"/>
           </p:nvPr>
         </p:nvSpPr>
-        <p:spPr>
-          <a:xfrm>
-            <a:off x="612775" y="228600"/>
-            <a:ext cx="8153400" cy="990600"/>
-          </a:xfrm>
-        </p:spPr>
+        <p:spPr/>
         <p:txBody>
           <a:bodyPr/>
           <a:lstStyle/>
@@ -18156,6 +17843,63 @@
             <a:endParaRPr altLang="pt-BR" sz="3800" i="1" dirty="0">
               <a:latin typeface="Calibri" pitchFamily="34" charset="0"/>
             </a:endParaRPr>
+          </a:p>
+        </p:txBody>
+      </p:sp>
+      <p:sp>
+        <p:nvSpPr>
+          <p:cNvPr id="5" name="Content Placeholder 4"/>
+          <p:cNvSpPr>
+            <a:spLocks noGrp="1"/>
+          </p:cNvSpPr>
+          <p:nvPr>
+            <p:ph sz="quarter" idx="1"/>
+          </p:nvPr>
+        </p:nvSpPr>
+        <p:spPr/>
+        <p:txBody>
+          <a:bodyPr/>
+          <a:lstStyle/>
+          <a:p>
+            <a:r>
+              <a:rPr lang="en-US" dirty="0" err="1" smtClean="0"/>
+              <a:t>Quadro</a:t>
+            </a:r>
+            <a:r>
+              <a:rPr lang="en-US" dirty="0" smtClean="0"/>
+              <a:t> </a:t>
+            </a:r>
+            <a:r>
+              <a:rPr lang="en-US" dirty="0" err="1" smtClean="0"/>
+              <a:t>comparativo</a:t>
+            </a:r>
+            <a:endParaRPr lang="en-US" dirty="0"/>
+          </a:p>
+        </p:txBody>
+      </p:sp>
+      <p:sp>
+        <p:nvSpPr>
+          <p:cNvPr id="2" name="Espaço Reservado para Número de Slide 1"/>
+          <p:cNvSpPr>
+            <a:spLocks noGrp="1"/>
+          </p:cNvSpPr>
+          <p:nvPr>
+            <p:ph type="sldNum" sz="quarter" idx="12"/>
+          </p:nvPr>
+        </p:nvSpPr>
+        <p:spPr/>
+        <p:txBody>
+          <a:bodyPr>
+            <a:normAutofit fontScale="85000" lnSpcReduction="20000"/>
+          </a:bodyPr>
+          <a:lstStyle/>
+          <a:p>
+            <a:fld id="{552ECE8C-316A-4354-A4B8-86A79814135A}" type="slidenum">
+              <a:rPr lang="pt-BR" altLang="pt-BR" smtClean="0"/>
+              <a:pPr/>
+              <a:t>8</a:t>
+            </a:fld>
+            <a:endParaRPr lang="pt-BR" altLang="pt-BR" dirty="0"/>
           </a:p>
         </p:txBody>
       </p:sp>
@@ -18229,35 +17973,9 @@
           </a:p>
         </p:txBody>
       </p:sp>
-      <p:sp>
-        <p:nvSpPr>
-          <p:cNvPr id="2" name="Espaço Reservado para Número de Slide 1"/>
-          <p:cNvSpPr>
-            <a:spLocks noGrp="1"/>
-          </p:cNvSpPr>
-          <p:nvPr>
-            <p:ph type="sldNum" sz="quarter" idx="12"/>
-          </p:nvPr>
-        </p:nvSpPr>
-        <p:spPr/>
-        <p:txBody>
-          <a:bodyPr>
-            <a:normAutofit fontScale="85000" lnSpcReduction="20000"/>
-          </a:bodyPr>
-          <a:lstStyle/>
-          <a:p>
-            <a:fld id="{552ECE8C-316A-4354-A4B8-86A79814135A}" type="slidenum">
-              <a:rPr lang="pt-BR" altLang="pt-BR" smtClean="0"/>
-              <a:pPr/>
-              <a:t>8</a:t>
-            </a:fld>
-            <a:endParaRPr lang="pt-BR" altLang="pt-BR" dirty="0"/>
-          </a:p>
-        </p:txBody>
-      </p:sp>
       <p:pic>
         <p:nvPicPr>
-          <p:cNvPr id="3" name="Picture 2" descr="estado_da_arte.png"/>
+          <p:cNvPr id="4" name="Picture 3" descr="estado_da_arte.png"/>
           <p:cNvPicPr>
             <a:picLocks noChangeAspect="1"/>
           </p:cNvPicPr>
@@ -18277,8 +17995,8 @@
         </p:blipFill>
         <p:spPr>
           <a:xfrm>
-            <a:off x="0" y="2216006"/>
-            <a:ext cx="9144000" cy="3733274"/>
+            <a:off x="0" y="2276872"/>
+            <a:ext cx="9144000" cy="3747381"/>
           </a:xfrm>
           <a:prstGeom prst="rect">
             <a:avLst/>

</xml_diff>